<commit_message>
Fixing graph, adding new DevHistory graph and some reordering
</commit_message>
<xml_diff>
--- a/PowerPoint/OMA-MZ_03-Presentation.pptx
+++ b/PowerPoint/OMA-MZ_03-Presentation.pptx
@@ -5,7 +5,7 @@
     <p:sldMasterId id="2147483648" r:id="rId1"/>
   </p:sldMasterIdLst>
   <p:notesMasterIdLst>
-    <p:notesMasterId r:id="rId22"/>
+    <p:notesMasterId r:id="rId26"/>
   </p:notesMasterIdLst>
   <p:sldIdLst>
     <p:sldId id="256" r:id="rId2"/>
@@ -26,8 +26,12 @@
     <p:sldId id="261" r:id="rId17"/>
     <p:sldId id="277" r:id="rId18"/>
     <p:sldId id="276" r:id="rId19"/>
-    <p:sldId id="274" r:id="rId20"/>
-    <p:sldId id="273" r:id="rId21"/>
+    <p:sldId id="279" r:id="rId20"/>
+    <p:sldId id="280" r:id="rId21"/>
+    <p:sldId id="281" r:id="rId22"/>
+    <p:sldId id="282" r:id="rId23"/>
+    <p:sldId id="274" r:id="rId24"/>
+    <p:sldId id="273" r:id="rId25"/>
   </p:sldIdLst>
   <p:sldSz cx="12192000" cy="6858000"/>
   <p:notesSz cx="6858000" cy="9144000"/>
@@ -139,9 +143,9 @@
 </file>
 
 <file path=ppt/charts/chart1.xml><?xml version="1.0" encoding="utf-8"?>
-<c:chartSpace xmlns:c="http://schemas.openxmlformats.org/drawingml/2006/chart" xmlns:a="http://schemas.openxmlformats.org/drawingml/2006/main" xmlns:r="http://schemas.openxmlformats.org/officeDocument/2006/relationships" xmlns:c16r2="http://schemas.microsoft.com/office/drawing/2015/06/chart">
+<c:chartSpace xmlns:c="http://schemas.openxmlformats.org/drawingml/2006/chart" xmlns:a="http://schemas.openxmlformats.org/drawingml/2006/main" xmlns:r="http://schemas.openxmlformats.org/officeDocument/2006/relationships">
   <c:date1904 val="0"/>
-  <c:lang val="it-IT"/>
+  <c:lang val="en-US"/>
   <c:roundedCorners val="0"/>
   <mc:AlternateContent xmlns:mc="http://schemas.openxmlformats.org/markup-compatibility/2006">
     <mc:Choice xmlns:c14="http://schemas.microsoft.com/office/drawing/2007/8/2/chart" Requires="c14">
@@ -159,10 +163,10 @@
           <c:layoutTarget val="inner"/>
           <c:xMode val="edge"/>
           <c:yMode val="edge"/>
-          <c:x val="0.20258509572410763"/>
-          <c:y val="0.10873698752043712"/>
-          <c:w val="0.63659979134498046"/>
-          <c:h val="0.79671927340028936"/>
+          <c:x val="0.202585095724108"/>
+          <c:y val="0.108736987520437"/>
+          <c:w val="0.636599791344981"/>
+          <c:h val="0.796719273400289"/>
         </c:manualLayout>
       </c:layout>
       <c:pieChart>
@@ -201,7 +205,7 @@
                 </a:outerShdw>
               </a:effectLst>
             </c:spPr>
-            <c:extLst>
+            <c:extLst xmlns:c16r2="http://schemas.microsoft.com/office/drawing/2015/06/chart">
               <c:ext xmlns:c16="http://schemas.microsoft.com/office/drawing/2014/chart" uri="{C3380CC4-5D6E-409C-BE32-E72D297353CC}">
                 <c16:uniqueId val="{00000001-3EB7-4374-AE9A-D38B071EA406}"/>
               </c:ext>
@@ -227,7 +231,7 @@
                 </a:outerShdw>
               </a:effectLst>
             </c:spPr>
-            <c:extLst>
+            <c:extLst xmlns:c16r2="http://schemas.microsoft.com/office/drawing/2015/06/chart">
               <c:ext xmlns:c16="http://schemas.microsoft.com/office/drawing/2014/chart" uri="{C3380CC4-5D6E-409C-BE32-E72D297353CC}">
                 <c16:uniqueId val="{00000003-3EB7-4374-AE9A-D38B071EA406}"/>
               </c:ext>
@@ -253,7 +257,7 @@
                 </a:outerShdw>
               </a:effectLst>
             </c:spPr>
-            <c:extLst>
+            <c:extLst xmlns:c16r2="http://schemas.microsoft.com/office/drawing/2015/06/chart">
               <c:ext xmlns:c16="http://schemas.microsoft.com/office/drawing/2014/chart" uri="{C3380CC4-5D6E-409C-BE32-E72D297353CC}">
                 <c16:uniqueId val="{00000005-3EB7-4374-AE9A-D38B071EA406}"/>
               </c:ext>
@@ -277,7 +281,7 @@
                 </a:outerShdw>
               </a:effectLst>
             </c:spPr>
-            <c:extLst>
+            <c:extLst xmlns:c16r2="http://schemas.microsoft.com/office/drawing/2015/06/chart">
               <c:ext xmlns:c16="http://schemas.microsoft.com/office/drawing/2014/chart" uri="{C3380CC4-5D6E-409C-BE32-E72D297353CC}">
                 <c16:uniqueId val="{00000007-3EB7-4374-AE9A-D38B071EA406}"/>
               </c:ext>
@@ -303,7 +307,7 @@
                 </a:outerShdw>
               </a:effectLst>
             </c:spPr>
-            <c:extLst>
+            <c:extLst xmlns:c16r2="http://schemas.microsoft.com/office/drawing/2015/06/chart">
               <c:ext xmlns:c16="http://schemas.microsoft.com/office/drawing/2014/chart" uri="{C3380CC4-5D6E-409C-BE32-E72D297353CC}">
                 <c16:uniqueId val="{00000009-3EB7-4374-AE9A-D38B071EA406}"/>
               </c:ext>
@@ -329,7 +333,7 @@
                 </a:outerShdw>
               </a:effectLst>
             </c:spPr>
-            <c:extLst>
+            <c:extLst xmlns:c16r2="http://schemas.microsoft.com/office/drawing/2015/06/chart">
               <c:ext xmlns:c16="http://schemas.microsoft.com/office/drawing/2014/chart" uri="{C3380CC4-5D6E-409C-BE32-E72D297353CC}">
                 <c16:uniqueId val="{0000000B-3EB7-4374-AE9A-D38B071EA406}"/>
               </c:ext>
@@ -355,7 +359,7 @@
                 </a:outerShdw>
               </a:effectLst>
             </c:spPr>
-            <c:extLst>
+            <c:extLst xmlns:c16r2="http://schemas.microsoft.com/office/drawing/2015/06/chart">
               <c:ext xmlns:c16="http://schemas.microsoft.com/office/drawing/2014/chart" uri="{C3380CC4-5D6E-409C-BE32-E72D297353CC}">
                 <c16:uniqueId val="{0000000D-3EB7-4374-AE9A-D38B071EA406}"/>
               </c:ext>
@@ -366,8 +370,8 @@
               <c:idx val="0"/>
               <c:layout>
                 <c:manualLayout>
-                  <c:x val="2.6487169015585864E-2"/>
-                  <c:y val="9.9920025544520969E-3"/>
+                  <c:x val="0.0264871690155859"/>
+                  <c:y val="0.0099920025544521"/>
                 </c:manualLayout>
               </c:layout>
               <c:dLblPos val="bestFit"/>
@@ -377,10 +381,12 @@
               <c:showSerName val="0"/>
               <c:showPercent val="0"/>
               <c:showBubbleSize val="0"/>
-              <c:extLst>
-                <c:ext xmlns:c15="http://schemas.microsoft.com/office/drawing/2012/chart" uri="{CE6537A1-D6FC-4f65-9D91-7224C49458BB}"/>
+              <c:extLst xmlns:c16r2="http://schemas.microsoft.com/office/drawing/2015/06/chart">
                 <c:ext xmlns:c16="http://schemas.microsoft.com/office/drawing/2014/chart" uri="{C3380CC4-5D6E-409C-BE32-E72D297353CC}">
                   <c16:uniqueId val="{00000001-3EB7-4374-AE9A-D38B071EA406}"/>
+                </c:ext>
+                <c:ext xmlns:c15="http://schemas.microsoft.com/office/drawing/2012/chart" uri="{CE6537A1-D6FC-4f65-9D91-7224C49458BB}">
+                  <c15:layout/>
                 </c:ext>
               </c:extLst>
             </c:dLbl>
@@ -388,8 +394,8 @@
               <c:idx val="1"/>
               <c:layout>
                 <c:manualLayout>
-                  <c:x val="-4.3994287825218859E-2"/>
-                  <c:y val="7.402995863798033E-3"/>
+                  <c:x val="-0.0439942878252189"/>
+                  <c:y val="0.00740299586379803"/>
                 </c:manualLayout>
               </c:layout>
               <c:dLblPos val="bestFit"/>
@@ -399,10 +405,12 @@
               <c:showSerName val="0"/>
               <c:showPercent val="0"/>
               <c:showBubbleSize val="0"/>
-              <c:extLst>
-                <c:ext xmlns:c15="http://schemas.microsoft.com/office/drawing/2012/chart" uri="{CE6537A1-D6FC-4f65-9D91-7224C49458BB}"/>
+              <c:extLst xmlns:c16r2="http://schemas.microsoft.com/office/drawing/2015/06/chart">
                 <c:ext xmlns:c16="http://schemas.microsoft.com/office/drawing/2014/chart" uri="{C3380CC4-5D6E-409C-BE32-E72D297353CC}">
                   <c16:uniqueId val="{00000003-3EB7-4374-AE9A-D38B071EA406}"/>
+                </c:ext>
+                <c:ext xmlns:c15="http://schemas.microsoft.com/office/drawing/2012/chart" uri="{CE6537A1-D6FC-4f65-9D91-7224C49458BB}">
+                  <c15:layout/>
                 </c:ext>
               </c:extLst>
             </c:dLbl>
@@ -410,8 +418,8 @@
               <c:idx val="2"/>
               <c:layout>
                 <c:manualLayout>
-                  <c:x val="-1.5070201813048597E-2"/>
-                  <c:y val="-4.1828598924410099E-2"/>
+                  <c:x val="-0.0150702018130486"/>
+                  <c:y val="-0.0418285989244101"/>
                 </c:manualLayout>
               </c:layout>
               <c:dLblPos val="bestFit"/>
@@ -421,10 +429,12 @@
               <c:showSerName val="0"/>
               <c:showPercent val="0"/>
               <c:showBubbleSize val="0"/>
-              <c:extLst>
-                <c:ext xmlns:c15="http://schemas.microsoft.com/office/drawing/2012/chart" uri="{CE6537A1-D6FC-4f65-9D91-7224C49458BB}"/>
+              <c:extLst xmlns:c16r2="http://schemas.microsoft.com/office/drawing/2015/06/chart">
                 <c:ext xmlns:c16="http://schemas.microsoft.com/office/drawing/2014/chart" uri="{C3380CC4-5D6E-409C-BE32-E72D297353CC}">
                   <c16:uniqueId val="{00000005-3EB7-4374-AE9A-D38B071EA406}"/>
+                </c:ext>
+                <c:ext xmlns:c15="http://schemas.microsoft.com/office/drawing/2012/chart" uri="{CE6537A1-D6FC-4f65-9D91-7224C49458BB}">
+                  <c15:layout/>
                 </c:ext>
               </c:extLst>
             </c:dLbl>
@@ -432,8 +442,8 @@
               <c:idx val="3"/>
               <c:layout>
                 <c:manualLayout>
-                  <c:x val="-1.1740542208336695E-5"/>
-                  <c:y val="7.4171689855685896E-2"/>
+                  <c:x val="-1.17405422083367E-5"/>
+                  <c:y val="0.0741716898556859"/>
                 </c:manualLayout>
               </c:layout>
               <c:dLblPos val="bestFit"/>
@@ -443,10 +453,12 @@
               <c:showSerName val="0"/>
               <c:showPercent val="0"/>
               <c:showBubbleSize val="0"/>
-              <c:extLst>
-                <c:ext xmlns:c15="http://schemas.microsoft.com/office/drawing/2012/chart" uri="{CE6537A1-D6FC-4f65-9D91-7224C49458BB}"/>
+              <c:extLst xmlns:c16r2="http://schemas.microsoft.com/office/drawing/2015/06/chart">
                 <c:ext xmlns:c16="http://schemas.microsoft.com/office/drawing/2014/chart" uri="{C3380CC4-5D6E-409C-BE32-E72D297353CC}">
                   <c16:uniqueId val="{00000007-3EB7-4374-AE9A-D38B071EA406}"/>
+                </c:ext>
+                <c:ext xmlns:c15="http://schemas.microsoft.com/office/drawing/2012/chart" uri="{CE6537A1-D6FC-4f65-9D91-7224C49458BB}">
+                  <c15:layout/>
                 </c:ext>
               </c:extLst>
             </c:dLbl>
@@ -454,8 +466,8 @@
               <c:idx val="4"/>
               <c:layout>
                 <c:manualLayout>
-                  <c:x val="-6.9151170036322485E-2"/>
-                  <c:y val="9.6994825398137294E-2"/>
+                  <c:x val="-0.0691511700363225"/>
+                  <c:y val="0.0969948253981373"/>
                 </c:manualLayout>
               </c:layout>
               <c:dLblPos val="bestFit"/>
@@ -465,10 +477,12 @@
               <c:showSerName val="0"/>
               <c:showPercent val="0"/>
               <c:showBubbleSize val="0"/>
-              <c:extLst>
-                <c:ext xmlns:c15="http://schemas.microsoft.com/office/drawing/2012/chart" uri="{CE6537A1-D6FC-4f65-9D91-7224C49458BB}"/>
+              <c:extLst xmlns:c16r2="http://schemas.microsoft.com/office/drawing/2015/06/chart">
                 <c:ext xmlns:c16="http://schemas.microsoft.com/office/drawing/2014/chart" uri="{C3380CC4-5D6E-409C-BE32-E72D297353CC}">
                   <c16:uniqueId val="{00000009-3EB7-4374-AE9A-D38B071EA406}"/>
+                </c:ext>
+                <c:ext xmlns:c15="http://schemas.microsoft.com/office/drawing/2012/chart" uri="{CE6537A1-D6FC-4f65-9D91-7224C49458BB}">
+                  <c15:layout/>
                 </c:ext>
               </c:extLst>
             </c:dLbl>
@@ -476,8 +490,8 @@
               <c:idx val="5"/>
               <c:layout>
                 <c:manualLayout>
-                  <c:x val="2.5554578524679683E-2"/>
-                  <c:y val="-0.29123124494697239"/>
+                  <c:x val="0.0255545785246797"/>
+                  <c:y val="-0.291231244946972"/>
                 </c:manualLayout>
               </c:layout>
               <c:dLblPos val="bestFit"/>
@@ -487,10 +501,12 @@
               <c:showSerName val="0"/>
               <c:showPercent val="0"/>
               <c:showBubbleSize val="0"/>
-              <c:extLst>
-                <c:ext xmlns:c15="http://schemas.microsoft.com/office/drawing/2012/chart" uri="{CE6537A1-D6FC-4f65-9D91-7224C49458BB}"/>
+              <c:extLst xmlns:c16r2="http://schemas.microsoft.com/office/drawing/2015/06/chart">
                 <c:ext xmlns:c16="http://schemas.microsoft.com/office/drawing/2014/chart" uri="{C3380CC4-5D6E-409C-BE32-E72D297353CC}">
                   <c16:uniqueId val="{0000000B-3EB7-4374-AE9A-D38B071EA406}"/>
+                </c:ext>
+                <c:ext xmlns:c15="http://schemas.microsoft.com/office/drawing/2012/chart" uri="{CE6537A1-D6FC-4f65-9D91-7224C49458BB}">
+                  <c15:layout/>
                 </c:ext>
               </c:extLst>
             </c:dLbl>
@@ -498,8 +514,8 @@
               <c:idx val="6"/>
               <c:layout>
                 <c:manualLayout>
-                  <c:x val="6.5006523411921924E-2"/>
-                  <c:y val="0.12339413799209517"/>
+                  <c:x val="0.0650065234119219"/>
+                  <c:y val="0.123394137992095"/>
                 </c:manualLayout>
               </c:layout>
               <c:dLblPos val="bestFit"/>
@@ -509,10 +525,12 @@
               <c:showSerName val="0"/>
               <c:showPercent val="0"/>
               <c:showBubbleSize val="0"/>
-              <c:extLst>
-                <c:ext xmlns:c15="http://schemas.microsoft.com/office/drawing/2012/chart" uri="{CE6537A1-D6FC-4f65-9D91-7224C49458BB}"/>
+              <c:extLst xmlns:c16r2="http://schemas.microsoft.com/office/drawing/2015/06/chart">
                 <c:ext xmlns:c16="http://schemas.microsoft.com/office/drawing/2014/chart" uri="{C3380CC4-5D6E-409C-BE32-E72D297353CC}">
                   <c16:uniqueId val="{0000000D-3EB7-4374-AE9A-D38B071EA406}"/>
+                </c:ext>
+                <c:ext xmlns:c15="http://schemas.microsoft.com/office/drawing/2012/chart" uri="{CE6537A1-D6FC-4f65-9D91-7224C49458BB}">
+                  <c15:layout/>
                 </c:ext>
               </c:extLst>
             </c:dLbl>
@@ -558,7 +576,7 @@
                     <a:cs typeface="+mn-cs"/>
                   </a:defRPr>
                 </a:pPr>
-                <a:endParaRPr lang="it-IT"/>
+                <a:endParaRPr lang="en-US"/>
               </a:p>
             </c:txPr>
             <c:dLblPos val="ctr"/>
@@ -569,7 +587,7 @@
             <c:showPercent val="0"/>
             <c:showBubbleSize val="0"/>
             <c:showLeaderLines val="0"/>
-            <c:extLst>
+            <c:extLst xmlns:c16r2="http://schemas.microsoft.com/office/drawing/2015/06/chart">
               <c:ext xmlns:c15="http://schemas.microsoft.com/office/drawing/2012/chart" uri="{CE6537A1-D6FC-4f65-9D91-7224C49458BB}"/>
             </c:extLst>
           </c:dLbls>
@@ -609,30 +627,30 @@
                 <c:formatCode>0.00</c:formatCode>
                 <c:ptCount val="7"/>
                 <c:pt idx="0">
-                  <c:v>0.14292520247737017</c:v>
+                  <c:v>0.14292520247737</c:v>
                 </c:pt>
                 <c:pt idx="1">
-                  <c:v>0</c:v>
+                  <c:v>0.0</c:v>
                 </c:pt>
                 <c:pt idx="2">
-                  <c:v>0.23820867079561697</c:v>
+                  <c:v>0.238208670795617</c:v>
                 </c:pt>
                 <c:pt idx="3">
-                  <c:v>3.1919961886612676</c:v>
+                  <c:v>3.191996188661268</c:v>
                 </c:pt>
                 <c:pt idx="4">
-                  <c:v>13.244402096236305</c:v>
+                  <c:v>13.24440209623631</c:v>
                 </c:pt>
                 <c:pt idx="5">
-                  <c:v>69.080514530728919</c:v>
+                  <c:v>69.08051453072892</c:v>
                 </c:pt>
                 <c:pt idx="6">
-                  <c:v>14.101953311100523</c:v>
+                  <c:v>14.10195331110052</c:v>
                 </c:pt>
               </c:numCache>
             </c:numRef>
           </c:val>
-          <c:extLst>
+          <c:extLst xmlns:c16r2="http://schemas.microsoft.com/office/drawing/2015/06/chart">
             <c:ext xmlns:c16="http://schemas.microsoft.com/office/drawing/2014/chart" uri="{C3380CC4-5D6E-409C-BE32-E72D297353CC}">
               <c16:uniqueId val="{0000000E-3EB7-4374-AE9A-D38B071EA406}"/>
             </c:ext>
@@ -664,10 +682,10 @@
         <c:manualLayout>
           <c:xMode val="edge"/>
           <c:yMode val="edge"/>
-          <c:x val="0.84710512569058283"/>
-          <c:y val="0.3711637325549576"/>
-          <c:w val="0.14164415785139073"/>
-          <c:h val="0.26693988871659219"/>
+          <c:x val="0.847105125690583"/>
+          <c:y val="0.371163732554958"/>
+          <c:w val="0.141644157851391"/>
+          <c:h val="0.266939888716592"/>
         </c:manualLayout>
       </c:layout>
       <c:overlay val="0"/>
@@ -700,20 +718,20 @@
               <a:cs typeface="+mn-cs"/>
             </a:defRPr>
           </a:pPr>
-          <a:endParaRPr lang="it-IT"/>
+          <a:endParaRPr lang="en-US"/>
         </a:p>
       </c:txPr>
     </c:legend>
     <c:plotVisOnly val="1"/>
     <c:dispBlanksAs val="gap"/>
-    <c:extLst>
+    <c:showDLblsOverMax val="0"/>
+    <c:extLst xmlns:c16r2="http://schemas.microsoft.com/office/drawing/2015/06/chart">
       <c:ext xmlns:c16r3="http://schemas.microsoft.com/office/drawing/2017/03/chart" uri="{56B9EC1D-385E-4148-901F-78D8002777C0}">
         <c16r3:dataDisplayOptions16>
           <c16r3:dispNaAsBlank val="1"/>
         </c16r3:dataDisplayOptions16>
       </c:ext>
     </c:extLst>
-    <c:showDLblsOverMax val="0"/>
   </c:chart>
   <c:spPr>
     <a:solidFill>
@@ -732,7 +750,7 @@
       <a:pPr>
         <a:defRPr/>
       </a:pPr>
-      <a:endParaRPr lang="it-IT"/>
+      <a:endParaRPr lang="en-US"/>
     </a:p>
   </c:txPr>
   <c:externalData r:id="rId3">
@@ -742,9 +760,9 @@
 </file>
 
 <file path=ppt/charts/chart2.xml><?xml version="1.0" encoding="utf-8"?>
-<c:chartSpace xmlns:c="http://schemas.openxmlformats.org/drawingml/2006/chart" xmlns:a="http://schemas.openxmlformats.org/drawingml/2006/main" xmlns:r="http://schemas.openxmlformats.org/officeDocument/2006/relationships" xmlns:c16r2="http://schemas.microsoft.com/office/drawing/2015/06/chart">
+<c:chartSpace xmlns:c="http://schemas.openxmlformats.org/drawingml/2006/chart" xmlns:a="http://schemas.openxmlformats.org/drawingml/2006/main" xmlns:r="http://schemas.openxmlformats.org/officeDocument/2006/relationships">
   <c:date1904 val="0"/>
-  <c:lang val="it-IT"/>
+  <c:lang val="en-US"/>
   <c:roundedCorners val="0"/>
   <mc:AlternateContent xmlns:mc="http://schemas.openxmlformats.org/markup-compatibility/2006">
     <mc:Choice xmlns:c14="http://schemas.microsoft.com/office/drawing/2007/8/2/chart" Requires="c14">
@@ -816,6 +834,14 @@
           </a:p>
         </c:rich>
       </c:tx>
+      <c:layout>
+        <c:manualLayout>
+          <c:xMode val="edge"/>
+          <c:yMode val="edge"/>
+          <c:x val="0.196933365826958"/>
+          <c:y val="0.0656887142730581"/>
+        </c:manualLayout>
+      </c:layout>
       <c:overlay val="0"/>
       <c:spPr>
         <a:noFill/>
@@ -847,7 +873,7 @@
               <a:cs typeface="+mn-cs"/>
             </a:defRPr>
           </a:pPr>
-          <a:endParaRPr lang="it-IT"/>
+          <a:endParaRPr lang="en-US"/>
         </a:p>
       </c:txPr>
     </c:title>
@@ -897,10 +923,10 @@
           <c:layoutTarget val="inner"/>
           <c:xMode val="edge"/>
           <c:yMode val="edge"/>
-          <c:x val="5.4496289182943296E-2"/>
-          <c:y val="4.4820271710172575E-2"/>
-          <c:w val="0.84995867378302836"/>
-          <c:h val="0.74031115938681746"/>
+          <c:x val="0.0780364373448454"/>
+          <c:y val="0.114599021658576"/>
+          <c:w val="0.842940206692913"/>
+          <c:h val="0.740311159386817"/>
         </c:manualLayout>
       </c:layout>
       <c:bar3DChart>
@@ -990,7 +1016,7 @@
                     <a:cs typeface="+mn-cs"/>
                   </a:defRPr>
                 </a:pPr>
-                <a:endParaRPr lang="it-IT"/>
+                <a:endParaRPr lang="en-US"/>
               </a:p>
             </c:txPr>
             <c:showLegendKey val="0"/>
@@ -1000,8 +1026,9 @@
             <c:showPercent val="0"/>
             <c:showBubbleSize val="0"/>
             <c:showLeaderLines val="0"/>
-            <c:extLst>
+            <c:extLst xmlns:c16r2="http://schemas.microsoft.com/office/drawing/2015/06/chart">
               <c:ext xmlns:c15="http://schemas.microsoft.com/office/drawing/2012/chart" uri="{CE6537A1-D6FC-4f65-9D91-7224C49458BB}">
+                <c15:layout/>
                 <c15:showLeaderLines val="1"/>
                 <c15:leaderLines>
                   <c:spPr>
@@ -1172,30 +1199,30 @@
                 <c:formatCode>0.00</c:formatCode>
                 <c:ptCount val="7"/>
                 <c:pt idx="0">
-                  <c:v>0</c:v>
+                  <c:v>0.0</c:v>
                 </c:pt>
                 <c:pt idx="1">
-                  <c:v>3.6666666666666665</c:v>
+                  <c:v>3.666666666666666</c:v>
                 </c:pt>
                 <c:pt idx="2">
-                  <c:v>3</c:v>
+                  <c:v>3.0</c:v>
                 </c:pt>
                 <c:pt idx="3">
-                  <c:v>5</c:v>
+                  <c:v>5.0</c:v>
                 </c:pt>
                 <c:pt idx="4">
-                  <c:v>3.3333333333333335</c:v>
+                  <c:v>3.333333333333333</c:v>
                 </c:pt>
                 <c:pt idx="5">
                   <c:v>6.666666666666667</c:v>
                 </c:pt>
                 <c:pt idx="6">
-                  <c:v>0.66666666666666674</c:v>
+                  <c:v>0.666666666666667</c:v>
                 </c:pt>
               </c:numCache>
             </c:numRef>
           </c:val>
-          <c:extLst>
+          <c:extLst xmlns:c16r2="http://schemas.microsoft.com/office/drawing/2015/06/chart">
             <c:ext xmlns:c16="http://schemas.microsoft.com/office/drawing/2014/chart" uri="{C3380CC4-5D6E-409C-BE32-E72D297353CC}">
               <c16:uniqueId val="{00000000-423C-4C6D-B94D-14E3703AD4DB}"/>
             </c:ext>
@@ -1284,7 +1311,7 @@
                     <a:cs typeface="+mn-cs"/>
                   </a:defRPr>
                 </a:pPr>
-                <a:endParaRPr lang="it-IT"/>
+                <a:endParaRPr lang="en-US"/>
               </a:p>
             </c:txPr>
             <c:showLegendKey val="0"/>
@@ -1294,8 +1321,9 @@
             <c:showPercent val="0"/>
             <c:showBubbleSize val="0"/>
             <c:showLeaderLines val="0"/>
-            <c:extLst>
+            <c:extLst xmlns:c16r2="http://schemas.microsoft.com/office/drawing/2015/06/chart">
               <c:ext xmlns:c15="http://schemas.microsoft.com/office/drawing/2012/chart" uri="{CE6537A1-D6FC-4f65-9D91-7224C49458BB}">
+                <c15:layout/>
                 <c15:showLeaderLines val="1"/>
                 <c15:leaderLines>
                   <c:spPr>
@@ -1466,30 +1494,30 @@
                 <c:formatCode>0.00</c:formatCode>
                 <c:ptCount val="7"/>
                 <c:pt idx="0">
-                  <c:v>1.6722408026755853</c:v>
+                  <c:v>1.672240802675585</c:v>
                 </c:pt>
                 <c:pt idx="1">
                   <c:v>4.666666666666667</c:v>
                 </c:pt>
                 <c:pt idx="2">
-                  <c:v>6.3333333333333339</c:v>
+                  <c:v>6.333333333333334</c:v>
                 </c:pt>
                 <c:pt idx="3">
-                  <c:v>9</c:v>
+                  <c:v>9.0</c:v>
                 </c:pt>
                 <c:pt idx="4">
-                  <c:v>20.666666666666668</c:v>
+                  <c:v>20.66666666666667</c:v>
                 </c:pt>
                 <c:pt idx="5">
-                  <c:v>49.666666666666664</c:v>
+                  <c:v>49.66666666666665</c:v>
                 </c:pt>
                 <c:pt idx="6">
-                  <c:v>0.66666666666666674</c:v>
+                  <c:v>0.666666666666667</c:v>
                 </c:pt>
               </c:numCache>
             </c:numRef>
           </c:val>
-          <c:extLst>
+          <c:extLst xmlns:c16r2="http://schemas.microsoft.com/office/drawing/2015/06/chart">
             <c:ext xmlns:c16="http://schemas.microsoft.com/office/drawing/2014/chart" uri="{C3380CC4-5D6E-409C-BE32-E72D297353CC}">
               <c16:uniqueId val="{00000001-423C-4C6D-B94D-14E3703AD4DB}"/>
             </c:ext>
@@ -1578,7 +1606,7 @@
                     <a:cs typeface="+mn-cs"/>
                   </a:defRPr>
                 </a:pPr>
-                <a:endParaRPr lang="it-IT"/>
+                <a:endParaRPr lang="en-US"/>
               </a:p>
             </c:txPr>
             <c:showLegendKey val="0"/>
@@ -1588,8 +1616,9 @@
             <c:showPercent val="0"/>
             <c:showBubbleSize val="0"/>
             <c:showLeaderLines val="0"/>
-            <c:extLst>
+            <c:extLst xmlns:c16r2="http://schemas.microsoft.com/office/drawing/2015/06/chart">
               <c:ext xmlns:c15="http://schemas.microsoft.com/office/drawing/2012/chart" uri="{CE6537A1-D6FC-4f65-9D91-7224C49458BB}">
+                <c15:layout/>
                 <c15:showLeaderLines val="1"/>
                 <c15:leaderLines>
                   <c:spPr>
@@ -1760,30 +1789,30 @@
                 <c:formatCode>0.00</c:formatCode>
                 <c:ptCount val="7"/>
                 <c:pt idx="0">
-                  <c:v>5.0167224080267561</c:v>
+                  <c:v>5.016722408026756</c:v>
                 </c:pt>
                 <c:pt idx="1">
-                  <c:v>21.666666666666668</c:v>
+                  <c:v>21.66666666666667</c:v>
                 </c:pt>
                 <c:pt idx="2">
-                  <c:v>15</c:v>
+                  <c:v>15.0</c:v>
                 </c:pt>
                 <c:pt idx="3">
-                  <c:v>27</c:v>
+                  <c:v>27.0</c:v>
                 </c:pt>
                 <c:pt idx="4">
-                  <c:v>24.333333333333336</c:v>
+                  <c:v>24.33333333333333</c:v>
                 </c:pt>
                 <c:pt idx="5">
-                  <c:v>0</c:v>
+                  <c:v>0.0</c:v>
                 </c:pt>
                 <c:pt idx="6">
-                  <c:v>5.6666666666666661</c:v>
+                  <c:v>5.666666666666666</c:v>
                 </c:pt>
               </c:numCache>
             </c:numRef>
           </c:val>
-          <c:extLst>
+          <c:extLst xmlns:c16r2="http://schemas.microsoft.com/office/drawing/2015/06/chart">
             <c:ext xmlns:c16="http://schemas.microsoft.com/office/drawing/2014/chart" uri="{C3380CC4-5D6E-409C-BE32-E72D297353CC}">
               <c16:uniqueId val="{00000002-423C-4C6D-B94D-14E3703AD4DB}"/>
             </c:ext>
@@ -1872,7 +1901,7 @@
                     <a:cs typeface="+mn-cs"/>
                   </a:defRPr>
                 </a:pPr>
-                <a:endParaRPr lang="it-IT"/>
+                <a:endParaRPr lang="en-US"/>
               </a:p>
             </c:txPr>
             <c:showLegendKey val="0"/>
@@ -1882,8 +1911,9 @@
             <c:showPercent val="0"/>
             <c:showBubbleSize val="0"/>
             <c:showLeaderLines val="0"/>
-            <c:extLst>
+            <c:extLst xmlns:c16r2="http://schemas.microsoft.com/office/drawing/2015/06/chart">
               <c:ext xmlns:c15="http://schemas.microsoft.com/office/drawing/2012/chart" uri="{CE6537A1-D6FC-4f65-9D91-7224C49458BB}">
+                <c15:layout/>
                 <c15:showLeaderLines val="1"/>
                 <c15:leaderLines>
                   <c:spPr>
@@ -2054,30 +2084,30 @@
                 <c:formatCode>0.00</c:formatCode>
                 <c:ptCount val="7"/>
                 <c:pt idx="0">
-                  <c:v>92.976588628762542</c:v>
+                  <c:v>92.97658862876254</c:v>
                 </c:pt>
                 <c:pt idx="1">
-                  <c:v>68.666666666666671</c:v>
+                  <c:v>68.66666666666667</c:v>
                 </c:pt>
                 <c:pt idx="2">
-                  <c:v>75.333333333333329</c:v>
+                  <c:v>75.33333333333331</c:v>
                 </c:pt>
                 <c:pt idx="3">
-                  <c:v>59</c:v>
+                  <c:v>59.0</c:v>
                 </c:pt>
                 <c:pt idx="4">
-                  <c:v>51.666666666666671</c:v>
+                  <c:v>51.66666666666666</c:v>
                 </c:pt>
                 <c:pt idx="5">
-                  <c:v>43</c:v>
+                  <c:v>43.0</c:v>
                 </c:pt>
                 <c:pt idx="6">
-                  <c:v>93</c:v>
+                  <c:v>93.0</c:v>
                 </c:pt>
               </c:numCache>
             </c:numRef>
           </c:val>
-          <c:extLst>
+          <c:extLst xmlns:c16r2="http://schemas.microsoft.com/office/drawing/2015/06/chart">
             <c:ext xmlns:c16="http://schemas.microsoft.com/office/drawing/2014/chart" uri="{C3380CC4-5D6E-409C-BE32-E72D297353CC}">
               <c16:uniqueId val="{00000003-423C-4C6D-B94D-14E3703AD4DB}"/>
             </c:ext>
@@ -2093,48 +2123,22 @@
         </c:dLbls>
         <c:gapWidth val="150"/>
         <c:shape val="box"/>
-        <c:axId val="527525512"/>
-        <c:axId val="424154184"/>
-        <c:axId val="424816952"/>
+        <c:axId val="457547744"/>
+        <c:axId val="457550496"/>
+        <c:axId val="285092096"/>
       </c:bar3DChart>
       <c:catAx>
-        <c:axId val="527525512"/>
+        <c:axId val="457547744"/>
         <c:scaling>
           <c:orientation val="minMax"/>
         </c:scaling>
-        <c:delete val="0"/>
+        <c:delete val="1"/>
         <c:axPos val="b"/>
         <c:numFmt formatCode="General" sourceLinked="1"/>
         <c:majorTickMark val="none"/>
         <c:minorTickMark val="none"/>
         <c:tickLblPos val="nextTo"/>
-        <c:spPr>
-          <a:noFill/>
-          <a:ln>
-            <a:noFill/>
-          </a:ln>
-          <a:effectLst/>
-        </c:spPr>
-        <c:txPr>
-          <a:bodyPr rot="-60000000" spcFirstLastPara="1" vertOverflow="ellipsis" vert="horz" wrap="square" anchor="ctr" anchorCtr="1"/>
-          <a:lstStyle/>
-          <a:p>
-            <a:pPr>
-              <a:defRPr sz="1197" b="0" i="0" u="none" strike="noStrike" kern="1200" baseline="0">
-                <a:solidFill>
-                  <a:schemeClr val="lt1">
-                    <a:lumMod val="85000"/>
-                  </a:schemeClr>
-                </a:solidFill>
-                <a:latin typeface="+mn-lt"/>
-                <a:ea typeface="+mn-ea"/>
-                <a:cs typeface="+mn-cs"/>
-              </a:defRPr>
-            </a:pPr>
-            <a:endParaRPr lang="it-IT"/>
-          </a:p>
-        </c:txPr>
-        <c:crossAx val="424154184"/>
+        <c:crossAx val="457550496"/>
         <c:crosses val="autoZero"/>
         <c:auto val="1"/>
         <c:lblAlgn val="ctr"/>
@@ -2142,7 +2146,7 @@
         <c:noMultiLvlLbl val="0"/>
       </c:catAx>
       <c:valAx>
-        <c:axId val="424154184"/>
+        <c:axId val="457550496"/>
         <c:scaling>
           <c:orientation val="minMax"/>
         </c:scaling>
@@ -2189,15 +2193,15 @@
                 <a:cs typeface="+mn-cs"/>
               </a:defRPr>
             </a:pPr>
-            <a:endParaRPr lang="it-IT"/>
+            <a:endParaRPr lang="en-US"/>
           </a:p>
         </c:txPr>
-        <c:crossAx val="527525512"/>
+        <c:crossAx val="457547744"/>
         <c:crosses val="autoZero"/>
         <c:crossBetween val="between"/>
       </c:valAx>
       <c:serAx>
-        <c:axId val="424816952"/>
+        <c:axId val="285092096"/>
         <c:scaling>
           <c:orientation val="minMax"/>
         </c:scaling>
@@ -2229,10 +2233,10 @@
                 <a:cs typeface="+mn-cs"/>
               </a:defRPr>
             </a:pPr>
-            <a:endParaRPr lang="it-IT"/>
+            <a:endParaRPr lang="en-US"/>
           </a:p>
         </c:txPr>
-        <c:crossAx val="424154184"/>
+        <c:crossAx val="457550496"/>
         <c:crosses val="autoZero"/>
       </c:serAx>
       <c:spPr>
@@ -2245,13 +2249,762 @@
     </c:plotArea>
     <c:plotVisOnly val="1"/>
     <c:dispBlanksAs val="gap"/>
-    <c:extLst>
+    <c:showDLblsOverMax val="0"/>
+    <c:extLst xmlns:c16r2="http://schemas.microsoft.com/office/drawing/2015/06/chart">
       <c:ext xmlns:c16r3="http://schemas.microsoft.com/office/drawing/2017/03/chart" uri="{56B9EC1D-385E-4148-901F-78D8002777C0}">
         <c16r3:dataDisplayOptions16>
           <c16r3:dispNaAsBlank val="1"/>
         </c16r3:dataDisplayOptions16>
       </c:ext>
     </c:extLst>
+  </c:chart>
+  <c:spPr>
+    <a:gradFill flip="none" rotWithShape="1">
+      <a:gsLst>
+        <a:gs pos="0">
+          <a:schemeClr val="dk1">
+            <a:lumMod val="65000"/>
+            <a:lumOff val="35000"/>
+          </a:schemeClr>
+        </a:gs>
+        <a:gs pos="100000">
+          <a:schemeClr val="dk1">
+            <a:lumMod val="85000"/>
+            <a:lumOff val="15000"/>
+          </a:schemeClr>
+        </a:gs>
+      </a:gsLst>
+      <a:path path="circle">
+        <a:fillToRect l="50000" t="50000" r="50000" b="50000"/>
+      </a:path>
+      <a:tileRect/>
+    </a:gradFill>
+    <a:ln>
+      <a:noFill/>
+    </a:ln>
+    <a:effectLst/>
+  </c:spPr>
+  <c:txPr>
+    <a:bodyPr/>
+    <a:lstStyle/>
+    <a:p>
+      <a:pPr>
+        <a:defRPr/>
+      </a:pPr>
+      <a:endParaRPr lang="en-US"/>
+    </a:p>
+  </c:txPr>
+  <c:externalData r:id="rId3">
+    <c:autoUpdate val="0"/>
+  </c:externalData>
+  <c:userShapes r:id="rId4"/>
+</c:chartSpace>
+</file>
+
+<file path=ppt/charts/chart3.xml><?xml version="1.0" encoding="utf-8"?>
+<c:chartSpace xmlns:c="http://schemas.openxmlformats.org/drawingml/2006/chart" xmlns:a="http://schemas.openxmlformats.org/drawingml/2006/main" xmlns:r="http://schemas.openxmlformats.org/officeDocument/2006/relationships">
+  <c:date1904 val="0"/>
+  <c:lang val="en-US"/>
+  <c:roundedCorners val="0"/>
+  <mc:AlternateContent xmlns:mc="http://schemas.openxmlformats.org/markup-compatibility/2006">
+    <mc:Choice xmlns:c14="http://schemas.microsoft.com/office/drawing/2007/8/2/chart" Requires="c14">
+      <c14:style val="102"/>
+    </mc:Choice>
+    <mc:Fallback>
+      <c:style val="2"/>
+    </mc:Fallback>
+  </mc:AlternateContent>
+  <c:chart>
+    <c:title>
+      <c:tx>
+        <c:rich>
+          <a:bodyPr rot="0" spcFirstLastPara="1" vertOverflow="ellipsis" vert="horz" wrap="square" anchor="ctr" anchorCtr="1"/>
+          <a:lstStyle/>
+          <a:p>
+            <a:pPr>
+              <a:defRPr sz="2128" b="1" i="0" u="none" strike="noStrike" kern="1200" spc="100" baseline="0">
+                <a:solidFill>
+                  <a:schemeClr val="lt1">
+                    <a:lumMod val="95000"/>
+                  </a:schemeClr>
+                </a:solidFill>
+                <a:effectLst>
+                  <a:outerShdw blurRad="50800" dist="38100" dir="5400000" algn="t" rotWithShape="0">
+                    <a:prstClr val="black">
+                      <a:alpha val="40000"/>
+                    </a:prstClr>
+                  </a:outerShdw>
+                </a:effectLst>
+                <a:latin typeface="+mn-lt"/>
+                <a:ea typeface="+mn-ea"/>
+                <a:cs typeface="+mn-cs"/>
+              </a:defRPr>
+            </a:pPr>
+            <a:r>
+              <a:rPr lang="en-US" dirty="0"/>
+              <a:t>Execution </a:t>
+            </a:r>
+            <a:r>
+              <a:rPr lang="en-US" dirty="0" smtClean="0"/>
+              <a:t>Time during development for each instances</a:t>
+            </a:r>
+            <a:endParaRPr lang="en-US" dirty="0"/>
+          </a:p>
+        </c:rich>
+      </c:tx>
+      <c:layout/>
+      <c:overlay val="0"/>
+      <c:spPr>
+        <a:noFill/>
+        <a:ln>
+          <a:noFill/>
+        </a:ln>
+        <a:effectLst/>
+      </c:spPr>
+      <c:txPr>
+        <a:bodyPr rot="0" spcFirstLastPara="1" vertOverflow="ellipsis" vert="horz" wrap="square" anchor="ctr" anchorCtr="1"/>
+        <a:lstStyle/>
+        <a:p>
+          <a:pPr>
+            <a:defRPr sz="2128" b="1" i="0" u="none" strike="noStrike" kern="1200" spc="100" baseline="0">
+              <a:solidFill>
+                <a:schemeClr val="lt1">
+                  <a:lumMod val="95000"/>
+                </a:schemeClr>
+              </a:solidFill>
+              <a:effectLst>
+                <a:outerShdw blurRad="50800" dist="38100" dir="5400000" algn="t" rotWithShape="0">
+                  <a:prstClr val="black">
+                    <a:alpha val="40000"/>
+                  </a:prstClr>
+                </a:outerShdw>
+              </a:effectLst>
+              <a:latin typeface="+mn-lt"/>
+              <a:ea typeface="+mn-ea"/>
+              <a:cs typeface="+mn-cs"/>
+            </a:defRPr>
+          </a:pPr>
+          <a:endParaRPr lang="en-US"/>
+        </a:p>
+      </c:txPr>
+    </c:title>
+    <c:autoTitleDeleted val="0"/>
+    <c:plotArea>
+      <c:layout/>
+      <c:barChart>
+        <c:barDir val="col"/>
+        <c:grouping val="clustered"/>
+        <c:varyColors val="0"/>
+        <c:ser>
+          <c:idx val="4"/>
+          <c:order val="0"/>
+          <c:tx>
+            <c:v>v0.1</c:v>
+          </c:tx>
+          <c:spPr>
+            <a:gradFill rotWithShape="1">
+              <a:gsLst>
+                <a:gs pos="0">
+                  <a:schemeClr val="accent5">
+                    <a:tint val="98000"/>
+                    <a:satMod val="110000"/>
+                    <a:lumMod val="104000"/>
+                  </a:schemeClr>
+                </a:gs>
+                <a:gs pos="69000">
+                  <a:schemeClr val="accent5">
+                    <a:shade val="84000"/>
+                    <a:satMod val="130000"/>
+                    <a:lumMod val="92000"/>
+                  </a:schemeClr>
+                </a:gs>
+                <a:gs pos="100000">
+                  <a:schemeClr val="accent5">
+                    <a:shade val="76000"/>
+                    <a:satMod val="130000"/>
+                    <a:lumMod val="88000"/>
+                  </a:schemeClr>
+                </a:gs>
+              </a:gsLst>
+              <a:lin ang="5400000" scaled="0"/>
+            </a:gradFill>
+            <a:ln>
+              <a:noFill/>
+            </a:ln>
+            <a:effectLst>
+              <a:outerShdw blurRad="38100" dist="25400" dir="5400000" rotWithShape="0">
+                <a:srgbClr val="000000">
+                  <a:alpha val="75000"/>
+                </a:srgbClr>
+              </a:outerShdw>
+            </a:effectLst>
+            <a:scene3d>
+              <a:camera prst="orthographicFront">
+                <a:rot lat="0" lon="0" rev="0"/>
+              </a:camera>
+              <a:lightRig rig="threePt" dir="tl"/>
+            </a:scene3d>
+            <a:sp3d>
+              <a:bevelT w="0" h="0"/>
+            </a:sp3d>
+          </c:spPr>
+          <c:invertIfNegative val="0"/>
+          <c:val>
+            <c:numRef>
+              <c:f>Foglio1!$I$4:$I$10</c:f>
+              <c:numCache>
+                <c:formatCode>0.000</c:formatCode>
+                <c:ptCount val="7"/>
+                <c:pt idx="0">
+                  <c:v>176.0</c:v>
+                </c:pt>
+                <c:pt idx="1">
+                  <c:v>50.0</c:v>
+                </c:pt>
+                <c:pt idx="2">
+                  <c:v>55.0</c:v>
+                </c:pt>
+                <c:pt idx="3">
+                  <c:v>13.0</c:v>
+                </c:pt>
+                <c:pt idx="4">
+                  <c:v>18.138</c:v>
+                </c:pt>
+                <c:pt idx="5">
+                  <c:v>5.0</c:v>
+                </c:pt>
+                <c:pt idx="6">
+                  <c:v>15.0</c:v>
+                </c:pt>
+              </c:numCache>
+            </c:numRef>
+          </c:val>
+        </c:ser>
+        <c:ser>
+          <c:idx val="0"/>
+          <c:order val="1"/>
+          <c:tx>
+            <c:v>v0.3</c:v>
+          </c:tx>
+          <c:spPr>
+            <a:gradFill rotWithShape="1">
+              <a:gsLst>
+                <a:gs pos="0">
+                  <a:schemeClr val="accent1">
+                    <a:tint val="98000"/>
+                    <a:satMod val="110000"/>
+                    <a:lumMod val="104000"/>
+                  </a:schemeClr>
+                </a:gs>
+                <a:gs pos="69000">
+                  <a:schemeClr val="accent1">
+                    <a:shade val="84000"/>
+                    <a:satMod val="130000"/>
+                    <a:lumMod val="92000"/>
+                  </a:schemeClr>
+                </a:gs>
+                <a:gs pos="100000">
+                  <a:schemeClr val="accent1">
+                    <a:shade val="76000"/>
+                    <a:satMod val="130000"/>
+                    <a:lumMod val="88000"/>
+                  </a:schemeClr>
+                </a:gs>
+              </a:gsLst>
+              <a:lin ang="5400000" scaled="0"/>
+            </a:gradFill>
+            <a:ln>
+              <a:noFill/>
+            </a:ln>
+            <a:effectLst>
+              <a:outerShdw blurRad="38100" dist="25400" dir="5400000" rotWithShape="0">
+                <a:srgbClr val="000000">
+                  <a:alpha val="75000"/>
+                </a:srgbClr>
+              </a:outerShdw>
+            </a:effectLst>
+            <a:scene3d>
+              <a:camera prst="orthographicFront">
+                <a:rot lat="0" lon="0" rev="0"/>
+              </a:camera>
+              <a:lightRig rig="threePt" dir="tl"/>
+            </a:scene3d>
+            <a:sp3d>
+              <a:bevelT w="0" h="0"/>
+            </a:sp3d>
+          </c:spPr>
+          <c:invertIfNegative val="0"/>
+          <c:val>
+            <c:numRef>
+              <c:f>Foglio1!$K$4:$K$10</c:f>
+              <c:numCache>
+                <c:formatCode>0.000</c:formatCode>
+                <c:ptCount val="7"/>
+                <c:pt idx="0">
+                  <c:v>162.677</c:v>
+                </c:pt>
+                <c:pt idx="1">
+                  <c:v>45.041</c:v>
+                </c:pt>
+                <c:pt idx="2">
+                  <c:v>49.561</c:v>
+                </c:pt>
+                <c:pt idx="3">
+                  <c:v>11.501</c:v>
+                </c:pt>
+                <c:pt idx="4">
+                  <c:v>18.212</c:v>
+                </c:pt>
+                <c:pt idx="5">
+                  <c:v>4.624</c:v>
+                </c:pt>
+                <c:pt idx="6">
+                  <c:v>12.855</c:v>
+                </c:pt>
+              </c:numCache>
+            </c:numRef>
+          </c:val>
+        </c:ser>
+        <c:ser>
+          <c:idx val="1"/>
+          <c:order val="2"/>
+          <c:tx>
+            <c:v>v0.4</c:v>
+          </c:tx>
+          <c:spPr>
+            <a:gradFill rotWithShape="1">
+              <a:gsLst>
+                <a:gs pos="0">
+                  <a:schemeClr val="accent2">
+                    <a:tint val="98000"/>
+                    <a:satMod val="110000"/>
+                    <a:lumMod val="104000"/>
+                  </a:schemeClr>
+                </a:gs>
+                <a:gs pos="69000">
+                  <a:schemeClr val="accent2">
+                    <a:shade val="84000"/>
+                    <a:satMod val="130000"/>
+                    <a:lumMod val="92000"/>
+                  </a:schemeClr>
+                </a:gs>
+                <a:gs pos="100000">
+                  <a:schemeClr val="accent2">
+                    <a:shade val="76000"/>
+                    <a:satMod val="130000"/>
+                    <a:lumMod val="88000"/>
+                  </a:schemeClr>
+                </a:gs>
+              </a:gsLst>
+              <a:lin ang="5400000" scaled="0"/>
+            </a:gradFill>
+            <a:ln>
+              <a:noFill/>
+            </a:ln>
+            <a:effectLst>
+              <a:outerShdw blurRad="38100" dist="25400" dir="5400000" rotWithShape="0">
+                <a:srgbClr val="000000">
+                  <a:alpha val="75000"/>
+                </a:srgbClr>
+              </a:outerShdw>
+            </a:effectLst>
+            <a:scene3d>
+              <a:camera prst="orthographicFront">
+                <a:rot lat="0" lon="0" rev="0"/>
+              </a:camera>
+              <a:lightRig rig="threePt" dir="tl"/>
+            </a:scene3d>
+            <a:sp3d>
+              <a:bevelT w="0" h="0"/>
+            </a:sp3d>
+          </c:spPr>
+          <c:invertIfNegative val="0"/>
+          <c:val>
+            <c:numRef>
+              <c:f>Foglio1!$M$4:$M$10</c:f>
+              <c:numCache>
+                <c:formatCode>0.000</c:formatCode>
+                <c:ptCount val="7"/>
+                <c:pt idx="0">
+                  <c:v>158.677</c:v>
+                </c:pt>
+                <c:pt idx="1">
+                  <c:v>42.041</c:v>
+                </c:pt>
+                <c:pt idx="2">
+                  <c:v>42.554</c:v>
+                </c:pt>
+                <c:pt idx="3">
+                  <c:v>10.053</c:v>
+                </c:pt>
+                <c:pt idx="4">
+                  <c:v>16.318</c:v>
+                </c:pt>
+                <c:pt idx="5">
+                  <c:v>4.045</c:v>
+                </c:pt>
+                <c:pt idx="6">
+                  <c:v>12.261</c:v>
+                </c:pt>
+              </c:numCache>
+            </c:numRef>
+          </c:val>
+        </c:ser>
+        <c:ser>
+          <c:idx val="2"/>
+          <c:order val="3"/>
+          <c:tx>
+            <c:v>v0.5</c:v>
+          </c:tx>
+          <c:spPr>
+            <a:gradFill rotWithShape="1">
+              <a:gsLst>
+                <a:gs pos="0">
+                  <a:schemeClr val="accent3">
+                    <a:tint val="98000"/>
+                    <a:satMod val="110000"/>
+                    <a:lumMod val="104000"/>
+                  </a:schemeClr>
+                </a:gs>
+                <a:gs pos="69000">
+                  <a:schemeClr val="accent3">
+                    <a:shade val="84000"/>
+                    <a:satMod val="130000"/>
+                    <a:lumMod val="92000"/>
+                  </a:schemeClr>
+                </a:gs>
+                <a:gs pos="100000">
+                  <a:schemeClr val="accent3">
+                    <a:shade val="76000"/>
+                    <a:satMod val="130000"/>
+                    <a:lumMod val="88000"/>
+                  </a:schemeClr>
+                </a:gs>
+              </a:gsLst>
+              <a:lin ang="5400000" scaled="0"/>
+            </a:gradFill>
+            <a:ln>
+              <a:noFill/>
+            </a:ln>
+            <a:effectLst>
+              <a:outerShdw blurRad="38100" dist="25400" dir="5400000" rotWithShape="0">
+                <a:srgbClr val="000000">
+                  <a:alpha val="75000"/>
+                </a:srgbClr>
+              </a:outerShdw>
+            </a:effectLst>
+            <a:scene3d>
+              <a:camera prst="orthographicFront">
+                <a:rot lat="0" lon="0" rev="0"/>
+              </a:camera>
+              <a:lightRig rig="threePt" dir="tl"/>
+            </a:scene3d>
+            <a:sp3d>
+              <a:bevelT w="0" h="0"/>
+            </a:sp3d>
+          </c:spPr>
+          <c:invertIfNegative val="0"/>
+          <c:val>
+            <c:numRef>
+              <c:f>Foglio1!$O$4:$O$10</c:f>
+              <c:numCache>
+                <c:formatCode>0.000</c:formatCode>
+                <c:ptCount val="7"/>
+                <c:pt idx="0">
+                  <c:v>158.677</c:v>
+                </c:pt>
+                <c:pt idx="1">
+                  <c:v>42.041</c:v>
+                </c:pt>
+                <c:pt idx="2">
+                  <c:v>42.554</c:v>
+                </c:pt>
+                <c:pt idx="3">
+                  <c:v>10.053</c:v>
+                </c:pt>
+                <c:pt idx="4">
+                  <c:v>16.318</c:v>
+                </c:pt>
+                <c:pt idx="5">
+                  <c:v>4.045</c:v>
+                </c:pt>
+                <c:pt idx="6">
+                  <c:v>12.261</c:v>
+                </c:pt>
+              </c:numCache>
+            </c:numRef>
+          </c:val>
+        </c:ser>
+        <c:ser>
+          <c:idx val="3"/>
+          <c:order val="4"/>
+          <c:tx>
+            <c:v>v0.7</c:v>
+          </c:tx>
+          <c:spPr>
+            <a:gradFill rotWithShape="1">
+              <a:gsLst>
+                <a:gs pos="0">
+                  <a:schemeClr val="accent4">
+                    <a:tint val="98000"/>
+                    <a:satMod val="110000"/>
+                    <a:lumMod val="104000"/>
+                  </a:schemeClr>
+                </a:gs>
+                <a:gs pos="69000">
+                  <a:schemeClr val="accent4">
+                    <a:shade val="84000"/>
+                    <a:satMod val="130000"/>
+                    <a:lumMod val="92000"/>
+                  </a:schemeClr>
+                </a:gs>
+                <a:gs pos="100000">
+                  <a:schemeClr val="accent4">
+                    <a:shade val="76000"/>
+                    <a:satMod val="130000"/>
+                    <a:lumMod val="88000"/>
+                  </a:schemeClr>
+                </a:gs>
+              </a:gsLst>
+              <a:lin ang="5400000" scaled="0"/>
+            </a:gradFill>
+            <a:ln>
+              <a:noFill/>
+            </a:ln>
+            <a:effectLst>
+              <a:outerShdw blurRad="38100" dist="25400" dir="5400000" rotWithShape="0">
+                <a:srgbClr val="000000">
+                  <a:alpha val="75000"/>
+                </a:srgbClr>
+              </a:outerShdw>
+            </a:effectLst>
+            <a:scene3d>
+              <a:camera prst="orthographicFront">
+                <a:rot lat="0" lon="0" rev="0"/>
+              </a:camera>
+              <a:lightRig rig="threePt" dir="tl"/>
+            </a:scene3d>
+            <a:sp3d>
+              <a:bevelT w="0" h="0"/>
+            </a:sp3d>
+          </c:spPr>
+          <c:invertIfNegative val="0"/>
+          <c:val>
+            <c:numRef>
+              <c:f>Foglio1!$S$4:$S$10</c:f>
+              <c:numCache>
+                <c:formatCode>0.000</c:formatCode>
+                <c:ptCount val="7"/>
+                <c:pt idx="0">
+                  <c:v>157.121</c:v>
+                </c:pt>
+                <c:pt idx="1">
+                  <c:v>38.877</c:v>
+                </c:pt>
+                <c:pt idx="2">
+                  <c:v>36.471</c:v>
+                </c:pt>
+                <c:pt idx="3">
+                  <c:v>8.703</c:v>
+                </c:pt>
+                <c:pt idx="4">
+                  <c:v>14.832</c:v>
+                </c:pt>
+                <c:pt idx="5">
+                  <c:v>3.668</c:v>
+                </c:pt>
+                <c:pt idx="6">
+                  <c:v>10.587</c:v>
+                </c:pt>
+              </c:numCache>
+            </c:numRef>
+          </c:val>
+        </c:ser>
+        <c:dLbls>
+          <c:showLegendKey val="0"/>
+          <c:showVal val="0"/>
+          <c:showCatName val="0"/>
+          <c:showSerName val="0"/>
+          <c:showPercent val="0"/>
+          <c:showBubbleSize val="0"/>
+        </c:dLbls>
+        <c:gapWidth val="100"/>
+        <c:overlap val="-24"/>
+        <c:axId val="48336352"/>
+        <c:axId val="48338128"/>
+      </c:barChart>
+      <c:catAx>
+        <c:axId val="48336352"/>
+        <c:scaling>
+          <c:orientation val="minMax"/>
+        </c:scaling>
+        <c:delete val="0"/>
+        <c:axPos val="b"/>
+        <c:majorGridlines>
+          <c:spPr>
+            <a:ln w="9525" cap="flat" cmpd="sng" algn="ctr">
+              <a:solidFill>
+                <a:schemeClr val="lt1">
+                  <a:lumMod val="95000"/>
+                  <a:alpha val="10000"/>
+                </a:schemeClr>
+              </a:solidFill>
+              <a:round/>
+            </a:ln>
+            <a:effectLst/>
+          </c:spPr>
+        </c:majorGridlines>
+        <c:numFmt formatCode="General" sourceLinked="1"/>
+        <c:majorTickMark val="none"/>
+        <c:minorTickMark val="none"/>
+        <c:tickLblPos val="nextTo"/>
+        <c:spPr>
+          <a:noFill/>
+          <a:ln w="12700" cap="flat" cmpd="sng" algn="ctr">
+            <a:solidFill>
+              <a:schemeClr val="lt1">
+                <a:lumMod val="95000"/>
+                <a:alpha val="54000"/>
+              </a:schemeClr>
+            </a:solidFill>
+            <a:round/>
+          </a:ln>
+          <a:effectLst/>
+        </c:spPr>
+        <c:txPr>
+          <a:bodyPr rot="-60000000" spcFirstLastPara="1" vertOverflow="ellipsis" vert="horz" wrap="square" anchor="ctr" anchorCtr="1"/>
+          <a:lstStyle/>
+          <a:p>
+            <a:pPr>
+              <a:defRPr sz="1400" b="0" i="0" u="none" strike="noStrike" kern="1200" baseline="0">
+                <a:solidFill>
+                  <a:schemeClr val="lt1">
+                    <a:lumMod val="85000"/>
+                  </a:schemeClr>
+                </a:solidFill>
+                <a:latin typeface="+mn-lt"/>
+                <a:ea typeface="+mn-ea"/>
+                <a:cs typeface="+mn-cs"/>
+              </a:defRPr>
+            </a:pPr>
+            <a:endParaRPr lang="en-US"/>
+          </a:p>
+        </c:txPr>
+        <c:crossAx val="48338128"/>
+        <c:crosses val="autoZero"/>
+        <c:auto val="1"/>
+        <c:lblAlgn val="ctr"/>
+        <c:lblOffset val="100"/>
+        <c:noMultiLvlLbl val="0"/>
+      </c:catAx>
+      <c:valAx>
+        <c:axId val="48338128"/>
+        <c:scaling>
+          <c:orientation val="minMax"/>
+        </c:scaling>
+        <c:delete val="0"/>
+        <c:axPos val="l"/>
+        <c:majorGridlines>
+          <c:spPr>
+            <a:ln w="9525" cap="flat" cmpd="sng" algn="ctr">
+              <a:solidFill>
+                <a:schemeClr val="lt1">
+                  <a:lumMod val="95000"/>
+                  <a:alpha val="10000"/>
+                </a:schemeClr>
+              </a:solidFill>
+              <a:round/>
+            </a:ln>
+            <a:effectLst/>
+          </c:spPr>
+        </c:majorGridlines>
+        <c:minorGridlines>
+          <c:spPr>
+            <a:ln>
+              <a:solidFill>
+                <a:schemeClr val="lt1">
+                  <a:lumMod val="95000"/>
+                  <a:alpha val="5000"/>
+                </a:schemeClr>
+              </a:solidFill>
+            </a:ln>
+            <a:effectLst/>
+          </c:spPr>
+        </c:minorGridlines>
+        <c:majorTickMark val="none"/>
+        <c:minorTickMark val="none"/>
+        <c:tickLblPos val="nextTo"/>
+        <c:spPr>
+          <a:noFill/>
+          <a:ln>
+            <a:noFill/>
+          </a:ln>
+          <a:effectLst/>
+        </c:spPr>
+        <c:txPr>
+          <a:bodyPr rot="-60000000" spcFirstLastPara="1" vertOverflow="ellipsis" vert="horz" wrap="square" anchor="ctr" anchorCtr="1"/>
+          <a:lstStyle/>
+          <a:p>
+            <a:pPr>
+              <a:defRPr sz="1197" b="0" i="0" u="none" strike="noStrike" kern="1200" baseline="0">
+                <a:solidFill>
+                  <a:schemeClr val="lt1">
+                    <a:lumMod val="85000"/>
+                  </a:schemeClr>
+                </a:solidFill>
+                <a:latin typeface="+mn-lt"/>
+                <a:ea typeface="+mn-ea"/>
+                <a:cs typeface="+mn-cs"/>
+              </a:defRPr>
+            </a:pPr>
+            <a:endParaRPr lang="en-US"/>
+          </a:p>
+        </c:txPr>
+        <c:crossAx val="48336352"/>
+        <c:crosses val="autoZero"/>
+        <c:crossBetween val="between"/>
+      </c:valAx>
+      <c:spPr>
+        <a:noFill/>
+        <a:ln>
+          <a:noFill/>
+        </a:ln>
+        <a:effectLst/>
+      </c:spPr>
+    </c:plotArea>
+    <c:legend>
+      <c:legendPos val="b"/>
+      <c:layout/>
+      <c:overlay val="0"/>
+      <c:spPr>
+        <a:noFill/>
+        <a:ln>
+          <a:noFill/>
+        </a:ln>
+        <a:effectLst/>
+      </c:spPr>
+      <c:txPr>
+        <a:bodyPr rot="0" spcFirstLastPara="1" vertOverflow="ellipsis" vert="horz" wrap="square" anchor="ctr" anchorCtr="1"/>
+        <a:lstStyle/>
+        <a:p>
+          <a:pPr>
+            <a:defRPr sz="1800" b="0" i="0" u="none" strike="noStrike" kern="1200" baseline="0">
+              <a:solidFill>
+                <a:schemeClr val="lt1">
+                  <a:lumMod val="85000"/>
+                </a:schemeClr>
+              </a:solidFill>
+              <a:latin typeface="+mn-lt"/>
+              <a:ea typeface="+mn-ea"/>
+              <a:cs typeface="+mn-cs"/>
+            </a:defRPr>
+          </a:pPr>
+          <a:endParaRPr lang="en-US"/>
+        </a:p>
+      </c:txPr>
+    </c:legend>
+    <c:plotVisOnly val="1"/>
+    <c:dispBlanksAs val="gap"/>
     <c:showDLblsOverMax val="0"/>
   </c:chart>
   <c:spPr>
@@ -2287,7 +3040,7 @@
       <a:pPr>
         <a:defRPr/>
       </a:pPr>
-      <a:endParaRPr lang="it-IT"/>
+      <a:endParaRPr lang="en-US"/>
     </a:p>
   </c:txPr>
   <c:externalData r:id="rId3">
@@ -2305,6 +3058,46 @@
 <file path=ppt/charts/colors2.xml><?xml version="1.0" encoding="utf-8"?>
 <cs:colorStyle xmlns:cs="http://schemas.microsoft.com/office/drawing/2012/chartStyle" xmlns:a="http://schemas.openxmlformats.org/drawingml/2006/main" meth="withinLinear" id="14">
   <a:schemeClr val="accent1"/>
+</cs:colorStyle>
+</file>
+
+<file path=ppt/charts/colors3.xml><?xml version="1.0" encoding="utf-8"?>
+<cs:colorStyle xmlns:cs="http://schemas.microsoft.com/office/drawing/2012/chartStyle" xmlns:a="http://schemas.openxmlformats.org/drawingml/2006/main" meth="cycle" id="10">
+  <a:schemeClr val="accent1"/>
+  <a:schemeClr val="accent2"/>
+  <a:schemeClr val="accent3"/>
+  <a:schemeClr val="accent4"/>
+  <a:schemeClr val="accent5"/>
+  <a:schemeClr val="accent6"/>
+  <cs:variation/>
+  <cs:variation>
+    <a:lumMod val="60000"/>
+  </cs:variation>
+  <cs:variation>
+    <a:lumMod val="80000"/>
+    <a:lumOff val="20000"/>
+  </cs:variation>
+  <cs:variation>
+    <a:lumMod val="80000"/>
+  </cs:variation>
+  <cs:variation>
+    <a:lumMod val="60000"/>
+    <a:lumOff val="40000"/>
+  </cs:variation>
+  <cs:variation>
+    <a:lumMod val="50000"/>
+  </cs:variation>
+  <cs:variation>
+    <a:lumMod val="70000"/>
+    <a:lumOff val="30000"/>
+  </cs:variation>
+  <cs:variation>
+    <a:lumMod val="70000"/>
+  </cs:variation>
+  <cs:variation>
+    <a:lumMod val="50000"/>
+    <a:lumOff val="50000"/>
+  </cs:variation>
 </cs:colorStyle>
 </file>
 
@@ -3385,6 +4178,555 @@
 </cs:chartStyle>
 </file>
 
+<file path=ppt/charts/style3.xml><?xml version="1.0" encoding="utf-8"?>
+<cs:chartStyle xmlns:cs="http://schemas.microsoft.com/office/drawing/2012/chartStyle" xmlns:a="http://schemas.openxmlformats.org/drawingml/2006/main" id="209">
+  <cs:axisTitle>
+    <cs:lnRef idx="0"/>
+    <cs:fillRef idx="0"/>
+    <cs:effectRef idx="0"/>
+    <cs:fontRef idx="minor">
+      <a:schemeClr val="lt1">
+        <a:lumMod val="85000"/>
+      </a:schemeClr>
+    </cs:fontRef>
+    <cs:defRPr sz="1197" b="1" kern="1200" cap="all"/>
+  </cs:axisTitle>
+  <cs:categoryAxis>
+    <cs:lnRef idx="0"/>
+    <cs:fillRef idx="0"/>
+    <cs:effectRef idx="0"/>
+    <cs:fontRef idx="minor">
+      <a:schemeClr val="lt1">
+        <a:lumMod val="85000"/>
+      </a:schemeClr>
+    </cs:fontRef>
+    <cs:spPr>
+      <a:ln w="12700" cap="flat" cmpd="sng" algn="ctr">
+        <a:solidFill>
+          <a:schemeClr val="lt1">
+            <a:lumMod val="95000"/>
+            <a:alpha val="54000"/>
+          </a:schemeClr>
+        </a:solidFill>
+        <a:round/>
+      </a:ln>
+    </cs:spPr>
+    <cs:defRPr sz="1197" kern="1200"/>
+  </cs:categoryAxis>
+  <cs:chartArea>
+    <cs:lnRef idx="0"/>
+    <cs:fillRef idx="0"/>
+    <cs:effectRef idx="0"/>
+    <cs:fontRef idx="minor">
+      <a:schemeClr val="dk1"/>
+    </cs:fontRef>
+    <cs:spPr>
+      <a:gradFill flip="none" rotWithShape="1">
+        <a:gsLst>
+          <a:gs pos="0">
+            <a:schemeClr val="dk1">
+              <a:lumMod val="65000"/>
+              <a:lumOff val="35000"/>
+            </a:schemeClr>
+          </a:gs>
+          <a:gs pos="100000">
+            <a:schemeClr val="dk1">
+              <a:lumMod val="85000"/>
+              <a:lumOff val="15000"/>
+            </a:schemeClr>
+          </a:gs>
+        </a:gsLst>
+        <a:path path="circle">
+          <a:fillToRect l="50000" t="50000" r="50000" b="50000"/>
+        </a:path>
+        <a:tileRect/>
+      </a:gradFill>
+    </cs:spPr>
+    <cs:defRPr sz="1330" kern="1200"/>
+  </cs:chartArea>
+  <cs:dataLabel>
+    <cs:lnRef idx="0"/>
+    <cs:fillRef idx="0"/>
+    <cs:effectRef idx="0"/>
+    <cs:fontRef idx="minor">
+      <a:schemeClr val="lt1">
+        <a:lumMod val="85000"/>
+      </a:schemeClr>
+    </cs:fontRef>
+    <cs:defRPr sz="1197" kern="1200"/>
+  </cs:dataLabel>
+  <cs:dataLabelCallout>
+    <cs:lnRef idx="0"/>
+    <cs:fillRef idx="0"/>
+    <cs:effectRef idx="0"/>
+    <cs:fontRef idx="minor">
+      <a:schemeClr val="dk1">
+        <a:lumMod val="65000"/>
+        <a:lumOff val="35000"/>
+      </a:schemeClr>
+    </cs:fontRef>
+    <cs:spPr>
+      <a:solidFill>
+        <a:schemeClr val="lt1"/>
+      </a:solidFill>
+    </cs:spPr>
+    <cs:defRPr sz="1197" kern="1200"/>
+    <cs:bodyPr rot="0" spcFirstLastPara="1" vertOverflow="clip" horzOverflow="clip" vert="horz" wrap="square" lIns="36576" tIns="18288" rIns="36576" bIns="18288" anchor="ctr" anchorCtr="1">
+      <a:spAutoFit/>
+    </cs:bodyPr>
+  </cs:dataLabelCallout>
+  <cs:dataPoint>
+    <cs:lnRef idx="0"/>
+    <cs:fillRef idx="3">
+      <cs:styleClr val="auto"/>
+    </cs:fillRef>
+    <cs:effectRef idx="3"/>
+    <cs:fontRef idx="minor">
+      <a:schemeClr val="lt1"/>
+    </cs:fontRef>
+  </cs:dataPoint>
+  <cs:dataPoint3D>
+    <cs:lnRef idx="0"/>
+    <cs:fillRef idx="3">
+      <cs:styleClr val="auto"/>
+    </cs:fillRef>
+    <cs:effectRef idx="3"/>
+    <cs:fontRef idx="minor">
+      <a:schemeClr val="lt1"/>
+    </cs:fontRef>
+  </cs:dataPoint3D>
+  <cs:dataPointLine>
+    <cs:lnRef idx="0">
+      <cs:styleClr val="auto"/>
+    </cs:lnRef>
+    <cs:fillRef idx="3"/>
+    <cs:effectRef idx="3"/>
+    <cs:fontRef idx="minor">
+      <a:schemeClr val="lt1"/>
+    </cs:fontRef>
+    <cs:spPr>
+      <a:ln w="34925" cap="rnd">
+        <a:solidFill>
+          <a:schemeClr val="phClr"/>
+        </a:solidFill>
+        <a:round/>
+      </a:ln>
+    </cs:spPr>
+  </cs:dataPointLine>
+  <cs:dataPointMarker>
+    <cs:lnRef idx="0">
+      <cs:styleClr val="auto"/>
+    </cs:lnRef>
+    <cs:fillRef idx="3">
+      <cs:styleClr val="auto"/>
+    </cs:fillRef>
+    <cs:effectRef idx="3"/>
+    <cs:fontRef idx="minor">
+      <a:schemeClr val="lt1"/>
+    </cs:fontRef>
+    <cs:spPr>
+      <a:ln w="9525">
+        <a:solidFill>
+          <a:schemeClr val="phClr"/>
+        </a:solidFill>
+        <a:round/>
+      </a:ln>
+    </cs:spPr>
+  </cs:dataPointMarker>
+  <cs:dataPointMarkerLayout symbol="circle" size="6"/>
+  <cs:dataPointWireframe>
+    <cs:lnRef idx="0">
+      <cs:styleClr val="auto"/>
+    </cs:lnRef>
+    <cs:fillRef idx="3"/>
+    <cs:effectRef idx="3"/>
+    <cs:fontRef idx="minor">
+      <a:schemeClr val="lt1"/>
+    </cs:fontRef>
+    <cs:spPr>
+      <a:ln w="9525" cap="rnd">
+        <a:solidFill>
+          <a:schemeClr val="phClr"/>
+        </a:solidFill>
+        <a:round/>
+      </a:ln>
+    </cs:spPr>
+  </cs:dataPointWireframe>
+  <cs:dataTable>
+    <cs:lnRef idx="0"/>
+    <cs:fillRef idx="0"/>
+    <cs:effectRef idx="0"/>
+    <cs:fontRef idx="minor">
+      <a:schemeClr val="lt1">
+        <a:lumMod val="85000"/>
+      </a:schemeClr>
+    </cs:fontRef>
+    <cs:spPr>
+      <a:ln w="9525">
+        <a:solidFill>
+          <a:schemeClr val="lt1">
+            <a:lumMod val="95000"/>
+            <a:alpha val="54000"/>
+          </a:schemeClr>
+        </a:solidFill>
+      </a:ln>
+    </cs:spPr>
+    <cs:defRPr sz="1197" kern="1200"/>
+  </cs:dataTable>
+  <cs:downBar>
+    <cs:lnRef idx="0"/>
+    <cs:fillRef idx="0"/>
+    <cs:effectRef idx="0"/>
+    <cs:fontRef idx="minor">
+      <a:schemeClr val="lt1"/>
+    </cs:fontRef>
+    <cs:spPr>
+      <a:solidFill>
+        <a:schemeClr val="dk1">
+          <a:lumMod val="75000"/>
+          <a:lumOff val="25000"/>
+        </a:schemeClr>
+      </a:solidFill>
+      <a:ln w="9525">
+        <a:solidFill>
+          <a:schemeClr val="lt1">
+            <a:lumMod val="95000"/>
+            <a:alpha val="54000"/>
+          </a:schemeClr>
+        </a:solidFill>
+      </a:ln>
+    </cs:spPr>
+  </cs:downBar>
+  <cs:dropLine>
+    <cs:lnRef idx="0"/>
+    <cs:fillRef idx="0"/>
+    <cs:effectRef idx="0"/>
+    <cs:fontRef idx="minor">
+      <a:schemeClr val="lt1"/>
+    </cs:fontRef>
+    <cs:spPr>
+      <a:ln w="9525">
+        <a:solidFill>
+          <a:schemeClr val="lt1">
+            <a:lumMod val="95000"/>
+            <a:alpha val="54000"/>
+          </a:schemeClr>
+        </a:solidFill>
+        <a:prstDash val="dash"/>
+      </a:ln>
+    </cs:spPr>
+  </cs:dropLine>
+  <cs:errorBar>
+    <cs:lnRef idx="0"/>
+    <cs:fillRef idx="0"/>
+    <cs:effectRef idx="0"/>
+    <cs:fontRef idx="minor">
+      <a:schemeClr val="lt1"/>
+    </cs:fontRef>
+    <cs:spPr>
+      <a:ln w="9525" cap="flat" cmpd="sng" algn="ctr">
+        <a:solidFill>
+          <a:schemeClr val="lt1">
+            <a:lumMod val="95000"/>
+          </a:schemeClr>
+        </a:solidFill>
+        <a:round/>
+      </a:ln>
+    </cs:spPr>
+  </cs:errorBar>
+  <cs:floor>
+    <cs:lnRef idx="0"/>
+    <cs:fillRef idx="0"/>
+    <cs:effectRef idx="0"/>
+    <cs:fontRef idx="minor">
+      <a:schemeClr val="lt1"/>
+    </cs:fontRef>
+  </cs:floor>
+  <cs:gridlineMajor>
+    <cs:lnRef idx="0"/>
+    <cs:fillRef idx="0"/>
+    <cs:effectRef idx="0"/>
+    <cs:fontRef idx="minor">
+      <a:schemeClr val="lt1"/>
+    </cs:fontRef>
+    <cs:spPr>
+      <a:ln w="9525" cap="flat" cmpd="sng" algn="ctr">
+        <a:solidFill>
+          <a:schemeClr val="lt1">
+            <a:lumMod val="95000"/>
+            <a:alpha val="10000"/>
+          </a:schemeClr>
+        </a:solidFill>
+        <a:round/>
+      </a:ln>
+    </cs:spPr>
+  </cs:gridlineMajor>
+  <cs:gridlineMinor>
+    <cs:lnRef idx="0"/>
+    <cs:fillRef idx="0"/>
+    <cs:effectRef idx="0"/>
+    <cs:fontRef idx="minor">
+      <a:schemeClr val="lt1"/>
+    </cs:fontRef>
+    <cs:spPr>
+      <a:ln>
+        <a:solidFill>
+          <a:schemeClr val="lt1">
+            <a:lumMod val="95000"/>
+            <a:alpha val="5000"/>
+          </a:schemeClr>
+        </a:solidFill>
+      </a:ln>
+    </cs:spPr>
+  </cs:gridlineMinor>
+  <cs:hiLoLine>
+    <cs:lnRef idx="0"/>
+    <cs:fillRef idx="0"/>
+    <cs:effectRef idx="0"/>
+    <cs:fontRef idx="minor">
+      <a:schemeClr val="lt1"/>
+    </cs:fontRef>
+    <cs:spPr>
+      <a:ln w="9525">
+        <a:solidFill>
+          <a:schemeClr val="lt1">
+            <a:lumMod val="95000"/>
+            <a:alpha val="54000"/>
+          </a:schemeClr>
+        </a:solidFill>
+        <a:prstDash val="dash"/>
+      </a:ln>
+    </cs:spPr>
+  </cs:hiLoLine>
+  <cs:leaderLine>
+    <cs:lnRef idx="0"/>
+    <cs:fillRef idx="0"/>
+    <cs:effectRef idx="0"/>
+    <cs:fontRef idx="minor">
+      <a:schemeClr val="lt1"/>
+    </cs:fontRef>
+    <cs:spPr>
+      <a:ln w="9525">
+        <a:solidFill>
+          <a:schemeClr val="lt1">
+            <a:lumMod val="95000"/>
+            <a:alpha val="54000"/>
+          </a:schemeClr>
+        </a:solidFill>
+      </a:ln>
+    </cs:spPr>
+  </cs:leaderLine>
+  <cs:legend>
+    <cs:lnRef idx="0"/>
+    <cs:fillRef idx="0"/>
+    <cs:effectRef idx="0"/>
+    <cs:fontRef idx="minor">
+      <a:schemeClr val="lt1">
+        <a:lumMod val="85000"/>
+      </a:schemeClr>
+    </cs:fontRef>
+    <cs:defRPr sz="1197" kern="1200"/>
+  </cs:legend>
+  <cs:plotArea>
+    <cs:lnRef idx="0"/>
+    <cs:fillRef idx="0"/>
+    <cs:effectRef idx="0"/>
+    <cs:fontRef idx="minor">
+      <a:schemeClr val="lt1"/>
+    </cs:fontRef>
+  </cs:plotArea>
+  <cs:plotArea3D>
+    <cs:lnRef idx="0"/>
+    <cs:fillRef idx="0"/>
+    <cs:effectRef idx="0"/>
+    <cs:fontRef idx="minor">
+      <a:schemeClr val="lt1"/>
+    </cs:fontRef>
+  </cs:plotArea3D>
+  <cs:seriesAxis>
+    <cs:lnRef idx="0"/>
+    <cs:fillRef idx="0"/>
+    <cs:effectRef idx="0"/>
+    <cs:fontRef idx="minor">
+      <a:schemeClr val="lt1">
+        <a:lumMod val="85000"/>
+      </a:schemeClr>
+    </cs:fontRef>
+    <cs:spPr>
+      <a:ln w="12700" cap="flat" cmpd="sng" algn="ctr">
+        <a:solidFill>
+          <a:schemeClr val="lt1">
+            <a:lumMod val="95000"/>
+            <a:alpha val="54000"/>
+          </a:schemeClr>
+        </a:solidFill>
+        <a:round/>
+      </a:ln>
+    </cs:spPr>
+    <cs:defRPr sz="1197" kern="1200"/>
+  </cs:seriesAxis>
+  <cs:seriesLine>
+    <cs:lnRef idx="0"/>
+    <cs:fillRef idx="0"/>
+    <cs:effectRef idx="0"/>
+    <cs:fontRef idx="minor">
+      <a:schemeClr val="lt1"/>
+    </cs:fontRef>
+    <cs:spPr>
+      <a:ln w="9525" cap="flat" cmpd="sng" algn="ctr">
+        <a:solidFill>
+          <a:schemeClr val="lt1">
+            <a:lumMod val="95000"/>
+            <a:alpha val="54000"/>
+          </a:schemeClr>
+        </a:solidFill>
+        <a:round/>
+      </a:ln>
+    </cs:spPr>
+  </cs:seriesLine>
+  <cs:title>
+    <cs:lnRef idx="0"/>
+    <cs:fillRef idx="0"/>
+    <cs:effectRef idx="0"/>
+    <cs:fontRef idx="minor">
+      <a:schemeClr val="lt1">
+        <a:lumMod val="95000"/>
+      </a:schemeClr>
+    </cs:fontRef>
+    <cs:defRPr sz="2128" b="1" kern="1200" spc="100" baseline="0">
+      <a:effectLst>
+        <a:outerShdw blurRad="50800" dist="38100" dir="5400000" algn="t" rotWithShape="0">
+          <a:prstClr val="black">
+            <a:alpha val="40000"/>
+          </a:prstClr>
+        </a:outerShdw>
+      </a:effectLst>
+    </cs:defRPr>
+  </cs:title>
+  <cs:trendline>
+    <cs:lnRef idx="0">
+      <cs:styleClr val="auto"/>
+    </cs:lnRef>
+    <cs:fillRef idx="0"/>
+    <cs:effectRef idx="0"/>
+    <cs:fontRef idx="minor">
+      <a:schemeClr val="lt1"/>
+    </cs:fontRef>
+    <cs:spPr>
+      <a:ln w="19050" cap="rnd">
+        <a:solidFill>
+          <a:schemeClr val="phClr"/>
+        </a:solidFill>
+      </a:ln>
+    </cs:spPr>
+  </cs:trendline>
+  <cs:trendlineLabel>
+    <cs:lnRef idx="0"/>
+    <cs:fillRef idx="0"/>
+    <cs:effectRef idx="0"/>
+    <cs:fontRef idx="minor">
+      <a:schemeClr val="lt1">
+        <a:lumMod val="85000"/>
+      </a:schemeClr>
+    </cs:fontRef>
+    <cs:defRPr sz="1197" kern="1200"/>
+  </cs:trendlineLabel>
+  <cs:upBar>
+    <cs:lnRef idx="0"/>
+    <cs:fillRef idx="0"/>
+    <cs:effectRef idx="0"/>
+    <cs:fontRef idx="minor">
+      <a:schemeClr val="lt1"/>
+    </cs:fontRef>
+    <cs:spPr>
+      <a:solidFill>
+        <a:schemeClr val="lt1"/>
+      </a:solidFill>
+      <a:ln w="9525">
+        <a:solidFill>
+          <a:schemeClr val="lt1">
+            <a:lumMod val="95000"/>
+            <a:alpha val="54000"/>
+          </a:schemeClr>
+        </a:solidFill>
+      </a:ln>
+    </cs:spPr>
+  </cs:upBar>
+  <cs:valueAxis>
+    <cs:lnRef idx="0"/>
+    <cs:fillRef idx="0"/>
+    <cs:effectRef idx="0"/>
+    <cs:fontRef idx="minor">
+      <a:schemeClr val="lt1">
+        <a:lumMod val="85000"/>
+      </a:schemeClr>
+    </cs:fontRef>
+    <cs:defRPr sz="1197" kern="1200"/>
+  </cs:valueAxis>
+  <cs:wall>
+    <cs:lnRef idx="0"/>
+    <cs:fillRef idx="0"/>
+    <cs:effectRef idx="0"/>
+    <cs:fontRef idx="minor">
+      <a:schemeClr val="lt1"/>
+    </cs:fontRef>
+  </cs:wall>
+</cs:chartStyle>
+</file>
+
+<file path=ppt/drawings/drawing1.xml><?xml version="1.0" encoding="utf-8"?>
+<c:userShapes xmlns:c="http://schemas.openxmlformats.org/drawingml/2006/chart">
+  <cdr:relSizeAnchor xmlns:cdr="http://schemas.openxmlformats.org/drawingml/2006/chartDrawing">
+    <cdr:from>
+      <cdr:x>0.07229</cdr:x>
+      <cdr:y>0.80243</cdr:y>
+    </cdr:from>
+    <cdr:to>
+      <cdr:x>0.76087</cdr:x>
+      <cdr:y>0.84309</cdr:y>
+    </cdr:to>
+    <cdr:sp macro="" textlink="">
+      <cdr:nvSpPr>
+        <cdr:cNvPr id="2" name="TextBox 1"/>
+        <cdr:cNvSpPr txBox="1"/>
+      </cdr:nvSpPr>
+      <cdr:spPr>
+        <a:xfrm xmlns:a="http://schemas.openxmlformats.org/drawingml/2006/main">
+          <a:off x="897053" y="6050435"/>
+          <a:ext cx="8544232" cy="306563"/>
+        </a:xfrm>
+        <a:prstGeom xmlns:a="http://schemas.openxmlformats.org/drawingml/2006/main" prst="rect">
+          <a:avLst/>
+        </a:prstGeom>
+      </cdr:spPr>
+      <cdr:txBody>
+        <a:bodyPr xmlns:a="http://schemas.openxmlformats.org/drawingml/2006/main" vertOverflow="clip" wrap="square" rtlCol="0"/>
+        <a:lstStyle xmlns:a="http://schemas.openxmlformats.org/drawingml/2006/main"/>
+        <a:p xmlns:a="http://schemas.openxmlformats.org/drawingml/2006/main">
+          <a:r>
+            <a:rPr lang="en-US" sz="1400" dirty="0" smtClean="0">
+              <a:solidFill>
+                <a:schemeClr val="bg1">
+                  <a:lumMod val="95000"/>
+                </a:schemeClr>
+              </a:solidFill>
+            </a:rPr>
+            <a:t>Instance 01      Instance 02        Instance 03        Instance 04       Instance 05       Instance 06       Instance 07</a:t>
+          </a:r>
+          <a:endParaRPr lang="en-US" sz="1400" dirty="0">
+            <a:solidFill>
+              <a:schemeClr val="bg1">
+                <a:lumMod val="95000"/>
+              </a:schemeClr>
+            </a:solidFill>
+          </a:endParaRPr>
+        </a:p>
+      </cdr:txBody>
+    </cdr:sp>
+  </cdr:relSizeAnchor>
+</c:userShapes>
+</file>
+
 <file path=ppt/notesMasters/notesMaster1.xml><?xml version="1.0" encoding="utf-8"?>
 <p:notesMaster xmlns:a="http://schemas.openxmlformats.org/drawingml/2006/main" xmlns:r="http://schemas.openxmlformats.org/officeDocument/2006/relationships" xmlns:p="http://schemas.openxmlformats.org/presentationml/2006/main">
   <p:cSld>
@@ -3467,7 +4809,7 @@
           <a:p>
             <a:fld id="{C48AFB7A-17CF-8C44-8080-93AF7347A24D}" type="datetimeFigureOut">
               <a:rPr lang="en-US" smtClean="0"/>
-              <a:t>1/4/2018</a:t>
+              <a:t>1/5/18</a:t>
             </a:fld>
             <a:endParaRPr lang="en-US"/>
           </a:p>
@@ -3625,7 +4967,7 @@
           <a:p>
             <a:fld id="{F81F356D-41A4-0342-8E44-94109B993633}" type="slidenum">
               <a:rPr lang="en-US" smtClean="0"/>
-              <a:t>‹N›</a:t>
+              <a:t>‹#›</a:t>
             </a:fld>
             <a:endParaRPr lang="en-US"/>
           </a:p>
@@ -5227,7 +6569,7 @@
           <a:p>
             <a:fld id="{DFA7CFB6-B003-BC42-88FE-B4FAC05D1CE1}" type="datetime1">
               <a:rPr lang="it-IT" smtClean="0"/>
-              <a:t>04/01/2018</a:t>
+              <a:t>05/01/18</a:t>
             </a:fld>
             <a:endParaRPr lang="en-US" dirty="0"/>
           </a:p>
@@ -5283,7 +6625,7 @@
           <a:p>
             <a:fld id="{6D22F896-40B5-4ADD-8801-0D06FADFA095}" type="slidenum">
               <a:rPr lang="en-US" dirty="0"/>
-              <a:t>‹N›</a:t>
+              <a:t>‹#›</a:t>
             </a:fld>
             <a:endParaRPr lang="en-US" dirty="0"/>
           </a:p>
@@ -6681,7 +8023,7 @@
           <a:p>
             <a:fld id="{4E971836-4E15-444F-900D-C97D09E99EE9}" type="datetime1">
               <a:rPr lang="it-IT" smtClean="0"/>
-              <a:t>04/01/2018</a:t>
+              <a:t>05/01/18</a:t>
             </a:fld>
             <a:endParaRPr lang="en-US" dirty="0"/>
           </a:p>
@@ -6723,7 +8065,7 @@
           <a:p>
             <a:fld id="{6D22F896-40B5-4ADD-8801-0D06FADFA095}" type="slidenum">
               <a:rPr lang="en-US" dirty="0"/>
-              <a:t>‹N›</a:t>
+              <a:t>‹#›</a:t>
             </a:fld>
             <a:endParaRPr lang="en-US" dirty="0"/>
           </a:p>
@@ -8129,7 +9471,7 @@
           <a:p>
             <a:fld id="{429D95B6-7928-474A-BABD-3DBC5F85F7BD}" type="datetime1">
               <a:rPr lang="it-IT" smtClean="0"/>
-              <a:t>04/01/2018</a:t>
+              <a:t>05/01/18</a:t>
             </a:fld>
             <a:endParaRPr lang="en-US" dirty="0"/>
           </a:p>
@@ -8181,7 +9523,7 @@
           <a:p>
             <a:fld id="{6D22F896-40B5-4ADD-8801-0D06FADFA095}" type="slidenum">
               <a:rPr lang="en-US" dirty="0"/>
-              <a:t>‹N›</a:t>
+              <a:t>‹#›</a:t>
             </a:fld>
             <a:endParaRPr lang="en-US" dirty="0"/>
           </a:p>
@@ -9579,7 +10921,7 @@
           <a:p>
             <a:fld id="{2207C7D2-4DED-174D-9310-BDD2301FDAC5}" type="datetime1">
               <a:rPr lang="it-IT" smtClean="0"/>
-              <a:t>04/01/2018</a:t>
+              <a:t>05/01/18</a:t>
             </a:fld>
             <a:endParaRPr lang="en-US" dirty="0"/>
           </a:p>
@@ -9621,7 +10963,7 @@
           <a:p>
             <a:fld id="{6D22F896-40B5-4ADD-8801-0D06FADFA095}" type="slidenum">
               <a:rPr lang="en-US" dirty="0"/>
-              <a:t>‹N›</a:t>
+              <a:t>‹#›</a:t>
             </a:fld>
             <a:endParaRPr lang="en-US" dirty="0"/>
           </a:p>
@@ -11082,7 +12424,7 @@
           <a:p>
             <a:fld id="{A1104F8D-FD8A-E849-A431-D3B9642506D8}" type="datetime1">
               <a:rPr lang="it-IT" smtClean="0"/>
-              <a:t>04/01/2018</a:t>
+              <a:t>05/01/18</a:t>
             </a:fld>
             <a:endParaRPr lang="en-US" dirty="0"/>
           </a:p>
@@ -11138,7 +12480,7 @@
           <a:p>
             <a:fld id="{6D22F896-40B5-4ADD-8801-0D06FADFA095}" type="slidenum">
               <a:rPr lang="en-US" dirty="0"/>
-              <a:t>‹N›</a:t>
+              <a:t>‹#›</a:t>
             </a:fld>
             <a:endParaRPr lang="en-US" dirty="0"/>
           </a:p>
@@ -12598,7 +13940,7 @@
           <a:p>
             <a:fld id="{F5EB9A5F-66FB-6A4C-9E40-84592031B7EA}" type="datetime1">
               <a:rPr lang="it-IT" smtClean="0"/>
-              <a:t>04/01/2018</a:t>
+              <a:t>05/01/18</a:t>
             </a:fld>
             <a:endParaRPr lang="en-US" dirty="0"/>
           </a:p>
@@ -12650,7 +13992,7 @@
           <a:p>
             <a:fld id="{6D22F896-40B5-4ADD-8801-0D06FADFA095}" type="slidenum">
               <a:rPr lang="en-US" dirty="0"/>
-              <a:t>‹N›</a:t>
+              <a:t>‹#›</a:t>
             </a:fld>
             <a:endParaRPr lang="en-US" dirty="0"/>
           </a:p>
@@ -14258,7 +15600,7 @@
           <a:p>
             <a:fld id="{29D024BA-DF5C-1049-A52F-B8178A2FE085}" type="datetime1">
               <a:rPr lang="it-IT" smtClean="0"/>
-              <a:t>04/01/2018</a:t>
+              <a:t>05/01/18</a:t>
             </a:fld>
             <a:endParaRPr lang="en-US" dirty="0"/>
           </a:p>
@@ -14310,7 +15652,7 @@
           <a:p>
             <a:fld id="{6D22F896-40B5-4ADD-8801-0D06FADFA095}" type="slidenum">
               <a:rPr lang="en-US" dirty="0"/>
-              <a:t>‹N›</a:t>
+              <a:t>‹#›</a:t>
             </a:fld>
             <a:endParaRPr lang="en-US" dirty="0"/>
           </a:p>
@@ -15651,7 +16993,7 @@
           <a:p>
             <a:fld id="{40361C44-3C47-E94A-8DA3-119261B04D9E}" type="datetime1">
               <a:rPr lang="it-IT" smtClean="0"/>
-              <a:t>04/01/2018</a:t>
+              <a:t>05/01/18</a:t>
             </a:fld>
             <a:endParaRPr lang="en-US" dirty="0"/>
           </a:p>
@@ -15693,7 +17035,7 @@
           <a:p>
             <a:fld id="{6D22F896-40B5-4ADD-8801-0D06FADFA095}" type="slidenum">
               <a:rPr lang="en-US" dirty="0"/>
-              <a:t>‹N›</a:t>
+              <a:t>‹#›</a:t>
             </a:fld>
             <a:endParaRPr lang="en-US" dirty="0"/>
           </a:p>
@@ -15746,7 +17088,7 @@
           <a:p>
             <a:fld id="{1735315A-E8CC-4949-ABED-8487AE126D46}" type="datetime1">
               <a:rPr lang="it-IT" smtClean="0"/>
-              <a:t>04/01/2018</a:t>
+              <a:t>05/01/18</a:t>
             </a:fld>
             <a:endParaRPr lang="en-US" dirty="0"/>
           </a:p>
@@ -15798,7 +17140,7 @@
           <a:p>
             <a:fld id="{6D22F896-40B5-4ADD-8801-0D06FADFA095}" type="slidenum">
               <a:rPr lang="en-US" dirty="0"/>
-              <a:t>‹N›</a:t>
+              <a:t>‹#›</a:t>
             </a:fld>
             <a:endParaRPr lang="en-US" dirty="0"/>
           </a:p>
@@ -17267,7 +18609,7 @@
           <a:p>
             <a:fld id="{F52B5142-48B6-4F4A-940E-67B32832C9FE}" type="datetime1">
               <a:rPr lang="it-IT" smtClean="0"/>
-              <a:t>04/01/2018</a:t>
+              <a:t>05/01/18</a:t>
             </a:fld>
             <a:endParaRPr lang="en-US" dirty="0"/>
           </a:p>
@@ -17309,7 +18651,7 @@
           <a:p>
             <a:fld id="{6D22F896-40B5-4ADD-8801-0D06FADFA095}" type="slidenum">
               <a:rPr lang="en-US" dirty="0"/>
-              <a:t>‹N›</a:t>
+              <a:t>‹#›</a:t>
             </a:fld>
             <a:endParaRPr lang="en-US" dirty="0"/>
           </a:p>
@@ -18798,7 +20140,7 @@
           <a:p>
             <a:fld id="{A51D804C-9192-1442-8FC2-D1409F16AFE8}" type="datetime1">
               <a:rPr lang="it-IT" smtClean="0"/>
-              <a:t>04/01/2018</a:t>
+              <a:t>05/01/18</a:t>
             </a:fld>
             <a:endParaRPr lang="en-US" dirty="0"/>
           </a:p>
@@ -18850,7 +20192,7 @@
           <a:p>
             <a:fld id="{6D22F896-40B5-4ADD-8801-0D06FADFA095}" type="slidenum">
               <a:rPr lang="en-US" dirty="0"/>
-              <a:t>‹N›</a:t>
+              <a:t>‹#›</a:t>
             </a:fld>
             <a:endParaRPr lang="en-US" dirty="0"/>
           </a:p>
@@ -19043,7 +20385,7 @@
           <a:p>
             <a:fld id="{A7C402B9-E8CC-854C-A8E1-90183018B3BF}" type="datetime1">
               <a:rPr lang="it-IT" smtClean="0"/>
-              <a:t>04/01/2018</a:t>
+              <a:t>05/01/18</a:t>
             </a:fld>
             <a:endParaRPr lang="en-US" dirty="0"/>
           </a:p>
@@ -19122,7 +20464,7 @@
             <a:fld id="{6D22F896-40B5-4ADD-8801-0D06FADFA095}" type="slidenum">
               <a:rPr lang="en-US" dirty="0"/>
               <a:pPr/>
-              <a:t>‹N›</a:t>
+              <a:t>‹#›</a:t>
             </a:fld>
             <a:endParaRPr lang="en-US" dirty="0"/>
           </a:p>
@@ -19897,7 +21239,7 @@
           <p:cNvPr id="2" name="Titolo 1">
             <a:extLst>
               <a:ext uri="{FF2B5EF4-FFF2-40B4-BE49-F238E27FC236}">
-                <a16:creationId xmlns:a16="http://schemas.microsoft.com/office/drawing/2014/main" id="{A726286A-28EA-445B-BC96-27A481D1FBBF}"/>
+                <a16:creationId xmlns:a16="http://schemas.microsoft.com/office/drawing/2014/main" xmlns="" id="{A726286A-28EA-445B-BC96-27A481D1FBBF}"/>
               </a:ext>
             </a:extLst>
           </p:cNvPr>
@@ -19934,7 +21276,7 @@
           <p:cNvPr id="3" name="Segnaposto contenuto 2">
             <a:extLst>
               <a:ext uri="{FF2B5EF4-FFF2-40B4-BE49-F238E27FC236}">
-                <a16:creationId xmlns:a16="http://schemas.microsoft.com/office/drawing/2014/main" id="{2D266D55-1B1A-4981-A42E-446AA7D402D6}"/>
+                <a16:creationId xmlns:a16="http://schemas.microsoft.com/office/drawing/2014/main" xmlns="" id="{2D266D55-1B1A-4981-A42E-446AA7D402D6}"/>
               </a:ext>
             </a:extLst>
           </p:cNvPr>
@@ -19959,7 +21301,7 @@
           <p:cNvPr id="4" name="Segnaposto numero diapositiva 3">
             <a:extLst>
               <a:ext uri="{FF2B5EF4-FFF2-40B4-BE49-F238E27FC236}">
-                <a16:creationId xmlns:a16="http://schemas.microsoft.com/office/drawing/2014/main" id="{5BC8A6E3-88AD-4979-BA2A-A318BDDACF83}"/>
+                <a16:creationId xmlns:a16="http://schemas.microsoft.com/office/drawing/2014/main" xmlns="" id="{5BC8A6E3-88AD-4979-BA2A-A318BDDACF83}"/>
               </a:ext>
             </a:extLst>
           </p:cNvPr>
@@ -20404,8 +21746,8 @@
           <a:lstStyle/>
           <a:p>
             <a:r>
-              <a:rPr lang="en-US" sz="6600" dirty="0"/>
-              <a:t>Performance</a:t>
+              <a:rPr lang="en-US" dirty="0" smtClean="0"/>
+              <a:t>Execution</a:t>
             </a:r>
             <a:endParaRPr lang="en-US" dirty="0"/>
           </a:p>
@@ -20469,7 +21811,7 @@
           <p:cNvPr id="2" name="Titolo 1">
             <a:extLst>
               <a:ext uri="{FF2B5EF4-FFF2-40B4-BE49-F238E27FC236}">
-                <a16:creationId xmlns:a16="http://schemas.microsoft.com/office/drawing/2014/main" id="{82E4D137-6351-4496-B0DE-EE5D2D2FC685}"/>
+                <a16:creationId xmlns:a16="http://schemas.microsoft.com/office/drawing/2014/main" xmlns="" id="{82E4D137-6351-4496-B0DE-EE5D2D2FC685}"/>
               </a:ext>
             </a:extLst>
           </p:cNvPr>
@@ -20500,7 +21842,7 @@
           <p:cNvPr id="3" name="Segnaposto contenuto 2">
             <a:extLst>
               <a:ext uri="{FF2B5EF4-FFF2-40B4-BE49-F238E27FC236}">
-                <a16:creationId xmlns:a16="http://schemas.microsoft.com/office/drawing/2014/main" id="{D1AD23D3-52EB-43AE-B408-78EE484130B1}"/>
+                <a16:creationId xmlns:a16="http://schemas.microsoft.com/office/drawing/2014/main" xmlns="" id="{D1AD23D3-52EB-43AE-B408-78EE484130B1}"/>
               </a:ext>
             </a:extLst>
           </p:cNvPr>
@@ -20525,7 +21867,7 @@
           <p:cNvPr id="4" name="Segnaposto numero diapositiva 3">
             <a:extLst>
               <a:ext uri="{FF2B5EF4-FFF2-40B4-BE49-F238E27FC236}">
-                <a16:creationId xmlns:a16="http://schemas.microsoft.com/office/drawing/2014/main" id="{44344993-EB5E-481E-9648-C751E3522B27}"/>
+                <a16:creationId xmlns:a16="http://schemas.microsoft.com/office/drawing/2014/main" xmlns="" id="{44344993-EB5E-481E-9648-C751E3522B27}"/>
               </a:ext>
             </a:extLst>
           </p:cNvPr>
@@ -20554,7 +21896,7 @@
           <p:cNvPr id="5" name="Grafico 4">
             <a:extLst>
               <a:ext uri="{FF2B5EF4-FFF2-40B4-BE49-F238E27FC236}">
-                <a16:creationId xmlns:a16="http://schemas.microsoft.com/office/drawing/2014/main" id="{D2FAD8B6-79C6-44E9-93E3-A22CD9B2457B}"/>
+                <a16:creationId xmlns:a16="http://schemas.microsoft.com/office/drawing/2014/main" xmlns="" id="{D2FAD8B6-79C6-44E9-93E3-A22CD9B2457B}"/>
               </a:ext>
             </a:extLst>
           </p:cNvPr>
@@ -20614,7 +21956,7 @@
           <p:cNvPr id="2" name="Segnaposto numero diapositiva 1">
             <a:extLst>
               <a:ext uri="{FF2B5EF4-FFF2-40B4-BE49-F238E27FC236}">
-                <a16:creationId xmlns:a16="http://schemas.microsoft.com/office/drawing/2014/main" id="{D52846D3-11F6-459C-8F16-859F00A0620B}"/>
+                <a16:creationId xmlns:a16="http://schemas.microsoft.com/office/drawing/2014/main" xmlns="" id="{D52846D3-11F6-459C-8F16-859F00A0620B}"/>
               </a:ext>
             </a:extLst>
           </p:cNvPr>
@@ -20643,7 +21985,7 @@
           <p:cNvPr id="6" name="Grafico 5">
             <a:extLst>
               <a:ext uri="{FF2B5EF4-FFF2-40B4-BE49-F238E27FC236}">
-                <a16:creationId xmlns:a16="http://schemas.microsoft.com/office/drawing/2014/main" id="{A6D627D2-81FA-4782-A659-8360C94599CB}"/>
+                <a16:creationId xmlns:a16="http://schemas.microsoft.com/office/drawing/2014/main" xmlns="" id="{A6D627D2-81FA-4782-A659-8360C94599CB}"/>
               </a:ext>
             </a:extLst>
           </p:cNvPr>
@@ -20653,14 +21995,14 @@
           <p:nvPr>
             <p:extLst>
               <p:ext uri="{D42A27DB-BD31-4B8C-83A1-F6EECF244321}">
-                <p14:modId xmlns:p14="http://schemas.microsoft.com/office/powerpoint/2010/main" val="2077326931"/>
+                <p14:modId xmlns:p14="http://schemas.microsoft.com/office/powerpoint/2010/main" val="1983865418"/>
               </p:ext>
             </p:extLst>
           </p:nvPr>
         </p:nvGraphicFramePr>
         <p:xfrm>
-          <a:off x="-108294" y="-682108"/>
-          <a:ext cx="12408588" cy="8222217"/>
+          <a:off x="0" y="0"/>
+          <a:ext cx="12192000" cy="6858000"/>
         </p:xfrm>
         <a:graphic>
           <a:graphicData uri="http://schemas.openxmlformats.org/drawingml/2006/chart">
@@ -20708,127 +22050,27 @@
             <p:ph type="title"/>
           </p:nvPr>
         </p:nvSpPr>
-        <p:spPr/>
+        <p:spPr>
+          <a:xfrm>
+            <a:off x="3344216" y="2074729"/>
+            <a:ext cx="5490224" cy="3163095"/>
+          </a:xfrm>
+        </p:spPr>
         <p:txBody>
-          <a:bodyPr/>
+          <a:bodyPr anchor="ctr"/>
           <a:lstStyle/>
           <a:p>
             <a:r>
-              <a:rPr lang="en-US" dirty="0"/>
-              <a:t>Repository</a:t>
+              <a:rPr lang="en-US" sz="6600" dirty="0"/>
+              <a:t>Performance</a:t>
             </a:r>
+            <a:endParaRPr lang="en-US" dirty="0"/>
           </a:p>
         </p:txBody>
       </p:sp>
       <p:sp>
         <p:nvSpPr>
-          <p:cNvPr id="3" name="Content Placeholder 2"/>
-          <p:cNvSpPr>
-            <a:spLocks noGrp="1"/>
-          </p:cNvSpPr>
-          <p:nvPr>
-            <p:ph idx="1"/>
-          </p:nvPr>
-        </p:nvSpPr>
-        <p:spPr>
-          <a:xfrm>
-            <a:off x="5065177" y="1202681"/>
-            <a:ext cx="6281873" cy="1345210"/>
-          </a:xfrm>
-        </p:spPr>
-        <p:txBody>
-          <a:bodyPr>
-            <a:normAutofit/>
-          </a:bodyPr>
-          <a:lstStyle/>
-          <a:p>
-            <a:r>
-              <a:rPr lang="en-US" dirty="0"/>
-              <a:t>The whole project with code, math model, instances, presentation and benchmark results are available on a </a:t>
-            </a:r>
-            <a:r>
-              <a:rPr lang="en-US" b="1" dirty="0"/>
-              <a:t>GitHub </a:t>
-            </a:r>
-            <a:r>
-              <a:rPr lang="en-US" dirty="0"/>
-              <a:t>public repository:</a:t>
-            </a:r>
-          </a:p>
-        </p:txBody>
-      </p:sp>
-      <p:sp>
-        <p:nvSpPr>
-          <p:cNvPr id="4" name="TextBox 3"/>
-          <p:cNvSpPr txBox="1"/>
-          <p:nvPr/>
-        </p:nvSpPr>
-        <p:spPr>
-          <a:xfrm>
-            <a:off x="5511746" y="4958856"/>
-            <a:ext cx="5708341" cy="369332"/>
-          </a:xfrm>
-          <a:prstGeom prst="rect">
-            <a:avLst/>
-          </a:prstGeom>
-          <a:noFill/>
-        </p:spPr>
-        <p:txBody>
-          <a:bodyPr wrap="square" rtlCol="0">
-            <a:spAutoFit/>
-          </a:bodyPr>
-          <a:lstStyle/>
-          <a:p>
-            <a:r>
-              <a:rPr lang="en-US" dirty="0">
-                <a:solidFill>
-                  <a:srgbClr val="002060"/>
-                </a:solidFill>
-                <a:hlinkClick r:id="rId2"/>
-              </a:rPr>
-              <a:t>https://github.com/Jacopx/OMA_ExamTimeTable</a:t>
-            </a:r>
-            <a:endParaRPr lang="en-US" dirty="0">
-              <a:solidFill>
-                <a:srgbClr val="002060"/>
-              </a:solidFill>
-            </a:endParaRPr>
-          </a:p>
-        </p:txBody>
-      </p:sp>
-      <p:pic>
-        <p:nvPicPr>
-          <p:cNvPr id="5" name="Picture 4"/>
-          <p:cNvPicPr>
-            <a:picLocks noChangeAspect="1"/>
-          </p:cNvPicPr>
-          <p:nvPr/>
-        </p:nvPicPr>
-        <p:blipFill>
-          <a:blip r:embed="rId3">
-            <a:extLst>
-              <a:ext uri="{28A0092B-C50C-407E-A947-70E740481C1C}">
-                <a14:useLocalDpi xmlns:a14="http://schemas.microsoft.com/office/drawing/2010/main" val="0"/>
-              </a:ext>
-            </a:extLst>
-          </a:blip>
-          <a:stretch>
-            <a:fillRect/>
-          </a:stretch>
-        </p:blipFill>
-        <p:spPr>
-          <a:xfrm>
-            <a:off x="5042573" y="2645545"/>
-            <a:ext cx="6240948" cy="2313311"/>
-          </a:xfrm>
-          <a:prstGeom prst="rect">
-            <a:avLst/>
-          </a:prstGeom>
-        </p:spPr>
-      </p:pic>
-      <p:sp>
-        <p:nvSpPr>
-          <p:cNvPr id="6" name="Slide Number Placeholder 5"/>
+          <p:cNvPr id="4" name="Slide Number Placeholder 3"/>
           <p:cNvSpPr>
             <a:spLocks noGrp="1"/>
           </p:cNvSpPr>
@@ -20852,7 +22094,7 @@
     </p:spTree>
     <p:extLst>
       <p:ext uri="{BB962C8B-B14F-4D97-AF65-F5344CB8AC3E}">
-        <p14:creationId xmlns:p14="http://schemas.microsoft.com/office/powerpoint/2010/main" val="490935846"/>
+        <p14:creationId xmlns:p14="http://schemas.microsoft.com/office/powerpoint/2010/main" val="1235434602"/>
       </p:ext>
     </p:extLst>
   </p:cSld>
@@ -21049,6 +22291,649 @@
       </p:grpSpPr>
       <p:sp>
         <p:nvSpPr>
+          <p:cNvPr id="5" name="Title 4"/>
+          <p:cNvSpPr>
+            <a:spLocks noGrp="1"/>
+          </p:cNvSpPr>
+          <p:nvPr>
+            <p:ph type="title"/>
+          </p:nvPr>
+        </p:nvSpPr>
+        <p:spPr/>
+        <p:txBody>
+          <a:bodyPr/>
+          <a:lstStyle/>
+          <a:p>
+            <a:r>
+              <a:rPr lang="en-US" dirty="0" smtClean="0"/>
+              <a:t>Benchmark</a:t>
+            </a:r>
+            <a:endParaRPr lang="en-US" dirty="0"/>
+          </a:p>
+        </p:txBody>
+      </p:sp>
+      <p:sp>
+        <p:nvSpPr>
+          <p:cNvPr id="6" name="Content Placeholder 5"/>
+          <p:cNvSpPr>
+            <a:spLocks noGrp="1"/>
+          </p:cNvSpPr>
+          <p:nvPr>
+            <p:ph idx="1"/>
+          </p:nvPr>
+        </p:nvSpPr>
+        <p:spPr/>
+        <p:txBody>
+          <a:bodyPr/>
+          <a:lstStyle/>
+          <a:p>
+            <a:r>
+              <a:rPr lang="en-US" dirty="0" smtClean="0"/>
+              <a:t>Our algorithms is flown over 5 </a:t>
+            </a:r>
+            <a:r>
+              <a:rPr lang="en-US" dirty="0" err="1" smtClean="0"/>
+              <a:t>differente</a:t>
+            </a:r>
+            <a:r>
+              <a:rPr lang="en-US" dirty="0" smtClean="0"/>
+              <a:t> steps:</a:t>
+            </a:r>
+          </a:p>
+          <a:p>
+            <a:pPr marL="342900" indent="-342900">
+              <a:buFont typeface="+mj-lt"/>
+              <a:buAutoNum type="arabicPeriod"/>
+            </a:pPr>
+            <a:r>
+              <a:rPr lang="en-US" dirty="0" smtClean="0"/>
+              <a:t>v0.1: </a:t>
+            </a:r>
+            <a:r>
+              <a:rPr lang="en-US" dirty="0" err="1" smtClean="0"/>
+              <a:t>Tabu</a:t>
+            </a:r>
+            <a:r>
+              <a:rPr lang="en-US" dirty="0" smtClean="0"/>
+              <a:t> List search</a:t>
+            </a:r>
+          </a:p>
+          <a:p>
+            <a:pPr marL="342900" indent="-342900">
+              <a:buFont typeface="+mj-lt"/>
+              <a:buAutoNum type="arabicPeriod"/>
+            </a:pPr>
+            <a:r>
+              <a:rPr lang="en-US" dirty="0" smtClean="0"/>
+              <a:t>v0.3: Greedy </a:t>
+            </a:r>
+            <a:r>
+              <a:rPr lang="en-US" dirty="0" err="1" smtClean="0"/>
+              <a:t>Prepatation</a:t>
+            </a:r>
+            <a:r>
+              <a:rPr lang="en-US" dirty="0" smtClean="0"/>
+              <a:t> at begin</a:t>
+            </a:r>
+          </a:p>
+          <a:p>
+            <a:pPr marL="342900" indent="-342900">
+              <a:buFont typeface="+mj-lt"/>
+              <a:buAutoNum type="arabicPeriod"/>
+            </a:pPr>
+            <a:r>
+              <a:rPr lang="en-US" dirty="0" smtClean="0"/>
+              <a:t>v0.4: </a:t>
+            </a:r>
+            <a:r>
+              <a:rPr lang="en-US" dirty="0" err="1" smtClean="0"/>
+              <a:t>bla</a:t>
+            </a:r>
+            <a:r>
+              <a:rPr lang="en-US" dirty="0" smtClean="0"/>
+              <a:t> </a:t>
+            </a:r>
+            <a:r>
+              <a:rPr lang="en-US" dirty="0" err="1" smtClean="0"/>
+              <a:t>bla</a:t>
+            </a:r>
+            <a:r>
+              <a:rPr lang="en-US" dirty="0" smtClean="0"/>
+              <a:t> </a:t>
+            </a:r>
+            <a:r>
+              <a:rPr lang="en-US" dirty="0" err="1" smtClean="0"/>
+              <a:t>bla</a:t>
+            </a:r>
+            <a:endParaRPr lang="en-US" dirty="0" smtClean="0"/>
+          </a:p>
+          <a:p>
+            <a:pPr marL="342900" indent="-342900">
+              <a:buFont typeface="+mj-lt"/>
+              <a:buAutoNum type="arabicPeriod"/>
+            </a:pPr>
+            <a:r>
+              <a:rPr lang="en-US" dirty="0" smtClean="0"/>
+              <a:t>v0.5: </a:t>
+            </a:r>
+            <a:r>
+              <a:rPr lang="en-US" dirty="0" err="1" smtClean="0"/>
+              <a:t>bla</a:t>
+            </a:r>
+            <a:r>
+              <a:rPr lang="en-US" dirty="0" smtClean="0"/>
+              <a:t> </a:t>
+            </a:r>
+            <a:r>
+              <a:rPr lang="en-US" dirty="0" err="1" smtClean="0"/>
+              <a:t>bla</a:t>
+            </a:r>
+            <a:r>
+              <a:rPr lang="en-US" dirty="0" smtClean="0"/>
+              <a:t> </a:t>
+            </a:r>
+            <a:r>
+              <a:rPr lang="en-US" dirty="0" err="1" smtClean="0"/>
+              <a:t>bla</a:t>
+            </a:r>
+            <a:endParaRPr lang="en-US" dirty="0" smtClean="0"/>
+          </a:p>
+          <a:p>
+            <a:pPr marL="342900" indent="-342900">
+              <a:buFont typeface="+mj-lt"/>
+              <a:buAutoNum type="arabicPeriod"/>
+            </a:pPr>
+            <a:r>
+              <a:rPr lang="en-US" dirty="0" smtClean="0"/>
+              <a:t>v0.7: latest </a:t>
+            </a:r>
+            <a:r>
+              <a:rPr lang="en-US" dirty="0" err="1" smtClean="0"/>
+              <a:t>bla</a:t>
+            </a:r>
+            <a:r>
+              <a:rPr lang="en-US" dirty="0" smtClean="0"/>
+              <a:t> </a:t>
+            </a:r>
+            <a:r>
+              <a:rPr lang="en-US" dirty="0" err="1" smtClean="0"/>
+              <a:t>bla</a:t>
+            </a:r>
+            <a:r>
+              <a:rPr lang="en-US" dirty="0" smtClean="0"/>
+              <a:t> </a:t>
+            </a:r>
+            <a:r>
+              <a:rPr lang="en-US" dirty="0" err="1" smtClean="0"/>
+              <a:t>bla</a:t>
+            </a:r>
+            <a:endParaRPr lang="en-US" dirty="0" smtClean="0"/>
+          </a:p>
+          <a:p>
+            <a:pPr marL="342900" indent="-342900">
+              <a:buFont typeface="+mj-lt"/>
+              <a:buAutoNum type="arabicPeriod"/>
+            </a:pPr>
+            <a:endParaRPr lang="en-US" dirty="0"/>
+          </a:p>
+          <a:p>
+            <a:r>
+              <a:rPr lang="en-US" dirty="0" smtClean="0"/>
+              <a:t>In the next graph is possible to view the benchmark results at each step. </a:t>
+            </a:r>
+            <a:endParaRPr lang="en-US" dirty="0"/>
+          </a:p>
+        </p:txBody>
+      </p:sp>
+      <p:sp>
+        <p:nvSpPr>
+          <p:cNvPr id="4" name="Slide Number Placeholder 3"/>
+          <p:cNvSpPr>
+            <a:spLocks noGrp="1"/>
+          </p:cNvSpPr>
+          <p:nvPr>
+            <p:ph type="sldNum" sz="quarter" idx="12"/>
+          </p:nvPr>
+        </p:nvSpPr>
+        <p:spPr/>
+        <p:txBody>
+          <a:bodyPr/>
+          <a:lstStyle/>
+          <a:p>
+            <a:fld id="{6D22F896-40B5-4ADD-8801-0D06FADFA095}" type="slidenum">
+              <a:rPr lang="en-US" smtClean="0"/>
+              <a:t>20</a:t>
+            </a:fld>
+            <a:endParaRPr lang="en-US" dirty="0"/>
+          </a:p>
+        </p:txBody>
+      </p:sp>
+    </p:spTree>
+    <p:extLst>
+      <p:ext uri="{BB962C8B-B14F-4D97-AF65-F5344CB8AC3E}">
+        <p14:creationId xmlns:p14="http://schemas.microsoft.com/office/powerpoint/2010/main" val="1928563504"/>
+      </p:ext>
+    </p:extLst>
+  </p:cSld>
+  <p:clrMapOvr>
+    <a:masterClrMapping/>
+  </p:clrMapOvr>
+</p:sld>
+</file>
+
+<file path=ppt/slides/slide21.xml><?xml version="1.0" encoding="utf-8"?>
+<p:sld xmlns:a="http://schemas.openxmlformats.org/drawingml/2006/main" xmlns:r="http://schemas.openxmlformats.org/officeDocument/2006/relationships" xmlns:p="http://schemas.openxmlformats.org/presentationml/2006/main">
+  <p:cSld>
+    <p:spTree>
+      <p:nvGrpSpPr>
+        <p:cNvPr id="1" name=""/>
+        <p:cNvGrpSpPr/>
+        <p:nvPr/>
+      </p:nvGrpSpPr>
+      <p:grpSpPr>
+        <a:xfrm>
+          <a:off x="0" y="0"/>
+          <a:ext cx="0" cy="0"/>
+          <a:chOff x="0" y="0"/>
+          <a:chExt cx="0" cy="0"/>
+        </a:xfrm>
+      </p:grpSpPr>
+      <p:sp>
+        <p:nvSpPr>
+          <p:cNvPr id="4" name="Slide Number Placeholder 3"/>
+          <p:cNvSpPr>
+            <a:spLocks noGrp="1"/>
+          </p:cNvSpPr>
+          <p:nvPr>
+            <p:ph type="sldNum" sz="quarter" idx="12"/>
+          </p:nvPr>
+        </p:nvSpPr>
+        <p:spPr/>
+        <p:txBody>
+          <a:bodyPr/>
+          <a:lstStyle/>
+          <a:p>
+            <a:fld id="{6D22F896-40B5-4ADD-8801-0D06FADFA095}" type="slidenum">
+              <a:rPr lang="en-US" smtClean="0"/>
+              <a:t>21</a:t>
+            </a:fld>
+            <a:endParaRPr lang="en-US" dirty="0"/>
+          </a:p>
+        </p:txBody>
+      </p:sp>
+      <p:graphicFrame>
+        <p:nvGraphicFramePr>
+          <p:cNvPr id="7" name="Chart 6"/>
+          <p:cNvGraphicFramePr>
+            <a:graphicFrameLocks/>
+          </p:cNvGraphicFramePr>
+          <p:nvPr>
+            <p:extLst>
+              <p:ext uri="{D42A27DB-BD31-4B8C-83A1-F6EECF244321}">
+                <p14:modId xmlns:p14="http://schemas.microsoft.com/office/powerpoint/2010/main" val="922138821"/>
+              </p:ext>
+            </p:extLst>
+          </p:nvPr>
+        </p:nvGraphicFramePr>
+        <p:xfrm>
+          <a:off x="0" y="0"/>
+          <a:ext cx="12192000" cy="6858000"/>
+        </p:xfrm>
+        <a:graphic>
+          <a:graphicData uri="http://schemas.openxmlformats.org/drawingml/2006/chart">
+            <c:chart xmlns:c="http://schemas.openxmlformats.org/drawingml/2006/chart" xmlns:r="http://schemas.openxmlformats.org/officeDocument/2006/relationships" r:id="rId2"/>
+          </a:graphicData>
+        </a:graphic>
+      </p:graphicFrame>
+    </p:spTree>
+    <p:extLst>
+      <p:ext uri="{BB962C8B-B14F-4D97-AF65-F5344CB8AC3E}">
+        <p14:creationId xmlns:p14="http://schemas.microsoft.com/office/powerpoint/2010/main" val="268777541"/>
+      </p:ext>
+    </p:extLst>
+  </p:cSld>
+  <p:clrMapOvr>
+    <a:masterClrMapping/>
+  </p:clrMapOvr>
+</p:sld>
+</file>
+
+<file path=ppt/slides/slide22.xml><?xml version="1.0" encoding="utf-8"?>
+<p:sld xmlns:a="http://schemas.openxmlformats.org/drawingml/2006/main" xmlns:r="http://schemas.openxmlformats.org/officeDocument/2006/relationships" xmlns:p="http://schemas.openxmlformats.org/presentationml/2006/main">
+  <p:cSld>
+    <p:spTree>
+      <p:nvGrpSpPr>
+        <p:cNvPr id="1" name=""/>
+        <p:cNvGrpSpPr/>
+        <p:nvPr/>
+      </p:nvGrpSpPr>
+      <p:grpSpPr>
+        <a:xfrm>
+          <a:off x="0" y="0"/>
+          <a:ext cx="0" cy="0"/>
+          <a:chOff x="0" y="0"/>
+          <a:chExt cx="0" cy="0"/>
+        </a:xfrm>
+      </p:grpSpPr>
+      <p:sp>
+        <p:nvSpPr>
+          <p:cNvPr id="5" name="Title 4"/>
+          <p:cNvSpPr>
+            <a:spLocks noGrp="1"/>
+          </p:cNvSpPr>
+          <p:nvPr>
+            <p:ph type="title"/>
+          </p:nvPr>
+        </p:nvSpPr>
+        <p:spPr/>
+        <p:txBody>
+          <a:bodyPr/>
+          <a:lstStyle/>
+          <a:p>
+            <a:r>
+              <a:rPr lang="en-US" dirty="0" smtClean="0"/>
+              <a:t>Latest Result</a:t>
+            </a:r>
+            <a:endParaRPr lang="en-US" dirty="0"/>
+          </a:p>
+        </p:txBody>
+      </p:sp>
+      <p:pic>
+        <p:nvPicPr>
+          <p:cNvPr id="2" name="Content Placeholder 1"/>
+          <p:cNvPicPr>
+            <a:picLocks noGrp="1" noChangeAspect="1"/>
+          </p:cNvPicPr>
+          <p:nvPr>
+            <p:ph idx="1"/>
+          </p:nvPr>
+        </p:nvPicPr>
+        <p:blipFill>
+          <a:blip r:embed="rId2">
+            <a:extLst>
+              <a:ext uri="{28A0092B-C50C-407E-A947-70E740481C1C}">
+                <a14:useLocalDpi xmlns:a14="http://schemas.microsoft.com/office/drawing/2010/main" val="0"/>
+              </a:ext>
+            </a:extLst>
+          </a:blip>
+          <a:stretch>
+            <a:fillRect/>
+          </a:stretch>
+        </p:blipFill>
+        <p:spPr>
+          <a:xfrm>
+            <a:off x="6965005" y="1596646"/>
+            <a:ext cx="2734469" cy="3962999"/>
+          </a:xfrm>
+        </p:spPr>
+      </p:pic>
+      <p:sp>
+        <p:nvSpPr>
+          <p:cNvPr id="4" name="Slide Number Placeholder 3"/>
+          <p:cNvSpPr>
+            <a:spLocks noGrp="1"/>
+          </p:cNvSpPr>
+          <p:nvPr>
+            <p:ph type="sldNum" sz="quarter" idx="12"/>
+          </p:nvPr>
+        </p:nvSpPr>
+        <p:spPr/>
+        <p:txBody>
+          <a:bodyPr/>
+          <a:lstStyle/>
+          <a:p>
+            <a:fld id="{6D22F896-40B5-4ADD-8801-0D06FADFA095}" type="slidenum">
+              <a:rPr lang="en-US" smtClean="0"/>
+              <a:t>22</a:t>
+            </a:fld>
+            <a:endParaRPr lang="en-US" dirty="0"/>
+          </a:p>
+        </p:txBody>
+      </p:sp>
+      <p:sp>
+        <p:nvSpPr>
+          <p:cNvPr id="3" name="TextBox 2"/>
+          <p:cNvSpPr txBox="1"/>
+          <p:nvPr/>
+        </p:nvSpPr>
+        <p:spPr>
+          <a:xfrm>
+            <a:off x="1128409" y="5593979"/>
+            <a:ext cx="10255871" cy="830997"/>
+          </a:xfrm>
+          <a:prstGeom prst="rect">
+            <a:avLst/>
+          </a:prstGeom>
+          <a:noFill/>
+        </p:spPr>
+        <p:txBody>
+          <a:bodyPr wrap="square" rtlCol="0">
+            <a:spAutoFit/>
+          </a:bodyPr>
+          <a:lstStyle/>
+          <a:p>
+            <a:pPr algn="ctr"/>
+            <a:r>
+              <a:rPr lang="en-US" sz="4800" dirty="0" smtClean="0"/>
+              <a:t>FOTO TEMPORANEA</a:t>
+            </a:r>
+            <a:endParaRPr lang="en-US" sz="4800" dirty="0"/>
+          </a:p>
+        </p:txBody>
+      </p:sp>
+    </p:spTree>
+    <p:extLst>
+      <p:ext uri="{BB962C8B-B14F-4D97-AF65-F5344CB8AC3E}">
+        <p14:creationId xmlns:p14="http://schemas.microsoft.com/office/powerpoint/2010/main" val="1723366013"/>
+      </p:ext>
+    </p:extLst>
+  </p:cSld>
+  <p:clrMapOvr>
+    <a:masterClrMapping/>
+  </p:clrMapOvr>
+</p:sld>
+</file>
+
+<file path=ppt/slides/slide23.xml><?xml version="1.0" encoding="utf-8"?>
+<p:sld xmlns:a="http://schemas.openxmlformats.org/drawingml/2006/main" xmlns:r="http://schemas.openxmlformats.org/officeDocument/2006/relationships" xmlns:p="http://schemas.openxmlformats.org/presentationml/2006/main">
+  <p:cSld>
+    <p:spTree>
+      <p:nvGrpSpPr>
+        <p:cNvPr id="1" name=""/>
+        <p:cNvGrpSpPr/>
+        <p:nvPr/>
+      </p:nvGrpSpPr>
+      <p:grpSpPr>
+        <a:xfrm>
+          <a:off x="0" y="0"/>
+          <a:ext cx="0" cy="0"/>
+          <a:chOff x="0" y="0"/>
+          <a:chExt cx="0" cy="0"/>
+        </a:xfrm>
+      </p:grpSpPr>
+      <p:sp>
+        <p:nvSpPr>
+          <p:cNvPr id="2" name="Title 1"/>
+          <p:cNvSpPr>
+            <a:spLocks noGrp="1"/>
+          </p:cNvSpPr>
+          <p:nvPr>
+            <p:ph type="title"/>
+          </p:nvPr>
+        </p:nvSpPr>
+        <p:spPr/>
+        <p:txBody>
+          <a:bodyPr/>
+          <a:lstStyle/>
+          <a:p>
+            <a:r>
+              <a:rPr lang="en-US" dirty="0"/>
+              <a:t>Repository</a:t>
+            </a:r>
+          </a:p>
+        </p:txBody>
+      </p:sp>
+      <p:sp>
+        <p:nvSpPr>
+          <p:cNvPr id="3" name="Content Placeholder 2"/>
+          <p:cNvSpPr>
+            <a:spLocks noGrp="1"/>
+          </p:cNvSpPr>
+          <p:nvPr>
+            <p:ph idx="1"/>
+          </p:nvPr>
+        </p:nvSpPr>
+        <p:spPr>
+          <a:xfrm>
+            <a:off x="5065177" y="1202681"/>
+            <a:ext cx="6281873" cy="1345210"/>
+          </a:xfrm>
+        </p:spPr>
+        <p:txBody>
+          <a:bodyPr>
+            <a:normAutofit/>
+          </a:bodyPr>
+          <a:lstStyle/>
+          <a:p>
+            <a:r>
+              <a:rPr lang="en-US" dirty="0"/>
+              <a:t>The whole project with code, math model, instances, presentation and benchmark results are available on a </a:t>
+            </a:r>
+            <a:r>
+              <a:rPr lang="en-US" b="1" dirty="0"/>
+              <a:t>GitHub </a:t>
+            </a:r>
+            <a:r>
+              <a:rPr lang="en-US" dirty="0"/>
+              <a:t>public repository:</a:t>
+            </a:r>
+          </a:p>
+        </p:txBody>
+      </p:sp>
+      <p:sp>
+        <p:nvSpPr>
+          <p:cNvPr id="4" name="TextBox 3"/>
+          <p:cNvSpPr txBox="1"/>
+          <p:nvPr/>
+        </p:nvSpPr>
+        <p:spPr>
+          <a:xfrm>
+            <a:off x="5511746" y="4958856"/>
+            <a:ext cx="5708341" cy="369332"/>
+          </a:xfrm>
+          <a:prstGeom prst="rect">
+            <a:avLst/>
+          </a:prstGeom>
+          <a:noFill/>
+        </p:spPr>
+        <p:txBody>
+          <a:bodyPr wrap="square" rtlCol="0">
+            <a:spAutoFit/>
+          </a:bodyPr>
+          <a:lstStyle/>
+          <a:p>
+            <a:r>
+              <a:rPr lang="en-US" dirty="0">
+                <a:solidFill>
+                  <a:srgbClr val="002060"/>
+                </a:solidFill>
+                <a:hlinkClick r:id="rId2"/>
+              </a:rPr>
+              <a:t>https://github.com/Jacopx/OMA_ExamTimeTable</a:t>
+            </a:r>
+            <a:endParaRPr lang="en-US" dirty="0">
+              <a:solidFill>
+                <a:srgbClr val="002060"/>
+              </a:solidFill>
+            </a:endParaRPr>
+          </a:p>
+        </p:txBody>
+      </p:sp>
+      <p:pic>
+        <p:nvPicPr>
+          <p:cNvPr id="5" name="Picture 4"/>
+          <p:cNvPicPr>
+            <a:picLocks noChangeAspect="1"/>
+          </p:cNvPicPr>
+          <p:nvPr/>
+        </p:nvPicPr>
+        <p:blipFill>
+          <a:blip r:embed="rId3">
+            <a:extLst>
+              <a:ext uri="{28A0092B-C50C-407E-A947-70E740481C1C}">
+                <a14:useLocalDpi xmlns:a14="http://schemas.microsoft.com/office/drawing/2010/main" val="0"/>
+              </a:ext>
+            </a:extLst>
+          </a:blip>
+          <a:stretch>
+            <a:fillRect/>
+          </a:stretch>
+        </p:blipFill>
+        <p:spPr>
+          <a:xfrm>
+            <a:off x="5042573" y="2645545"/>
+            <a:ext cx="6240948" cy="2313311"/>
+          </a:xfrm>
+          <a:prstGeom prst="rect">
+            <a:avLst/>
+          </a:prstGeom>
+        </p:spPr>
+      </p:pic>
+      <p:sp>
+        <p:nvSpPr>
+          <p:cNvPr id="6" name="Slide Number Placeholder 5"/>
+          <p:cNvSpPr>
+            <a:spLocks noGrp="1"/>
+          </p:cNvSpPr>
+          <p:nvPr>
+            <p:ph type="sldNum" sz="quarter" idx="12"/>
+          </p:nvPr>
+        </p:nvSpPr>
+        <p:spPr/>
+        <p:txBody>
+          <a:bodyPr/>
+          <a:lstStyle/>
+          <a:p>
+            <a:fld id="{6D22F896-40B5-4ADD-8801-0D06FADFA095}" type="slidenum">
+              <a:rPr lang="en-US" smtClean="0"/>
+              <a:t>23</a:t>
+            </a:fld>
+            <a:endParaRPr lang="en-US" dirty="0"/>
+          </a:p>
+        </p:txBody>
+      </p:sp>
+    </p:spTree>
+    <p:extLst>
+      <p:ext uri="{BB962C8B-B14F-4D97-AF65-F5344CB8AC3E}">
+        <p14:creationId xmlns:p14="http://schemas.microsoft.com/office/powerpoint/2010/main" val="490935846"/>
+      </p:ext>
+    </p:extLst>
+  </p:cSld>
+  <p:clrMapOvr>
+    <a:masterClrMapping/>
+  </p:clrMapOvr>
+</p:sld>
+</file>
+
+<file path=ppt/slides/slide24.xml><?xml version="1.0" encoding="utf-8"?>
+<p:sld xmlns:a="http://schemas.openxmlformats.org/drawingml/2006/main" xmlns:r="http://schemas.openxmlformats.org/officeDocument/2006/relationships" xmlns:p="http://schemas.openxmlformats.org/presentationml/2006/main">
+  <p:cSld>
+    <p:spTree>
+      <p:nvGrpSpPr>
+        <p:cNvPr id="1" name=""/>
+        <p:cNvGrpSpPr/>
+        <p:nvPr/>
+      </p:nvGrpSpPr>
+      <p:grpSpPr>
+        <a:xfrm>
+          <a:off x="0" y="0"/>
+          <a:ext cx="0" cy="0"/>
+          <a:chOff x="0" y="0"/>
+          <a:chExt cx="0" cy="0"/>
+        </a:xfrm>
+      </p:grpSpPr>
+      <p:sp>
+        <p:nvSpPr>
           <p:cNvPr id="2" name="Title 1"/>
           <p:cNvSpPr>
             <a:spLocks noGrp="1"/>
@@ -21091,7 +22976,7 @@
           <a:p>
             <a:fld id="{6D22F896-40B5-4ADD-8801-0D06FADFA095}" type="slidenum">
               <a:rPr lang="en-US" smtClean="0"/>
-              <a:t>20</a:t>
+              <a:t>24</a:t>
             </a:fld>
             <a:endParaRPr lang="en-US" dirty="0"/>
           </a:p>

</xml_diff>

<commit_message>
Graph from results to gap %
</commit_message>
<xml_diff>
--- a/PowerPoint/OMA-MZ_03-Presentation.pptx
+++ b/PowerPoint/OMA-MZ_03-Presentation.pptx
@@ -2450,30 +2450,30 @@
           <c:invertIfNegative val="0"/>
           <c:val>
             <c:numRef>
-              <c:f>Foglio1!$I$4:$I$10</c:f>
+              <c:f>Foglio1!$J$4:$J$10</c:f>
               <c:numCache>
-                <c:formatCode>0.000</c:formatCode>
+                <c:formatCode>0.00</c:formatCode>
                 <c:ptCount val="7"/>
                 <c:pt idx="0">
-                  <c:v>176.0</c:v>
+                  <c:v>12.07854352251514</c:v>
                 </c:pt>
                 <c:pt idx="1">
-                  <c:v>50.0</c:v>
+                  <c:v>44.0556031579293</c:v>
                 </c:pt>
                 <c:pt idx="2">
-                  <c:v>55.0</c:v>
+                  <c:v>68.57376207014956</c:v>
                 </c:pt>
                 <c:pt idx="3">
-                  <c:v>13.0</c:v>
+                  <c:v>68.45483635130971</c:v>
                 </c:pt>
                 <c:pt idx="4">
-                  <c:v>18.138</c:v>
+                  <c:v>40.59262994799748</c:v>
                 </c:pt>
                 <c:pt idx="5">
-                  <c:v>5.0</c:v>
+                  <c:v>64.22637225914396</c:v>
                 </c:pt>
                 <c:pt idx="6">
-                  <c:v>15.0</c:v>
+                  <c:v>49.24926129078125</c:v>
                 </c:pt>
               </c:numCache>
             </c:numRef>
@@ -2535,30 +2535,30 @@
           <c:invertIfNegative val="0"/>
           <c:val>
             <c:numRef>
-              <c:f>Foglio1!$K$4:$K$10</c:f>
+              <c:f>Foglio1!$L$4:$L$10</c:f>
               <c:numCache>
-                <c:formatCode>0.000</c:formatCode>
+                <c:formatCode>0.00</c:formatCode>
                 <c:ptCount val="7"/>
                 <c:pt idx="0">
-                  <c:v>162.677</c:v>
+                  <c:v>3.594325139842013</c:v>
                 </c:pt>
                 <c:pt idx="1">
-                  <c:v>45.041</c:v>
+                  <c:v>29.76816843672586</c:v>
                 </c:pt>
                 <c:pt idx="2">
-                  <c:v>49.561</c:v>
+                  <c:v>51.90334949015786</c:v>
                 </c:pt>
                 <c:pt idx="3">
-                  <c:v>11.501</c:v>
+                  <c:v>49.03069791357022</c:v>
                 </c:pt>
                 <c:pt idx="4">
-                  <c:v>18.212</c:v>
+                  <c:v>41.16622431430861</c:v>
                 </c:pt>
                 <c:pt idx="5">
-                  <c:v>4.624</c:v>
+                  <c:v>51.87654906525632</c:v>
                 </c:pt>
                 <c:pt idx="6">
-                  <c:v>12.855</c:v>
+                  <c:v>27.90661692619954</c:v>
                 </c:pt>
               </c:numCache>
             </c:numRef>
@@ -2620,30 +2620,30 @@
           <c:invertIfNegative val="0"/>
           <c:val>
             <c:numRef>
-              <c:f>Foglio1!$M$4:$M$10</c:f>
+              <c:f>Foglio1!$N$4:$N$10</c:f>
               <c:numCache>
-                <c:formatCode>0.000</c:formatCode>
+                <c:formatCode>0.00</c:formatCode>
                 <c:ptCount val="7"/>
                 <c:pt idx="0">
-                  <c:v>158.677</c:v>
+                  <c:v>1.047085514330305</c:v>
                 </c:pt>
                 <c:pt idx="1">
-                  <c:v>42.041</c:v>
+                  <c:v>21.1248322472501</c:v>
                 </c:pt>
                 <c:pt idx="2">
-                  <c:v>42.554</c:v>
+                  <c:v>30.42705220242081</c:v>
                 </c:pt>
                 <c:pt idx="3">
-                  <c:v>10.053</c:v>
+                  <c:v>30.26742075690127</c:v>
                 </c:pt>
                 <c:pt idx="4">
-                  <c:v>16.318</c:v>
+                  <c:v>26.48530904683112</c:v>
                 </c:pt>
                 <c:pt idx="5">
-                  <c:v>4.045</c:v>
+                  <c:v>32.85913515764747</c:v>
                 </c:pt>
                 <c:pt idx="6">
-                  <c:v>12.261</c:v>
+                  <c:v>21.99634617908459</c:v>
                 </c:pt>
               </c:numCache>
             </c:numRef>
@@ -2705,30 +2705,30 @@
           <c:invertIfNegative val="0"/>
           <c:val>
             <c:numRef>
-              <c:f>Foglio1!$O$4:$O$10</c:f>
+              <c:f>Foglio1!$R$4:$R$10</c:f>
               <c:numCache>
-                <c:formatCode>0.000</c:formatCode>
+                <c:formatCode>0.00</c:formatCode>
                 <c:ptCount val="7"/>
                 <c:pt idx="0">
-                  <c:v>158.677</c:v>
+                  <c:v>0.44084248345852</c:v>
                 </c:pt>
                 <c:pt idx="1">
-                  <c:v>42.041</c:v>
+                  <c:v>15.79477493040673</c:v>
                 </c:pt>
                 <c:pt idx="2">
-                  <c:v>42.554</c:v>
+                  <c:v>20.83367265188321</c:v>
                 </c:pt>
                 <c:pt idx="3">
-                  <c:v>10.053</c:v>
+                  <c:v>19.97871767513666</c:v>
                 </c:pt>
                 <c:pt idx="4">
-                  <c:v>16.318</c:v>
+                  <c:v>19.6796894033014</c:v>
                 </c:pt>
                 <c:pt idx="5">
-                  <c:v>4.045</c:v>
+                  <c:v>23.03839809655065</c:v>
                 </c:pt>
                 <c:pt idx="6">
-                  <c:v>12.261</c:v>
+                  <c:v>25.35942953350353</c:v>
                 </c:pt>
               </c:numCache>
             </c:numRef>
@@ -2790,30 +2790,30 @@
           <c:invertIfNegative val="0"/>
           <c:val>
             <c:numRef>
-              <c:f>Foglio1!$S$4:$S$10</c:f>
+              <c:f>Foglio1!$X$4:$X$10</c:f>
               <c:numCache>
-                <c:formatCode>0.000</c:formatCode>
+                <c:formatCode>0.00</c:formatCode>
                 <c:ptCount val="7"/>
                 <c:pt idx="0">
-                  <c:v>157.121</c:v>
+                  <c:v>0.0307369037511316</c:v>
                 </c:pt>
                 <c:pt idx="1">
-                  <c:v>38.877</c:v>
+                  <c:v>7.932220110046956</c:v>
                 </c:pt>
                 <c:pt idx="2">
-                  <c:v>36.471</c:v>
+                  <c:v>10.09705649676077</c:v>
                 </c:pt>
                 <c:pt idx="3">
-                  <c:v>8.703</c:v>
+                  <c:v>8.912530733289074</c:v>
                 </c:pt>
                 <c:pt idx="4">
-                  <c:v>14.832</c:v>
+                  <c:v>12.62602895271822</c:v>
                 </c:pt>
                 <c:pt idx="5">
-                  <c:v>3.668</c:v>
+                  <c:v>19.26119153459033</c:v>
                 </c:pt>
                 <c:pt idx="6">
-                  <c:v>10.587</c:v>
+                  <c:v>4.225734134728905</c:v>
                 </c:pt>
               </c:numCache>
             </c:numRef>
@@ -22448,7 +22448,7 @@
           <p:nvPr>
             <p:extLst>
               <p:ext uri="{D42A27DB-BD31-4B8C-83A1-F6EECF244321}">
-                <p14:modId xmlns:p14="http://schemas.microsoft.com/office/powerpoint/2010/main" val="140512359"/>
+                <p14:modId xmlns:p14="http://schemas.microsoft.com/office/powerpoint/2010/main" val="1242880955"/>
               </p:ext>
             </p:extLst>
           </p:nvPr>

</xml_diff>

<commit_message>
Adding best solution, updating presentation and report.
</commit_message>
<xml_diff>
--- a/PowerPoint/OMA-MZ_03-Presentation.pptx
+++ b/PowerPoint/OMA-MZ_03-Presentation.pptx
@@ -384,9 +384,7 @@
                 <c:ext xmlns:c16="http://schemas.microsoft.com/office/drawing/2014/chart" uri="{C3380CC4-5D6E-409C-BE32-E72D297353CC}">
                   <c16:uniqueId val="{00000001-3EB7-4374-AE9A-D38B071EA406}"/>
                 </c:ext>
-                <c:ext xmlns:c15="http://schemas.microsoft.com/office/drawing/2012/chart" uri="{CE6537A1-D6FC-4f65-9D91-7224C49458BB}">
-                  <c15:layout/>
-                </c:ext>
+                <c:ext xmlns:c15="http://schemas.microsoft.com/office/drawing/2012/chart" uri="{CE6537A1-D6FC-4f65-9D91-7224C49458BB}"/>
               </c:extLst>
             </c:dLbl>
             <c:dLbl>
@@ -408,9 +406,7 @@
                 <c:ext xmlns:c16="http://schemas.microsoft.com/office/drawing/2014/chart" uri="{C3380CC4-5D6E-409C-BE32-E72D297353CC}">
                   <c16:uniqueId val="{00000003-3EB7-4374-AE9A-D38B071EA406}"/>
                 </c:ext>
-                <c:ext xmlns:c15="http://schemas.microsoft.com/office/drawing/2012/chart" uri="{CE6537A1-D6FC-4f65-9D91-7224C49458BB}">
-                  <c15:layout/>
-                </c:ext>
+                <c:ext xmlns:c15="http://schemas.microsoft.com/office/drawing/2012/chart" uri="{CE6537A1-D6FC-4f65-9D91-7224C49458BB}"/>
               </c:extLst>
             </c:dLbl>
             <c:dLbl>
@@ -432,9 +428,7 @@
                 <c:ext xmlns:c16="http://schemas.microsoft.com/office/drawing/2014/chart" uri="{C3380CC4-5D6E-409C-BE32-E72D297353CC}">
                   <c16:uniqueId val="{00000005-3EB7-4374-AE9A-D38B071EA406}"/>
                 </c:ext>
-                <c:ext xmlns:c15="http://schemas.microsoft.com/office/drawing/2012/chart" uri="{CE6537A1-D6FC-4f65-9D91-7224C49458BB}">
-                  <c15:layout/>
-                </c:ext>
+                <c:ext xmlns:c15="http://schemas.microsoft.com/office/drawing/2012/chart" uri="{CE6537A1-D6FC-4f65-9D91-7224C49458BB}"/>
               </c:extLst>
             </c:dLbl>
             <c:dLbl>
@@ -456,9 +450,7 @@
                 <c:ext xmlns:c16="http://schemas.microsoft.com/office/drawing/2014/chart" uri="{C3380CC4-5D6E-409C-BE32-E72D297353CC}">
                   <c16:uniqueId val="{00000007-3EB7-4374-AE9A-D38B071EA406}"/>
                 </c:ext>
-                <c:ext xmlns:c15="http://schemas.microsoft.com/office/drawing/2012/chart" uri="{CE6537A1-D6FC-4f65-9D91-7224C49458BB}">
-                  <c15:layout/>
-                </c:ext>
+                <c:ext xmlns:c15="http://schemas.microsoft.com/office/drawing/2012/chart" uri="{CE6537A1-D6FC-4f65-9D91-7224C49458BB}"/>
               </c:extLst>
             </c:dLbl>
             <c:dLbl>
@@ -480,9 +472,7 @@
                 <c:ext xmlns:c16="http://schemas.microsoft.com/office/drawing/2014/chart" uri="{C3380CC4-5D6E-409C-BE32-E72D297353CC}">
                   <c16:uniqueId val="{00000009-3EB7-4374-AE9A-D38B071EA406}"/>
                 </c:ext>
-                <c:ext xmlns:c15="http://schemas.microsoft.com/office/drawing/2012/chart" uri="{CE6537A1-D6FC-4f65-9D91-7224C49458BB}">
-                  <c15:layout/>
-                </c:ext>
+                <c:ext xmlns:c15="http://schemas.microsoft.com/office/drawing/2012/chart" uri="{CE6537A1-D6FC-4f65-9D91-7224C49458BB}"/>
               </c:extLst>
             </c:dLbl>
             <c:dLbl>
@@ -504,9 +494,7 @@
                 <c:ext xmlns:c16="http://schemas.microsoft.com/office/drawing/2014/chart" uri="{C3380CC4-5D6E-409C-BE32-E72D297353CC}">
                   <c16:uniqueId val="{0000000B-3EB7-4374-AE9A-D38B071EA406}"/>
                 </c:ext>
-                <c:ext xmlns:c15="http://schemas.microsoft.com/office/drawing/2012/chart" uri="{CE6537A1-D6FC-4f65-9D91-7224C49458BB}">
-                  <c15:layout/>
-                </c:ext>
+                <c:ext xmlns:c15="http://schemas.microsoft.com/office/drawing/2012/chart" uri="{CE6537A1-D6FC-4f65-9D91-7224C49458BB}"/>
               </c:extLst>
             </c:dLbl>
             <c:dLbl>
@@ -528,9 +516,7 @@
                 <c:ext xmlns:c16="http://schemas.microsoft.com/office/drawing/2014/chart" uri="{C3380CC4-5D6E-409C-BE32-E72D297353CC}">
                   <c16:uniqueId val="{0000000D-3EB7-4374-AE9A-D38B071EA406}"/>
                 </c:ext>
-                <c:ext xmlns:c15="http://schemas.microsoft.com/office/drawing/2012/chart" uri="{CE6537A1-D6FC-4f65-9D91-7224C49458BB}">
-                  <c15:layout/>
-                </c:ext>
+                <c:ext xmlns:c15="http://schemas.microsoft.com/office/drawing/2012/chart" uri="{CE6537A1-D6FC-4f65-9D91-7224C49458BB}"/>
               </c:extLst>
             </c:dLbl>
             <c:spPr>
@@ -1027,7 +1013,6 @@
             <c:showLeaderLines val="0"/>
             <c:extLst xmlns:c16r2="http://schemas.microsoft.com/office/drawing/2015/06/chart">
               <c:ext xmlns:c15="http://schemas.microsoft.com/office/drawing/2012/chart" uri="{CE6537A1-D6FC-4f65-9D91-7224C49458BB}">
-                <c15:layout/>
                 <c15:showLeaderLines val="1"/>
                 <c15:leaderLines>
                   <c:spPr>
@@ -1322,7 +1307,6 @@
             <c:showLeaderLines val="0"/>
             <c:extLst xmlns:c16r2="http://schemas.microsoft.com/office/drawing/2015/06/chart">
               <c:ext xmlns:c15="http://schemas.microsoft.com/office/drawing/2012/chart" uri="{CE6537A1-D6FC-4f65-9D91-7224C49458BB}">
-                <c15:layout/>
                 <c15:showLeaderLines val="1"/>
                 <c15:leaderLines>
                   <c:spPr>
@@ -1499,7 +1483,7 @@
                   <c:v>4.666666666666667</c:v>
                 </c:pt>
                 <c:pt idx="2">
-                  <c:v>6.333333333333335</c:v>
+                  <c:v>6.333333333333336</c:v>
                 </c:pt>
                 <c:pt idx="3">
                   <c:v>9.0</c:v>
@@ -1508,7 +1492,7 @@
                   <c:v>20.66666666666667</c:v>
                 </c:pt>
                 <c:pt idx="5">
-                  <c:v>49.66666666666664</c:v>
+                  <c:v>49.66666666666663</c:v>
                 </c:pt>
                 <c:pt idx="6">
                   <c:v>0.666666666666667</c:v>
@@ -1617,7 +1601,6 @@
             <c:showLeaderLines val="0"/>
             <c:extLst xmlns:c16r2="http://schemas.microsoft.com/office/drawing/2015/06/chart">
               <c:ext xmlns:c15="http://schemas.microsoft.com/office/drawing/2012/chart" uri="{CE6537A1-D6FC-4f65-9D91-7224C49458BB}">
-                <c15:layout/>
                 <c15:showLeaderLines val="1"/>
                 <c15:leaderLines>
                   <c:spPr>
@@ -1800,7 +1783,7 @@
                   <c:v>27.0</c:v>
                 </c:pt>
                 <c:pt idx="4">
-                  <c:v>24.33333333333332</c:v>
+                  <c:v>24.33333333333331</c:v>
                 </c:pt>
                 <c:pt idx="5">
                   <c:v>0.0</c:v>
@@ -1912,7 +1895,6 @@
             <c:showLeaderLines val="0"/>
             <c:extLst xmlns:c16r2="http://schemas.microsoft.com/office/drawing/2015/06/chart">
               <c:ext xmlns:c15="http://schemas.microsoft.com/office/drawing/2012/chart" uri="{CE6537A1-D6FC-4f65-9D91-7224C49458BB}">
-                <c15:layout/>
                 <c15:showLeaderLines val="1"/>
                 <c15:leaderLines>
                   <c:spPr>
@@ -2089,13 +2071,13 @@
                   <c:v>68.66666666666667</c:v>
                 </c:pt>
                 <c:pt idx="2">
-                  <c:v>75.3333333333333</c:v>
+                  <c:v>75.33333333333329</c:v>
                 </c:pt>
                 <c:pt idx="3">
                   <c:v>59.0</c:v>
                 </c:pt>
                 <c:pt idx="4">
-                  <c:v>51.66666666666664</c:v>
+                  <c:v>51.66666666666663</c:v>
                 </c:pt>
                 <c:pt idx="5">
                   <c:v>43.0</c:v>
@@ -2122,12 +2104,12 @@
         </c:dLbls>
         <c:gapWidth val="150"/>
         <c:shape val="box"/>
-        <c:axId val="-1875673760"/>
-        <c:axId val="-1875671440"/>
-        <c:axId val="-1875669120"/>
+        <c:axId val="1370618752"/>
+        <c:axId val="1370621504"/>
+        <c:axId val="1370623984"/>
       </c:bar3DChart>
       <c:catAx>
-        <c:axId val="-1875673760"/>
+        <c:axId val="1370618752"/>
         <c:scaling>
           <c:orientation val="minMax"/>
         </c:scaling>
@@ -2137,7 +2119,7 @@
         <c:majorTickMark val="none"/>
         <c:minorTickMark val="none"/>
         <c:tickLblPos val="nextTo"/>
-        <c:crossAx val="-1875671440"/>
+        <c:crossAx val="1370621504"/>
         <c:crosses val="autoZero"/>
         <c:auto val="1"/>
         <c:lblAlgn val="ctr"/>
@@ -2145,7 +2127,7 @@
         <c:noMultiLvlLbl val="0"/>
       </c:catAx>
       <c:valAx>
-        <c:axId val="-1875671440"/>
+        <c:axId val="1370621504"/>
         <c:scaling>
           <c:orientation val="minMax"/>
         </c:scaling>
@@ -2195,12 +2177,12 @@
             <a:endParaRPr lang="en-US"/>
           </a:p>
         </c:txPr>
-        <c:crossAx val="-1875673760"/>
+        <c:crossAx val="1370618752"/>
         <c:crosses val="autoZero"/>
         <c:crossBetween val="between"/>
       </c:valAx>
       <c:serAx>
-        <c:axId val="-1875669120"/>
+        <c:axId val="1370623984"/>
         <c:scaling>
           <c:orientation val="minMax"/>
         </c:scaling>
@@ -2235,7 +2217,7 @@
             <a:endParaRPr lang="en-US"/>
           </a:p>
         </c:txPr>
-        <c:crossAx val="-1875671440"/>
+        <c:crossAx val="1370621504"/>
         <c:crosses val="autoZero"/>
       </c:serAx>
       <c:spPr>
@@ -2807,7 +2789,7 @@
                   <c:v>8.912530733289074</c:v>
                 </c:pt>
                 <c:pt idx="4">
-                  <c:v>12.62602895271822</c:v>
+                  <c:v>12.60277512705695</c:v>
                 </c:pt>
                 <c:pt idx="5">
                   <c:v>19.26119153459033</c:v>
@@ -2829,11 +2811,11 @@
         </c:dLbls>
         <c:gapWidth val="100"/>
         <c:overlap val="-24"/>
-        <c:axId val="-1835820144"/>
-        <c:axId val="-1835817824"/>
+        <c:axId val="1388759264"/>
+        <c:axId val="1388761040"/>
       </c:barChart>
       <c:catAx>
-        <c:axId val="-1835820144"/>
+        <c:axId val="1388759264"/>
         <c:scaling>
           <c:orientation val="minMax"/>
         </c:scaling>
@@ -2889,7 +2871,7 @@
             <a:endParaRPr lang="en-US"/>
           </a:p>
         </c:txPr>
-        <c:crossAx val="-1835817824"/>
+        <c:crossAx val="1388761040"/>
         <c:crosses val="autoZero"/>
         <c:auto val="1"/>
         <c:lblAlgn val="ctr"/>
@@ -2897,7 +2879,7 @@
         <c:noMultiLvlLbl val="0"/>
       </c:catAx>
       <c:valAx>
-        <c:axId val="-1835817824"/>
+        <c:axId val="1388761040"/>
         <c:scaling>
           <c:orientation val="minMax"/>
         </c:scaling>
@@ -2959,7 +2941,7 @@
             <a:endParaRPr lang="en-US"/>
           </a:p>
         </c:txPr>
-        <c:crossAx val="-1835820144"/>
+        <c:crossAx val="1388759264"/>
         <c:crosses val="autoZero"/>
         <c:crossBetween val="between"/>
       </c:valAx>
@@ -21244,7 +21226,6 @@
               <a:rPr lang="en-US" dirty="0" smtClean="0"/>
               <a:t>Apply local search to find a minimum.</a:t>
             </a:r>
-            <a:endParaRPr lang="en-US" dirty="0" smtClean="0"/>
           </a:p>
         </p:txBody>
       </p:sp>
@@ -21742,7 +21723,7 @@
           <p:cNvPr id="2" name="Titolo 1">
             <a:extLst>
               <a:ext uri="{FF2B5EF4-FFF2-40B4-BE49-F238E27FC236}">
-                <a16:creationId xmlns="" xmlns:a16="http://schemas.microsoft.com/office/drawing/2014/main" id="{82E4D137-6351-4496-B0DE-EE5D2D2FC685}"/>
+                <a16:creationId xmlns:a16="http://schemas.microsoft.com/office/drawing/2014/main" xmlns="" id="{82E4D137-6351-4496-B0DE-EE5D2D2FC685}"/>
               </a:ext>
             </a:extLst>
           </p:cNvPr>
@@ -21773,7 +21754,7 @@
           <p:cNvPr id="3" name="Segnaposto contenuto 2">
             <a:extLst>
               <a:ext uri="{FF2B5EF4-FFF2-40B4-BE49-F238E27FC236}">
-                <a16:creationId xmlns="" xmlns:a16="http://schemas.microsoft.com/office/drawing/2014/main" id="{D1AD23D3-52EB-43AE-B408-78EE484130B1}"/>
+                <a16:creationId xmlns:a16="http://schemas.microsoft.com/office/drawing/2014/main" xmlns="" id="{D1AD23D3-52EB-43AE-B408-78EE484130B1}"/>
               </a:ext>
             </a:extLst>
           </p:cNvPr>
@@ -21798,7 +21779,7 @@
           <p:cNvPr id="4" name="Segnaposto numero diapositiva 3">
             <a:extLst>
               <a:ext uri="{FF2B5EF4-FFF2-40B4-BE49-F238E27FC236}">
-                <a16:creationId xmlns="" xmlns:a16="http://schemas.microsoft.com/office/drawing/2014/main" id="{44344993-EB5E-481E-9648-C751E3522B27}"/>
+                <a16:creationId xmlns:a16="http://schemas.microsoft.com/office/drawing/2014/main" xmlns="" id="{44344993-EB5E-481E-9648-C751E3522B27}"/>
               </a:ext>
             </a:extLst>
           </p:cNvPr>
@@ -21827,7 +21808,7 @@
           <p:cNvPr id="5" name="Grafico 4">
             <a:extLst>
               <a:ext uri="{FF2B5EF4-FFF2-40B4-BE49-F238E27FC236}">
-                <a16:creationId xmlns="" xmlns:a16="http://schemas.microsoft.com/office/drawing/2014/main" id="{D2FAD8B6-79C6-44E9-93E3-A22CD9B2457B}"/>
+                <a16:creationId xmlns:a16="http://schemas.microsoft.com/office/drawing/2014/main" xmlns="" id="{D2FAD8B6-79C6-44E9-93E3-A22CD9B2457B}"/>
               </a:ext>
             </a:extLst>
           </p:cNvPr>
@@ -21887,7 +21868,7 @@
           <p:cNvPr id="2" name="Segnaposto numero diapositiva 1">
             <a:extLst>
               <a:ext uri="{FF2B5EF4-FFF2-40B4-BE49-F238E27FC236}">
-                <a16:creationId xmlns="" xmlns:a16="http://schemas.microsoft.com/office/drawing/2014/main" id="{D52846D3-11F6-459C-8F16-859F00A0620B}"/>
+                <a16:creationId xmlns:a16="http://schemas.microsoft.com/office/drawing/2014/main" xmlns="" id="{D52846D3-11F6-459C-8F16-859F00A0620B}"/>
               </a:ext>
             </a:extLst>
           </p:cNvPr>
@@ -21916,7 +21897,7 @@
           <p:cNvPr id="6" name="Grafico 5">
             <a:extLst>
               <a:ext uri="{FF2B5EF4-FFF2-40B4-BE49-F238E27FC236}">
-                <a16:creationId xmlns="" xmlns:a16="http://schemas.microsoft.com/office/drawing/2014/main" id="{A6D627D2-81FA-4782-A659-8360C94599CB}"/>
+                <a16:creationId xmlns:a16="http://schemas.microsoft.com/office/drawing/2014/main" xmlns="" id="{A6D627D2-81FA-4782-A659-8360C94599CB}"/>
               </a:ext>
             </a:extLst>
           </p:cNvPr>
@@ -22092,15 +22073,7 @@
           <a:p>
             <a:r>
               <a:rPr lang="en-US" dirty="0" smtClean="0"/>
-              <a:t>Our algorithms is flown over 5 </a:t>
-            </a:r>
-            <a:r>
-              <a:rPr lang="en-US" dirty="0" smtClean="0"/>
-              <a:t>different </a:t>
-            </a:r>
-            <a:r>
-              <a:rPr lang="en-US" dirty="0" smtClean="0"/>
-              <a:t>steps:</a:t>
+              <a:t>Our algorithms is flown over 5 different steps:</a:t>
             </a:r>
           </a:p>
           <a:p>
@@ -22128,15 +22101,7 @@
             </a:pPr>
             <a:r>
               <a:rPr lang="en-US" dirty="0" smtClean="0"/>
-              <a:t>v0.3: Greedy </a:t>
-            </a:r>
-            <a:r>
-              <a:rPr lang="en-US" dirty="0" smtClean="0"/>
-              <a:t>Preparation </a:t>
-            </a:r>
-            <a:r>
-              <a:rPr lang="en-US" dirty="0" smtClean="0"/>
-              <a:t>at begin</a:t>
+              <a:t>v0.3: Greedy Preparation at begin</a:t>
             </a:r>
           </a:p>
           <a:p>
@@ -22146,13 +22111,8 @@
             </a:pPr>
             <a:r>
               <a:rPr lang="en-US" dirty="0" smtClean="0"/>
-              <a:t>v0.4: </a:t>
+              <a:t>v0.4: Adding Simulated Annealing and local search</a:t>
             </a:r>
-            <a:r>
-              <a:rPr lang="en-US" dirty="0" smtClean="0"/>
-              <a:t>Adding Simulated Annealing and local search</a:t>
-            </a:r>
-            <a:endParaRPr lang="en-US" dirty="0" smtClean="0"/>
           </a:p>
           <a:p>
             <a:pPr marL="342900" indent="-342900">
@@ -22161,11 +22121,7 @@
             </a:pPr>
             <a:r>
               <a:rPr lang="en-US" dirty="0" smtClean="0"/>
-              <a:t>v0.5: </a:t>
-            </a:r>
-            <a:r>
-              <a:rPr lang="en-US" dirty="0" smtClean="0"/>
-              <a:t>Implementing Local Swap</a:t>
+              <a:t>v0.5: Implementing Local Swap</a:t>
             </a:r>
           </a:p>
           <a:p>
@@ -22177,7 +22133,6 @@
               <a:rPr lang="en-US" dirty="0" smtClean="0"/>
               <a:t>v0.6: Various Tuning</a:t>
             </a:r>
-            <a:endParaRPr lang="en-US" dirty="0" smtClean="0"/>
           </a:p>
           <a:p>
             <a:pPr marL="342900" indent="-342900">
@@ -22448,7 +22403,7 @@
           <p:nvPr>
             <p:extLst>
               <p:ext uri="{D42A27DB-BD31-4B8C-83A1-F6EECF244321}">
-                <p14:modId xmlns:p14="http://schemas.microsoft.com/office/powerpoint/2010/main" val="1242880955"/>
+                <p14:modId xmlns:p14="http://schemas.microsoft.com/office/powerpoint/2010/main" val="1204480690"/>
               </p:ext>
             </p:extLst>
           </p:nvPr>
@@ -23744,11 +23699,7 @@
           <a:p>
             <a:r>
               <a:rPr lang="en-US" dirty="0" smtClean="0"/>
-              <a:t>Our local search implements 3 differen</a:t>
-            </a:r>
-            <a:r>
-              <a:rPr lang="en-US" dirty="0" smtClean="0"/>
-              <a:t>t algorithms:</a:t>
+              <a:t>Our local search implements 3 different algorithms:</a:t>
             </a:r>
           </a:p>
           <a:p>

</xml_diff>

<commit_message>
Adding notes and final benchmark photos
</commit_message>
<xml_diff>
--- a/PowerPoint/OMA-MZ_03-Presentation.pptx
+++ b/PowerPoint/OMA-MZ_03-Presentation.pptx
@@ -142,9 +142,9 @@
 </file>
 
 <file path=ppt/charts/chart1.xml><?xml version="1.0" encoding="utf-8"?>
-<c:chartSpace xmlns:c="http://schemas.openxmlformats.org/drawingml/2006/chart" xmlns:a="http://schemas.openxmlformats.org/drawingml/2006/main" xmlns:r="http://schemas.openxmlformats.org/officeDocument/2006/relationships" xmlns:c16r2="http://schemas.microsoft.com/office/drawing/2015/06/chart">
+<c:chartSpace xmlns:c="http://schemas.openxmlformats.org/drawingml/2006/chart" xmlns:a="http://schemas.openxmlformats.org/drawingml/2006/main" xmlns:r="http://schemas.openxmlformats.org/officeDocument/2006/relationships">
   <c:date1904 val="0"/>
-  <c:lang val="it-IT"/>
+  <c:lang val="en-US"/>
   <c:roundedCorners val="0"/>
   <mc:AlternateContent xmlns:mc="http://schemas.openxmlformats.org/markup-compatibility/2006">
     <mc:Choice xmlns:c14="http://schemas.microsoft.com/office/drawing/2007/8/2/chart" Requires="c14">
@@ -162,10 +162,10 @@
           <c:layoutTarget val="inner"/>
           <c:xMode val="edge"/>
           <c:yMode val="edge"/>
-          <c:x val="0.20258509572410799"/>
-          <c:y val="0.10873698752043701"/>
-          <c:w val="0.63659979134498101"/>
-          <c:h val="0.79671927340028903"/>
+          <c:x val="0.202585095724108"/>
+          <c:y val="0.108736987520437"/>
+          <c:w val="0.636599791344981"/>
+          <c:h val="0.796719273400289"/>
         </c:manualLayout>
       </c:layout>
       <c:pieChart>
@@ -204,7 +204,7 @@
                 </a:outerShdw>
               </a:effectLst>
             </c:spPr>
-            <c:extLst>
+            <c:extLst xmlns:c16r2="http://schemas.microsoft.com/office/drawing/2015/06/chart">
               <c:ext xmlns:c16="http://schemas.microsoft.com/office/drawing/2014/chart" uri="{C3380CC4-5D6E-409C-BE32-E72D297353CC}">
                 <c16:uniqueId val="{00000001-3EB7-4374-AE9A-D38B071EA406}"/>
               </c:ext>
@@ -230,7 +230,7 @@
                 </a:outerShdw>
               </a:effectLst>
             </c:spPr>
-            <c:extLst>
+            <c:extLst xmlns:c16r2="http://schemas.microsoft.com/office/drawing/2015/06/chart">
               <c:ext xmlns:c16="http://schemas.microsoft.com/office/drawing/2014/chart" uri="{C3380CC4-5D6E-409C-BE32-E72D297353CC}">
                 <c16:uniqueId val="{00000003-3EB7-4374-AE9A-D38B071EA406}"/>
               </c:ext>
@@ -256,7 +256,7 @@
                 </a:outerShdw>
               </a:effectLst>
             </c:spPr>
-            <c:extLst>
+            <c:extLst xmlns:c16r2="http://schemas.microsoft.com/office/drawing/2015/06/chart">
               <c:ext xmlns:c16="http://schemas.microsoft.com/office/drawing/2014/chart" uri="{C3380CC4-5D6E-409C-BE32-E72D297353CC}">
                 <c16:uniqueId val="{00000005-3EB7-4374-AE9A-D38B071EA406}"/>
               </c:ext>
@@ -280,7 +280,7 @@
                 </a:outerShdw>
               </a:effectLst>
             </c:spPr>
-            <c:extLst>
+            <c:extLst xmlns:c16r2="http://schemas.microsoft.com/office/drawing/2015/06/chart">
               <c:ext xmlns:c16="http://schemas.microsoft.com/office/drawing/2014/chart" uri="{C3380CC4-5D6E-409C-BE32-E72D297353CC}">
                 <c16:uniqueId val="{00000007-3EB7-4374-AE9A-D38B071EA406}"/>
               </c:ext>
@@ -306,7 +306,7 @@
                 </a:outerShdw>
               </a:effectLst>
             </c:spPr>
-            <c:extLst>
+            <c:extLst xmlns:c16r2="http://schemas.microsoft.com/office/drawing/2015/06/chart">
               <c:ext xmlns:c16="http://schemas.microsoft.com/office/drawing/2014/chart" uri="{C3380CC4-5D6E-409C-BE32-E72D297353CC}">
                 <c16:uniqueId val="{00000009-3EB7-4374-AE9A-D38B071EA406}"/>
               </c:ext>
@@ -332,7 +332,7 @@
                 </a:outerShdw>
               </a:effectLst>
             </c:spPr>
-            <c:extLst>
+            <c:extLst xmlns:c16r2="http://schemas.microsoft.com/office/drawing/2015/06/chart">
               <c:ext xmlns:c16="http://schemas.microsoft.com/office/drawing/2014/chart" uri="{C3380CC4-5D6E-409C-BE32-E72D297353CC}">
                 <c16:uniqueId val="{0000000B-3EB7-4374-AE9A-D38B071EA406}"/>
               </c:ext>
@@ -358,7 +358,7 @@
                 </a:outerShdw>
               </a:effectLst>
             </c:spPr>
-            <c:extLst>
+            <c:extLst xmlns:c16r2="http://schemas.microsoft.com/office/drawing/2015/06/chart">
               <c:ext xmlns:c16="http://schemas.microsoft.com/office/drawing/2014/chart" uri="{C3380CC4-5D6E-409C-BE32-E72D297353CC}">
                 <c16:uniqueId val="{0000000D-3EB7-4374-AE9A-D38B071EA406}"/>
               </c:ext>
@@ -369,8 +369,8 @@
               <c:idx val="0"/>
               <c:layout>
                 <c:manualLayout>
-                  <c:x val="2.6487169015585899E-2"/>
-                  <c:y val="9.9920025544521004E-3"/>
+                  <c:x val="0.0264871690155859"/>
+                  <c:y val="0.0099920025544521"/>
                 </c:manualLayout>
               </c:layout>
               <c:dLblPos val="bestFit"/>
@@ -380,10 +380,12 @@
               <c:showSerName val="0"/>
               <c:showPercent val="0"/>
               <c:showBubbleSize val="0"/>
-              <c:extLst>
-                <c:ext xmlns:c15="http://schemas.microsoft.com/office/drawing/2012/chart" uri="{CE6537A1-D6FC-4f65-9D91-7224C49458BB}"/>
+              <c:extLst xmlns:c16r2="http://schemas.microsoft.com/office/drawing/2015/06/chart">
                 <c:ext xmlns:c16="http://schemas.microsoft.com/office/drawing/2014/chart" uri="{C3380CC4-5D6E-409C-BE32-E72D297353CC}">
                   <c16:uniqueId val="{00000001-3EB7-4374-AE9A-D38B071EA406}"/>
+                </c:ext>
+                <c:ext xmlns:c15="http://schemas.microsoft.com/office/drawing/2012/chart" uri="{CE6537A1-D6FC-4f65-9D91-7224C49458BB}">
+                  <c15:layout/>
                 </c:ext>
               </c:extLst>
             </c:dLbl>
@@ -391,8 +393,8 @@
               <c:idx val="1"/>
               <c:layout>
                 <c:manualLayout>
-                  <c:x val="-4.39942878252189E-2"/>
-                  <c:y val="7.4029958637980304E-3"/>
+                  <c:x val="-0.0439942878252189"/>
+                  <c:y val="0.00740299586379803"/>
                 </c:manualLayout>
               </c:layout>
               <c:dLblPos val="bestFit"/>
@@ -402,10 +404,12 @@
               <c:showSerName val="0"/>
               <c:showPercent val="0"/>
               <c:showBubbleSize val="0"/>
-              <c:extLst>
-                <c:ext xmlns:c15="http://schemas.microsoft.com/office/drawing/2012/chart" uri="{CE6537A1-D6FC-4f65-9D91-7224C49458BB}"/>
+              <c:extLst xmlns:c16r2="http://schemas.microsoft.com/office/drawing/2015/06/chart">
                 <c:ext xmlns:c16="http://schemas.microsoft.com/office/drawing/2014/chart" uri="{C3380CC4-5D6E-409C-BE32-E72D297353CC}">
                   <c16:uniqueId val="{00000003-3EB7-4374-AE9A-D38B071EA406}"/>
+                </c:ext>
+                <c:ext xmlns:c15="http://schemas.microsoft.com/office/drawing/2012/chart" uri="{CE6537A1-D6FC-4f65-9D91-7224C49458BB}">
+                  <c15:layout/>
                 </c:ext>
               </c:extLst>
             </c:dLbl>
@@ -413,8 +417,8 @@
               <c:idx val="2"/>
               <c:layout>
                 <c:manualLayout>
-                  <c:x val="-1.5070201813048601E-2"/>
-                  <c:y val="-4.1828598924410099E-2"/>
+                  <c:x val="-0.0150702018130486"/>
+                  <c:y val="-0.0418285989244101"/>
                 </c:manualLayout>
               </c:layout>
               <c:dLblPos val="bestFit"/>
@@ -424,10 +428,12 @@
               <c:showSerName val="0"/>
               <c:showPercent val="0"/>
               <c:showBubbleSize val="0"/>
-              <c:extLst>
-                <c:ext xmlns:c15="http://schemas.microsoft.com/office/drawing/2012/chart" uri="{CE6537A1-D6FC-4f65-9D91-7224C49458BB}"/>
+              <c:extLst xmlns:c16r2="http://schemas.microsoft.com/office/drawing/2015/06/chart">
                 <c:ext xmlns:c16="http://schemas.microsoft.com/office/drawing/2014/chart" uri="{C3380CC4-5D6E-409C-BE32-E72D297353CC}">
                   <c16:uniqueId val="{00000005-3EB7-4374-AE9A-D38B071EA406}"/>
+                </c:ext>
+                <c:ext xmlns:c15="http://schemas.microsoft.com/office/drawing/2012/chart" uri="{CE6537A1-D6FC-4f65-9D91-7224C49458BB}">
+                  <c15:layout/>
                 </c:ext>
               </c:extLst>
             </c:dLbl>
@@ -436,7 +442,7 @@
               <c:layout>
                 <c:manualLayout>
                   <c:x val="-1.17405422083367E-5"/>
-                  <c:y val="7.4171689855685896E-2"/>
+                  <c:y val="0.0741716898556859"/>
                 </c:manualLayout>
               </c:layout>
               <c:dLblPos val="bestFit"/>
@@ -446,10 +452,12 @@
               <c:showSerName val="0"/>
               <c:showPercent val="0"/>
               <c:showBubbleSize val="0"/>
-              <c:extLst>
-                <c:ext xmlns:c15="http://schemas.microsoft.com/office/drawing/2012/chart" uri="{CE6537A1-D6FC-4f65-9D91-7224C49458BB}"/>
+              <c:extLst xmlns:c16r2="http://schemas.microsoft.com/office/drawing/2015/06/chart">
                 <c:ext xmlns:c16="http://schemas.microsoft.com/office/drawing/2014/chart" uri="{C3380CC4-5D6E-409C-BE32-E72D297353CC}">
                   <c16:uniqueId val="{00000007-3EB7-4374-AE9A-D38B071EA406}"/>
+                </c:ext>
+                <c:ext xmlns:c15="http://schemas.microsoft.com/office/drawing/2012/chart" uri="{CE6537A1-D6FC-4f65-9D91-7224C49458BB}">
+                  <c15:layout/>
                 </c:ext>
               </c:extLst>
             </c:dLbl>
@@ -457,8 +465,8 @@
               <c:idx val="4"/>
               <c:layout>
                 <c:manualLayout>
-                  <c:x val="-6.9151170036322498E-2"/>
-                  <c:y val="9.6994825398137294E-2"/>
+                  <c:x val="-0.0691511700363225"/>
+                  <c:y val="0.0969948253981373"/>
                 </c:manualLayout>
               </c:layout>
               <c:dLblPos val="bestFit"/>
@@ -468,10 +476,12 @@
               <c:showSerName val="0"/>
               <c:showPercent val="0"/>
               <c:showBubbleSize val="0"/>
-              <c:extLst>
-                <c:ext xmlns:c15="http://schemas.microsoft.com/office/drawing/2012/chart" uri="{CE6537A1-D6FC-4f65-9D91-7224C49458BB}"/>
+              <c:extLst xmlns:c16r2="http://schemas.microsoft.com/office/drawing/2015/06/chart">
                 <c:ext xmlns:c16="http://schemas.microsoft.com/office/drawing/2014/chart" uri="{C3380CC4-5D6E-409C-BE32-E72D297353CC}">
                   <c16:uniqueId val="{00000009-3EB7-4374-AE9A-D38B071EA406}"/>
+                </c:ext>
+                <c:ext xmlns:c15="http://schemas.microsoft.com/office/drawing/2012/chart" uri="{CE6537A1-D6FC-4f65-9D91-7224C49458BB}">
+                  <c15:layout/>
                 </c:ext>
               </c:extLst>
             </c:dLbl>
@@ -479,7 +489,7 @@
               <c:idx val="5"/>
               <c:layout>
                 <c:manualLayout>
-                  <c:x val="2.55545785246797E-2"/>
+                  <c:x val="0.0255545785246797"/>
                   <c:y val="-0.291231244946972"/>
                 </c:manualLayout>
               </c:layout>
@@ -490,10 +500,12 @@
               <c:showSerName val="0"/>
               <c:showPercent val="0"/>
               <c:showBubbleSize val="0"/>
-              <c:extLst>
-                <c:ext xmlns:c15="http://schemas.microsoft.com/office/drawing/2012/chart" uri="{CE6537A1-D6FC-4f65-9D91-7224C49458BB}"/>
+              <c:extLst xmlns:c16r2="http://schemas.microsoft.com/office/drawing/2015/06/chart">
                 <c:ext xmlns:c16="http://schemas.microsoft.com/office/drawing/2014/chart" uri="{C3380CC4-5D6E-409C-BE32-E72D297353CC}">
                   <c16:uniqueId val="{0000000B-3EB7-4374-AE9A-D38B071EA406}"/>
+                </c:ext>
+                <c:ext xmlns:c15="http://schemas.microsoft.com/office/drawing/2012/chart" uri="{CE6537A1-D6FC-4f65-9D91-7224C49458BB}">
+                  <c15:layout/>
                 </c:ext>
               </c:extLst>
             </c:dLbl>
@@ -501,7 +513,7 @@
               <c:idx val="6"/>
               <c:layout>
                 <c:manualLayout>
-                  <c:x val="6.5006523411921896E-2"/>
+                  <c:x val="0.0650065234119219"/>
                   <c:y val="0.123394137992095"/>
                 </c:manualLayout>
               </c:layout>
@@ -512,10 +524,12 @@
               <c:showSerName val="0"/>
               <c:showPercent val="0"/>
               <c:showBubbleSize val="0"/>
-              <c:extLst>
-                <c:ext xmlns:c15="http://schemas.microsoft.com/office/drawing/2012/chart" uri="{CE6537A1-D6FC-4f65-9D91-7224C49458BB}"/>
+              <c:extLst xmlns:c16r2="http://schemas.microsoft.com/office/drawing/2015/06/chart">
                 <c:ext xmlns:c16="http://schemas.microsoft.com/office/drawing/2014/chart" uri="{C3380CC4-5D6E-409C-BE32-E72D297353CC}">
                   <c16:uniqueId val="{0000000D-3EB7-4374-AE9A-D38B071EA406}"/>
+                </c:ext>
+                <c:ext xmlns:c15="http://schemas.microsoft.com/office/drawing/2012/chart" uri="{CE6537A1-D6FC-4f65-9D91-7224C49458BB}">
+                  <c15:layout/>
                 </c:ext>
               </c:extLst>
             </c:dLbl>
@@ -572,7 +586,7 @@
             <c:showPercent val="0"/>
             <c:showBubbleSize val="0"/>
             <c:showLeaderLines val="0"/>
-            <c:extLst>
+            <c:extLst xmlns:c16r2="http://schemas.microsoft.com/office/drawing/2015/06/chart">
               <c:ext xmlns:c15="http://schemas.microsoft.com/office/drawing/2012/chart" uri="{CE6537A1-D6FC-4f65-9D91-7224C49458BB}"/>
             </c:extLst>
           </c:dLbls>
@@ -612,10 +626,10 @@
                 <c:formatCode>0.00</c:formatCode>
                 <c:ptCount val="7"/>
                 <c:pt idx="0">
-                  <c:v>0.14292520247737001</c:v>
+                  <c:v>0.14292520247737</c:v>
                 </c:pt>
                 <c:pt idx="1">
-                  <c:v>0</c:v>
+                  <c:v>0.0</c:v>
                 </c:pt>
                 <c:pt idx="2">
                   <c:v>0.238208670795617</c:v>
@@ -627,7 +641,7 @@
                   <c:v>13.24440209623631</c:v>
                 </c:pt>
                 <c:pt idx="5">
-                  <c:v>69.080514530728905</c:v>
+                  <c:v>69.08051453072888</c:v>
                 </c:pt>
                 <c:pt idx="6">
                   <c:v>14.10195331110052</c:v>
@@ -635,7 +649,7 @@
               </c:numCache>
             </c:numRef>
           </c:val>
-          <c:extLst>
+          <c:extLst xmlns:c16r2="http://schemas.microsoft.com/office/drawing/2015/06/chart">
             <c:ext xmlns:c16="http://schemas.microsoft.com/office/drawing/2014/chart" uri="{C3380CC4-5D6E-409C-BE32-E72D297353CC}">
               <c16:uniqueId val="{0000000E-3EB7-4374-AE9A-D38B071EA406}"/>
             </c:ext>
@@ -667,10 +681,10 @@
         <c:manualLayout>
           <c:xMode val="edge"/>
           <c:yMode val="edge"/>
-          <c:x val="0.84710512569058305"/>
-          <c:y val="0.37116373255495799"/>
-          <c:w val="0.14164415785139101"/>
-          <c:h val="0.26693988871659202"/>
+          <c:x val="0.847105125690583"/>
+          <c:y val="0.371163732554958"/>
+          <c:w val="0.141644157851391"/>
+          <c:h val="0.266939888716592"/>
         </c:manualLayout>
       </c:layout>
       <c:overlay val="0"/>
@@ -709,14 +723,14 @@
     </c:legend>
     <c:plotVisOnly val="1"/>
     <c:dispBlanksAs val="gap"/>
-    <c:extLst>
+    <c:showDLblsOverMax val="0"/>
+    <c:extLst xmlns:c16r2="http://schemas.microsoft.com/office/drawing/2015/06/chart">
       <c:ext xmlns:c16r3="http://schemas.microsoft.com/office/drawing/2017/03/chart" uri="{56B9EC1D-385E-4148-901F-78D8002777C0}">
         <c16r3:dataDisplayOptions16>
           <c16r3:dispNaAsBlank val="1"/>
         </c16r3:dataDisplayOptions16>
       </c:ext>
     </c:extLst>
-    <c:showDLblsOverMax val="0"/>
   </c:chart>
   <c:spPr>
     <a:solidFill>
@@ -745,9 +759,9 @@
 </file>
 
 <file path=ppt/charts/chart2.xml><?xml version="1.0" encoding="utf-8"?>
-<c:chartSpace xmlns:c="http://schemas.openxmlformats.org/drawingml/2006/chart" xmlns:a="http://schemas.openxmlformats.org/drawingml/2006/main" xmlns:r="http://schemas.openxmlformats.org/officeDocument/2006/relationships" xmlns:c16r2="http://schemas.microsoft.com/office/drawing/2015/06/chart">
+<c:chartSpace xmlns:c="http://schemas.openxmlformats.org/drawingml/2006/chart" xmlns:a="http://schemas.openxmlformats.org/drawingml/2006/main" xmlns:r="http://schemas.openxmlformats.org/officeDocument/2006/relationships">
   <c:date1904 val="0"/>
-  <c:lang val="it-IT"/>
+  <c:lang val="en-US"/>
   <c:roundedCorners val="0"/>
   <mc:AlternateContent xmlns:mc="http://schemas.openxmlformats.org/markup-compatibility/2006">
     <mc:Choice xmlns:c14="http://schemas.microsoft.com/office/drawing/2007/8/2/chart" Requires="c14">
@@ -824,7 +838,7 @@
           <c:xMode val="edge"/>
           <c:yMode val="edge"/>
           <c:x val="0.196933365826958"/>
-          <c:y val="6.5688714273058099E-2"/>
+          <c:y val="0.0656887142730581"/>
         </c:manualLayout>
       </c:layout>
       <c:overlay val="0"/>
@@ -908,10 +922,10 @@
           <c:layoutTarget val="inner"/>
           <c:xMode val="edge"/>
           <c:yMode val="edge"/>
-          <c:x val="7.8036437344845402E-2"/>
-          <c:y val="0.11459902165857599"/>
-          <c:w val="0.84294020669291303"/>
-          <c:h val="0.74031115938681702"/>
+          <c:x val="0.0780364373448454"/>
+          <c:y val="0.114599021658576"/>
+          <c:w val="0.842940206692913"/>
+          <c:h val="0.740311159386817"/>
         </c:manualLayout>
       </c:layout>
       <c:bar3DChart>
@@ -1011,8 +1025,9 @@
             <c:showPercent val="0"/>
             <c:showBubbleSize val="0"/>
             <c:showLeaderLines val="0"/>
-            <c:extLst>
+            <c:extLst xmlns:c16r2="http://schemas.microsoft.com/office/drawing/2015/06/chart">
               <c:ext xmlns:c15="http://schemas.microsoft.com/office/drawing/2012/chart" uri="{CE6537A1-D6FC-4f65-9D91-7224C49458BB}">
+                <c15:layout/>
                 <c15:showLeaderLines val="1"/>
                 <c15:leaderLines>
                   <c:spPr>
@@ -1183,16 +1198,16 @@
                 <c:formatCode>0.00</c:formatCode>
                 <c:ptCount val="7"/>
                 <c:pt idx="0">
-                  <c:v>0</c:v>
+                  <c:v>0.0</c:v>
                 </c:pt>
                 <c:pt idx="1">
-                  <c:v>3.6666666666666661</c:v>
+                  <c:v>3.666666666666666</c:v>
                 </c:pt>
                 <c:pt idx="2">
-                  <c:v>3</c:v>
+                  <c:v>3.0</c:v>
                 </c:pt>
                 <c:pt idx="3">
-                  <c:v>5</c:v>
+                  <c:v>5.0</c:v>
                 </c:pt>
                 <c:pt idx="4">
                   <c:v>3.333333333333333</c:v>
@@ -1201,12 +1216,12 @@
                   <c:v>6.666666666666667</c:v>
                 </c:pt>
                 <c:pt idx="6">
-                  <c:v>0.66666666666666696</c:v>
+                  <c:v>0.666666666666667</c:v>
                 </c:pt>
               </c:numCache>
             </c:numRef>
           </c:val>
-          <c:extLst>
+          <c:extLst xmlns:c16r2="http://schemas.microsoft.com/office/drawing/2015/06/chart">
             <c:ext xmlns:c16="http://schemas.microsoft.com/office/drawing/2014/chart" uri="{C3380CC4-5D6E-409C-BE32-E72D297353CC}">
               <c16:uniqueId val="{00000000-423C-4C6D-B94D-14E3703AD4DB}"/>
             </c:ext>
@@ -1305,8 +1320,9 @@
             <c:showPercent val="0"/>
             <c:showBubbleSize val="0"/>
             <c:showLeaderLines val="0"/>
-            <c:extLst>
+            <c:extLst xmlns:c16r2="http://schemas.microsoft.com/office/drawing/2015/06/chart">
               <c:ext xmlns:c15="http://schemas.microsoft.com/office/drawing/2012/chart" uri="{CE6537A1-D6FC-4f65-9D91-7224C49458BB}">
+                <c15:layout/>
                 <c15:showLeaderLines val="1"/>
                 <c15:leaderLines>
                   <c:spPr>
@@ -1477,30 +1493,30 @@
                 <c:formatCode>0.00</c:formatCode>
                 <c:ptCount val="7"/>
                 <c:pt idx="0">
-                  <c:v>1.6722408026755851</c:v>
+                  <c:v>1.672240802675585</c:v>
                 </c:pt>
                 <c:pt idx="1">
                   <c:v>4.666666666666667</c:v>
                 </c:pt>
                 <c:pt idx="2">
-                  <c:v>6.3333333333333357</c:v>
+                  <c:v>6.33333333333334</c:v>
                 </c:pt>
                 <c:pt idx="3">
-                  <c:v>9</c:v>
+                  <c:v>9.0</c:v>
                 </c:pt>
                 <c:pt idx="4">
-                  <c:v>20.666666666666671</c:v>
+                  <c:v>20.66666666666667</c:v>
                 </c:pt>
                 <c:pt idx="5">
-                  <c:v>49.666666666666629</c:v>
+                  <c:v>49.66666666666658</c:v>
                 </c:pt>
                 <c:pt idx="6">
-                  <c:v>0.66666666666666696</c:v>
+                  <c:v>0.666666666666667</c:v>
                 </c:pt>
               </c:numCache>
             </c:numRef>
           </c:val>
-          <c:extLst>
+          <c:extLst xmlns:c16r2="http://schemas.microsoft.com/office/drawing/2015/06/chart">
             <c:ext xmlns:c16="http://schemas.microsoft.com/office/drawing/2014/chart" uri="{C3380CC4-5D6E-409C-BE32-E72D297353CC}">
               <c16:uniqueId val="{00000001-423C-4C6D-B94D-14E3703AD4DB}"/>
             </c:ext>
@@ -1599,8 +1615,9 @@
             <c:showPercent val="0"/>
             <c:showBubbleSize val="0"/>
             <c:showLeaderLines val="0"/>
-            <c:extLst>
+            <c:extLst xmlns:c16r2="http://schemas.microsoft.com/office/drawing/2015/06/chart">
               <c:ext xmlns:c15="http://schemas.microsoft.com/office/drawing/2012/chart" uri="{CE6537A1-D6FC-4f65-9D91-7224C49458BB}">
+                <c15:layout/>
                 <c15:showLeaderLines val="1"/>
                 <c15:leaderLines>
                   <c:spPr>
@@ -1771,30 +1788,30 @@
                 <c:formatCode>0.00</c:formatCode>
                 <c:ptCount val="7"/>
                 <c:pt idx="0">
-                  <c:v>5.0167224080267561</c:v>
+                  <c:v>5.016722408026756</c:v>
                 </c:pt>
                 <c:pt idx="1">
-                  <c:v>21.666666666666671</c:v>
+                  <c:v>21.66666666666667</c:v>
                 </c:pt>
                 <c:pt idx="2">
-                  <c:v>15</c:v>
+                  <c:v>15.0</c:v>
                 </c:pt>
                 <c:pt idx="3">
-                  <c:v>27</c:v>
+                  <c:v>27.0</c:v>
                 </c:pt>
                 <c:pt idx="4">
-                  <c:v>24.333333333333311</c:v>
+                  <c:v>24.33333333333328</c:v>
                 </c:pt>
                 <c:pt idx="5">
-                  <c:v>0</c:v>
+                  <c:v>0.0</c:v>
                 </c:pt>
                 <c:pt idx="6">
-                  <c:v>5.6666666666666661</c:v>
+                  <c:v>5.666666666666666</c:v>
                 </c:pt>
               </c:numCache>
             </c:numRef>
           </c:val>
-          <c:extLst>
+          <c:extLst xmlns:c16r2="http://schemas.microsoft.com/office/drawing/2015/06/chart">
             <c:ext xmlns:c16="http://schemas.microsoft.com/office/drawing/2014/chart" uri="{C3380CC4-5D6E-409C-BE32-E72D297353CC}">
               <c16:uniqueId val="{00000002-423C-4C6D-B94D-14E3703AD4DB}"/>
             </c:ext>
@@ -1893,8 +1910,9 @@
             <c:showPercent val="0"/>
             <c:showBubbleSize val="0"/>
             <c:showLeaderLines val="0"/>
-            <c:extLst>
+            <c:extLst xmlns:c16r2="http://schemas.microsoft.com/office/drawing/2015/06/chart">
               <c:ext xmlns:c15="http://schemas.microsoft.com/office/drawing/2012/chart" uri="{CE6537A1-D6FC-4f65-9D91-7224C49458BB}">
+                <c15:layout/>
                 <c15:showLeaderLines val="1"/>
                 <c15:leaderLines>
                   <c:spPr>
@@ -2065,30 +2083,30 @@
                 <c:formatCode>0.00</c:formatCode>
                 <c:ptCount val="7"/>
                 <c:pt idx="0">
-                  <c:v>92.976588628762542</c:v>
+                  <c:v>92.97658862876254</c:v>
                 </c:pt>
                 <c:pt idx="1">
-                  <c:v>68.666666666666671</c:v>
+                  <c:v>68.66666666666667</c:v>
                 </c:pt>
                 <c:pt idx="2">
-                  <c:v>75.333333333333286</c:v>
+                  <c:v>75.33333333333324</c:v>
                 </c:pt>
                 <c:pt idx="3">
-                  <c:v>59</c:v>
+                  <c:v>59.0</c:v>
                 </c:pt>
                 <c:pt idx="4">
-                  <c:v>51.666666666666629</c:v>
+                  <c:v>51.66666666666658</c:v>
                 </c:pt>
                 <c:pt idx="5">
-                  <c:v>43</c:v>
+                  <c:v>43.0</c:v>
                 </c:pt>
                 <c:pt idx="6">
-                  <c:v>93</c:v>
+                  <c:v>93.0</c:v>
                 </c:pt>
               </c:numCache>
             </c:numRef>
           </c:val>
-          <c:extLst>
+          <c:extLst xmlns:c16r2="http://schemas.microsoft.com/office/drawing/2015/06/chart">
             <c:ext xmlns:c16="http://schemas.microsoft.com/office/drawing/2014/chart" uri="{C3380CC4-5D6E-409C-BE32-E72D297353CC}">
               <c16:uniqueId val="{00000003-423C-4C6D-B94D-14E3703AD4DB}"/>
             </c:ext>
@@ -2104,12 +2122,12 @@
         </c:dLbls>
         <c:gapWidth val="150"/>
         <c:shape val="box"/>
-        <c:axId val="1370618752"/>
-        <c:axId val="1370621504"/>
-        <c:axId val="1370623984"/>
+        <c:axId val="-1190160720"/>
+        <c:axId val="-1190158944"/>
+        <c:axId val="-1190157168"/>
       </c:bar3DChart>
       <c:catAx>
-        <c:axId val="1370618752"/>
+        <c:axId val="-1190160720"/>
         <c:scaling>
           <c:orientation val="minMax"/>
         </c:scaling>
@@ -2119,7 +2137,7 @@
         <c:majorTickMark val="none"/>
         <c:minorTickMark val="none"/>
         <c:tickLblPos val="nextTo"/>
-        <c:crossAx val="1370621504"/>
+        <c:crossAx val="-1190158944"/>
         <c:crosses val="autoZero"/>
         <c:auto val="1"/>
         <c:lblAlgn val="ctr"/>
@@ -2127,7 +2145,7 @@
         <c:noMultiLvlLbl val="0"/>
       </c:catAx>
       <c:valAx>
-        <c:axId val="1370621504"/>
+        <c:axId val="-1190158944"/>
         <c:scaling>
           <c:orientation val="minMax"/>
         </c:scaling>
@@ -2177,12 +2195,12 @@
             <a:endParaRPr lang="en-US"/>
           </a:p>
         </c:txPr>
-        <c:crossAx val="1370618752"/>
+        <c:crossAx val="-1190160720"/>
         <c:crosses val="autoZero"/>
         <c:crossBetween val="between"/>
       </c:valAx>
       <c:serAx>
-        <c:axId val="1370623984"/>
+        <c:axId val="-1190157168"/>
         <c:scaling>
           <c:orientation val="minMax"/>
         </c:scaling>
@@ -2217,7 +2235,7 @@
             <a:endParaRPr lang="en-US"/>
           </a:p>
         </c:txPr>
-        <c:crossAx val="1370621504"/>
+        <c:crossAx val="-1190158944"/>
         <c:crosses val="autoZero"/>
       </c:serAx>
       <c:spPr>
@@ -2230,14 +2248,14 @@
     </c:plotArea>
     <c:plotVisOnly val="1"/>
     <c:dispBlanksAs val="gap"/>
-    <c:extLst>
+    <c:showDLblsOverMax val="0"/>
+    <c:extLst xmlns:c16r2="http://schemas.microsoft.com/office/drawing/2015/06/chart">
       <c:ext xmlns:c16r3="http://schemas.microsoft.com/office/drawing/2017/03/chart" uri="{56B9EC1D-385E-4148-901F-78D8002777C0}">
         <c16r3:dataDisplayOptions16>
           <c16r3:dispNaAsBlank val="1"/>
         </c16r3:dataDisplayOptions16>
       </c:ext>
     </c:extLst>
-    <c:showDLblsOverMax val="0"/>
   </c:chart>
   <c:spPr>
     <a:gradFill flip="none" rotWithShape="1">
@@ -2283,9 +2301,9 @@
 </file>
 
 <file path=ppt/charts/chart3.xml><?xml version="1.0" encoding="utf-8"?>
-<c:chartSpace xmlns:c="http://schemas.openxmlformats.org/drawingml/2006/chart" xmlns:a="http://schemas.openxmlformats.org/drawingml/2006/main" xmlns:r="http://schemas.openxmlformats.org/officeDocument/2006/relationships" xmlns:c16r2="http://schemas.microsoft.com/office/drawing/2015/06/chart">
+<c:chartSpace xmlns:c="http://schemas.openxmlformats.org/drawingml/2006/chart" xmlns:a="http://schemas.openxmlformats.org/drawingml/2006/main" xmlns:r="http://schemas.openxmlformats.org/officeDocument/2006/relationships">
   <c:date1904 val="0"/>
-  <c:lang val="it-IT"/>
+  <c:lang val="en-US"/>
   <c:roundedCorners val="0"/>
   <mc:AlternateContent xmlns:mc="http://schemas.openxmlformats.org/markup-compatibility/2006">
     <mc:Choice xmlns:c14="http://schemas.microsoft.com/office/drawing/2007/8/2/chart" Requires="c14">
@@ -2336,6 +2354,7 @@
           </a:p>
         </c:rich>
       </c:tx>
+      <c:layout/>
       <c:overlay val="0"/>
       <c:spPr>
         <a:noFill/>
@@ -2442,27 +2461,27 @@
                   <c:v>12.07854352251514</c:v>
                 </c:pt>
                 <c:pt idx="1">
-                  <c:v>44.055603157929298</c:v>
+                  <c:v>44.0556031579293</c:v>
                 </c:pt>
                 <c:pt idx="2">
-                  <c:v>68.573762070149556</c:v>
+                  <c:v>68.57376207014951</c:v>
                 </c:pt>
                 <c:pt idx="3">
-                  <c:v>68.454836351309709</c:v>
+                  <c:v>68.45483635130971</c:v>
                 </c:pt>
                 <c:pt idx="4">
                   <c:v>40.59262994799748</c:v>
                 </c:pt>
                 <c:pt idx="5">
-                  <c:v>64.226372259143957</c:v>
+                  <c:v>64.22637225914391</c:v>
                 </c:pt>
                 <c:pt idx="6">
-                  <c:v>49.249261290781249</c:v>
+                  <c:v>49.24926129078125</c:v>
                 </c:pt>
               </c:numCache>
             </c:numRef>
           </c:val>
-          <c:extLst>
+          <c:extLst xmlns:c16r2="http://schemas.microsoft.com/office/drawing/2015/06/chart">
             <c:ext xmlns:c16="http://schemas.microsoft.com/office/drawing/2014/chart" uri="{C3380CC4-5D6E-409C-BE32-E72D297353CC}">
               <c16:uniqueId val="{00000000-4221-4AC6-9462-5900E7F2AF98}"/>
             </c:ext>
@@ -2529,22 +2548,22 @@
                 <c:formatCode>0.00</c:formatCode>
                 <c:ptCount val="7"/>
                 <c:pt idx="0">
-                  <c:v>3.5943251398420131</c:v>
+                  <c:v>3.594325139842013</c:v>
                 </c:pt>
                 <c:pt idx="1">
-                  <c:v>29.768168436725858</c:v>
+                  <c:v>29.76816843672583</c:v>
                 </c:pt>
                 <c:pt idx="2">
-                  <c:v>51.903349490157858</c:v>
+                  <c:v>51.90334949015786</c:v>
                 </c:pt>
                 <c:pt idx="3">
-                  <c:v>49.030697913570222</c:v>
+                  <c:v>49.03069791357022</c:v>
                 </c:pt>
                 <c:pt idx="4">
-                  <c:v>41.166224314308607</c:v>
+                  <c:v>41.16622431430861</c:v>
                 </c:pt>
                 <c:pt idx="5">
-                  <c:v>51.87654906525632</c:v>
+                  <c:v>51.87654906525628</c:v>
                 </c:pt>
                 <c:pt idx="6">
                   <c:v>27.90661692619954</c:v>
@@ -2552,7 +2571,7 @@
               </c:numCache>
             </c:numRef>
           </c:val>
-          <c:extLst>
+          <c:extLst xmlns:c16r2="http://schemas.microsoft.com/office/drawing/2015/06/chart">
             <c:ext xmlns:c16="http://schemas.microsoft.com/office/drawing/2014/chart" uri="{C3380CC4-5D6E-409C-BE32-E72D297353CC}">
               <c16:uniqueId val="{00000001-4221-4AC6-9462-5900E7F2AF98}"/>
             </c:ext>
@@ -2619,22 +2638,22 @@
                 <c:formatCode>0.00</c:formatCode>
                 <c:ptCount val="7"/>
                 <c:pt idx="0">
-                  <c:v>1.0470855143303051</c:v>
+                  <c:v>1.047085514330305</c:v>
                 </c:pt>
                 <c:pt idx="1">
-                  <c:v>21.124832247250101</c:v>
+                  <c:v>21.1248322472501</c:v>
                 </c:pt>
                 <c:pt idx="2">
-                  <c:v>30.427052202420811</c:v>
+                  <c:v>30.42705220242081</c:v>
                 </c:pt>
                 <c:pt idx="3">
                   <c:v>30.26742075690127</c:v>
                 </c:pt>
                 <c:pt idx="4">
-                  <c:v>26.485309046831119</c:v>
+                  <c:v>26.48530904683109</c:v>
                 </c:pt>
                 <c:pt idx="5">
-                  <c:v>32.859135157647472</c:v>
+                  <c:v>32.85913515764743</c:v>
                 </c:pt>
                 <c:pt idx="6">
                   <c:v>21.99634617908459</c:v>
@@ -2642,7 +2661,7 @@
               </c:numCache>
             </c:numRef>
           </c:val>
-          <c:extLst>
+          <c:extLst xmlns:c16r2="http://schemas.microsoft.com/office/drawing/2015/06/chart">
             <c:ext xmlns:c16="http://schemas.microsoft.com/office/drawing/2014/chart" uri="{C3380CC4-5D6E-409C-BE32-E72D297353CC}">
               <c16:uniqueId val="{00000002-4221-4AC6-9462-5900E7F2AF98}"/>
             </c:ext>
@@ -2709,30 +2728,30 @@
                 <c:formatCode>0.00</c:formatCode>
                 <c:ptCount val="7"/>
                 <c:pt idx="0">
-                  <c:v>0.44084248345852001</c:v>
+                  <c:v>0.44084248345852</c:v>
                 </c:pt>
                 <c:pt idx="1">
                   <c:v>15.79477493040673</c:v>
                 </c:pt>
                 <c:pt idx="2">
-                  <c:v>20.833672651883209</c:v>
+                  <c:v>20.83367265188321</c:v>
                 </c:pt>
                 <c:pt idx="3">
-                  <c:v>19.978717675136661</c:v>
+                  <c:v>19.97871767513663</c:v>
                 </c:pt>
                 <c:pt idx="4">
-                  <c:v>19.679689403301399</c:v>
+                  <c:v>19.6796894033014</c:v>
                 </c:pt>
                 <c:pt idx="5">
-                  <c:v>23.038398096550651</c:v>
+                  <c:v>23.03839809655065</c:v>
                 </c:pt>
                 <c:pt idx="6">
-                  <c:v>25.35942953350353</c:v>
+                  <c:v>25.35942953350352</c:v>
                 </c:pt>
               </c:numCache>
             </c:numRef>
           </c:val>
-          <c:extLst>
+          <c:extLst xmlns:c16r2="http://schemas.microsoft.com/office/drawing/2015/06/chart">
             <c:ext xmlns:c16="http://schemas.microsoft.com/office/drawing/2014/chart" uri="{C3380CC4-5D6E-409C-BE32-E72D297353CC}">
               <c16:uniqueId val="{00000003-4221-4AC6-9462-5900E7F2AF98}"/>
             </c:ext>
@@ -2799,30 +2818,30 @@
                 <c:formatCode>0.00</c:formatCode>
                 <c:ptCount val="7"/>
                 <c:pt idx="0">
-                  <c:v>3.0736903751131601E-2</c:v>
+                  <c:v>0.0307369037511316</c:v>
                 </c:pt>
                 <c:pt idx="1">
-                  <c:v>7.9322201100469556</c:v>
+                  <c:v>7.932220110046956</c:v>
                 </c:pt>
                 <c:pt idx="2">
                   <c:v>10.09705649676077</c:v>
                 </c:pt>
                 <c:pt idx="3">
-                  <c:v>8.9125307332890742</c:v>
+                  <c:v>8.91253073328908</c:v>
                 </c:pt>
                 <c:pt idx="4">
-                  <c:v>12.602775127056949</c:v>
+                  <c:v>12.60277512705695</c:v>
                 </c:pt>
                 <c:pt idx="5">
-                  <c:v>19.261191534590331</c:v>
+                  <c:v>19.26119153459032</c:v>
                 </c:pt>
                 <c:pt idx="6">
-                  <c:v>4.2257341347289046</c:v>
+                  <c:v>4.225734134728905</c:v>
                 </c:pt>
               </c:numCache>
             </c:numRef>
           </c:val>
-          <c:extLst>
+          <c:extLst xmlns:c16r2="http://schemas.microsoft.com/office/drawing/2015/06/chart">
             <c:ext xmlns:c16="http://schemas.microsoft.com/office/drawing/2014/chart" uri="{C3380CC4-5D6E-409C-BE32-E72D297353CC}">
               <c16:uniqueId val="{00000004-4221-4AC6-9462-5900E7F2AF98}"/>
             </c:ext>
@@ -2838,11 +2857,11 @@
         </c:dLbls>
         <c:gapWidth val="100"/>
         <c:overlap val="-24"/>
-        <c:axId val="1388759264"/>
-        <c:axId val="1388761040"/>
+        <c:axId val="-1190229152"/>
+        <c:axId val="-1190226832"/>
       </c:barChart>
       <c:catAx>
-        <c:axId val="1388759264"/>
+        <c:axId val="-1190229152"/>
         <c:scaling>
           <c:orientation val="minMax"/>
         </c:scaling>
@@ -2898,7 +2917,7 @@
             <a:endParaRPr lang="en-US"/>
           </a:p>
         </c:txPr>
-        <c:crossAx val="1388761040"/>
+        <c:crossAx val="-1190226832"/>
         <c:crosses val="autoZero"/>
         <c:auto val="1"/>
         <c:lblAlgn val="ctr"/>
@@ -2906,7 +2925,7 @@
         <c:noMultiLvlLbl val="0"/>
       </c:catAx>
       <c:valAx>
-        <c:axId val="1388761040"/>
+        <c:axId val="-1190226832"/>
         <c:scaling>
           <c:orientation val="minMax"/>
         </c:scaling>
@@ -2969,7 +2988,7 @@
             <a:endParaRPr lang="en-US"/>
           </a:p>
         </c:txPr>
-        <c:crossAx val="1388759264"/>
+        <c:crossAx val="-1190229152"/>
         <c:crosses val="autoZero"/>
         <c:crossBetween val="between"/>
       </c:valAx>
@@ -2983,6 +3002,7 @@
     </c:plotArea>
     <c:legend>
       <c:legendPos val="b"/>
+      <c:layout/>
       <c:overlay val="0"/>
       <c:spPr>
         <a:noFill/>
@@ -4810,7 +4830,7 @@
           <a:p>
             <a:fld id="{C48AFB7A-17CF-8C44-8080-93AF7347A24D}" type="datetimeFigureOut">
               <a:rPr lang="en-US" smtClean="0"/>
-              <a:t>1/9/2018</a:t>
+              <a:t>1/10/18</a:t>
             </a:fld>
             <a:endParaRPr lang="en-US"/>
           </a:p>
@@ -4968,7 +4988,7 @@
           <a:p>
             <a:fld id="{F81F356D-41A4-0342-8E44-94109B993633}" type="slidenum">
               <a:rPr lang="en-US" smtClean="0"/>
-              <a:t>‹N›</a:t>
+              <a:t>‹#›</a:t>
             </a:fld>
             <a:endParaRPr lang="en-US"/>
           </a:p>
@@ -5152,6 +5172,201 @@
     <p:extLst>
       <p:ext uri="{BB962C8B-B14F-4D97-AF65-F5344CB8AC3E}">
         <p14:creationId xmlns:p14="http://schemas.microsoft.com/office/powerpoint/2010/main" val="853105018"/>
+      </p:ext>
+    </p:extLst>
+  </p:cSld>
+  <p:clrMapOvr>
+    <a:masterClrMapping/>
+  </p:clrMapOvr>
+</p:notes>
+</file>
+
+<file path=ppt/notesSlides/notesSlide2.xml><?xml version="1.0" encoding="utf-8"?>
+<p:notes xmlns:a="http://schemas.openxmlformats.org/drawingml/2006/main" xmlns:r="http://schemas.openxmlformats.org/officeDocument/2006/relationships" xmlns:p="http://schemas.openxmlformats.org/presentationml/2006/main">
+  <p:cSld>
+    <p:spTree>
+      <p:nvGrpSpPr>
+        <p:cNvPr id="1" name=""/>
+        <p:cNvGrpSpPr/>
+        <p:nvPr/>
+      </p:nvGrpSpPr>
+      <p:grpSpPr>
+        <a:xfrm>
+          <a:off x="0" y="0"/>
+          <a:ext cx="0" cy="0"/>
+          <a:chOff x="0" y="0"/>
+          <a:chExt cx="0" cy="0"/>
+        </a:xfrm>
+      </p:grpSpPr>
+      <p:sp>
+        <p:nvSpPr>
+          <p:cNvPr id="2" name="Slide Image Placeholder 1"/>
+          <p:cNvSpPr>
+            <a:spLocks noGrp="1" noRot="1" noChangeAspect="1"/>
+          </p:cNvSpPr>
+          <p:nvPr>
+            <p:ph type="sldImg"/>
+          </p:nvPr>
+        </p:nvSpPr>
+        <p:spPr/>
+      </p:sp>
+      <p:sp>
+        <p:nvSpPr>
+          <p:cNvPr id="3" name="Notes Placeholder 2"/>
+          <p:cNvSpPr>
+            <a:spLocks noGrp="1"/>
+          </p:cNvSpPr>
+          <p:nvPr>
+            <p:ph type="body" idx="1"/>
+          </p:nvPr>
+        </p:nvSpPr>
+        <p:spPr/>
+        <p:txBody>
+          <a:bodyPr/>
+          <a:lstStyle/>
+          <a:p>
+            <a:r>
+              <a:rPr lang="en-US" dirty="0" smtClean="0"/>
+              <a:t>- </a:t>
+            </a:r>
+            <a:r>
+              <a:rPr lang="en-US" dirty="0" err="1" smtClean="0"/>
+              <a:t>Anneling</a:t>
+            </a:r>
+            <a:r>
+              <a:rPr lang="en-US" baseline="0" dirty="0" smtClean="0"/>
+              <a:t> not change related to #exam</a:t>
+            </a:r>
+            <a:br>
+              <a:rPr lang="en-US" baseline="0" dirty="0" smtClean="0"/>
+            </a:br>
+            <a:r>
+              <a:rPr lang="en-US" baseline="0" dirty="0" smtClean="0"/>
+              <a:t>- Benchmark calculation require time</a:t>
+            </a:r>
+            <a:endParaRPr lang="en-US" dirty="0"/>
+          </a:p>
+        </p:txBody>
+      </p:sp>
+      <p:sp>
+        <p:nvSpPr>
+          <p:cNvPr id="4" name="Slide Number Placeholder 3"/>
+          <p:cNvSpPr>
+            <a:spLocks noGrp="1"/>
+          </p:cNvSpPr>
+          <p:nvPr>
+            <p:ph type="sldNum" sz="quarter" idx="10"/>
+          </p:nvPr>
+        </p:nvSpPr>
+        <p:spPr/>
+        <p:txBody>
+          <a:bodyPr/>
+          <a:lstStyle/>
+          <a:p>
+            <a:fld id="{F81F356D-41A4-0342-8E44-94109B993633}" type="slidenum">
+              <a:rPr lang="en-US" smtClean="0"/>
+              <a:t>17</a:t>
+            </a:fld>
+            <a:endParaRPr lang="en-US"/>
+          </a:p>
+        </p:txBody>
+      </p:sp>
+    </p:spTree>
+    <p:extLst>
+      <p:ext uri="{BB962C8B-B14F-4D97-AF65-F5344CB8AC3E}">
+        <p14:creationId xmlns:p14="http://schemas.microsoft.com/office/powerpoint/2010/main" val="339363688"/>
+      </p:ext>
+    </p:extLst>
+  </p:cSld>
+  <p:clrMapOvr>
+    <a:masterClrMapping/>
+  </p:clrMapOvr>
+</p:notes>
+</file>
+
+<file path=ppt/notesSlides/notesSlide3.xml><?xml version="1.0" encoding="utf-8"?>
+<p:notes xmlns:a="http://schemas.openxmlformats.org/drawingml/2006/main" xmlns:r="http://schemas.openxmlformats.org/officeDocument/2006/relationships" xmlns:p="http://schemas.openxmlformats.org/presentationml/2006/main">
+  <p:cSld>
+    <p:spTree>
+      <p:nvGrpSpPr>
+        <p:cNvPr id="1" name=""/>
+        <p:cNvGrpSpPr/>
+        <p:nvPr/>
+      </p:nvGrpSpPr>
+      <p:grpSpPr>
+        <a:xfrm>
+          <a:off x="0" y="0"/>
+          <a:ext cx="0" cy="0"/>
+          <a:chOff x="0" y="0"/>
+          <a:chExt cx="0" cy="0"/>
+        </a:xfrm>
+      </p:grpSpPr>
+      <p:sp>
+        <p:nvSpPr>
+          <p:cNvPr id="2" name="Slide Image Placeholder 1"/>
+          <p:cNvSpPr>
+            <a:spLocks noGrp="1" noRot="1" noChangeAspect="1"/>
+          </p:cNvSpPr>
+          <p:nvPr>
+            <p:ph type="sldImg"/>
+          </p:nvPr>
+        </p:nvSpPr>
+        <p:spPr/>
+      </p:sp>
+      <p:sp>
+        <p:nvSpPr>
+          <p:cNvPr id="3" name="Notes Placeholder 2"/>
+          <p:cNvSpPr>
+            <a:spLocks noGrp="1"/>
+          </p:cNvSpPr>
+          <p:nvPr>
+            <p:ph type="body" idx="1"/>
+          </p:nvPr>
+        </p:nvSpPr>
+        <p:spPr/>
+        <p:txBody>
+          <a:bodyPr/>
+          <a:lstStyle/>
+          <a:p>
+            <a:r>
+              <a:rPr lang="en-US" dirty="0" smtClean="0"/>
+              <a:t>All</a:t>
+            </a:r>
+            <a:r>
+              <a:rPr lang="en-US" baseline="0" dirty="0" smtClean="0"/>
+              <a:t> versions improve all problem, get a good solution in any case.</a:t>
+            </a:r>
+            <a:endParaRPr lang="en-US" dirty="0"/>
+          </a:p>
+        </p:txBody>
+      </p:sp>
+      <p:sp>
+        <p:nvSpPr>
+          <p:cNvPr id="4" name="Slide Number Placeholder 3"/>
+          <p:cNvSpPr>
+            <a:spLocks noGrp="1"/>
+          </p:cNvSpPr>
+          <p:nvPr>
+            <p:ph type="sldNum" sz="quarter" idx="10"/>
+          </p:nvPr>
+        </p:nvSpPr>
+        <p:spPr/>
+        <p:txBody>
+          <a:bodyPr/>
+          <a:lstStyle/>
+          <a:p>
+            <a:fld id="{F81F356D-41A4-0342-8E44-94109B993633}" type="slidenum">
+              <a:rPr lang="en-US" smtClean="0"/>
+              <a:t>20</a:t>
+            </a:fld>
+            <a:endParaRPr lang="en-US"/>
+          </a:p>
+        </p:txBody>
+      </p:sp>
+    </p:spTree>
+    <p:extLst>
+      <p:ext uri="{BB962C8B-B14F-4D97-AF65-F5344CB8AC3E}">
+        <p14:creationId xmlns:p14="http://schemas.microsoft.com/office/powerpoint/2010/main" val="1802757117"/>
       </p:ext>
     </p:extLst>
   </p:cSld>
@@ -6570,7 +6785,7 @@
           <a:p>
             <a:fld id="{DFA7CFB6-B003-BC42-88FE-B4FAC05D1CE1}" type="datetime1">
               <a:rPr lang="it-IT" smtClean="0"/>
-              <a:t>09/01/2018</a:t>
+              <a:t>10/01/18</a:t>
             </a:fld>
             <a:endParaRPr lang="en-US" dirty="0"/>
           </a:p>
@@ -6626,7 +6841,7 @@
           <a:p>
             <a:fld id="{6D22F896-40B5-4ADD-8801-0D06FADFA095}" type="slidenum">
               <a:rPr lang="en-US" dirty="0"/>
-              <a:t>‹N›</a:t>
+              <a:t>‹#›</a:t>
             </a:fld>
             <a:endParaRPr lang="en-US" dirty="0"/>
           </a:p>
@@ -8024,7 +8239,7 @@
           <a:p>
             <a:fld id="{4E971836-4E15-444F-900D-C97D09E99EE9}" type="datetime1">
               <a:rPr lang="it-IT" smtClean="0"/>
-              <a:t>09/01/2018</a:t>
+              <a:t>10/01/18</a:t>
             </a:fld>
             <a:endParaRPr lang="en-US" dirty="0"/>
           </a:p>
@@ -8066,7 +8281,7 @@
           <a:p>
             <a:fld id="{6D22F896-40B5-4ADD-8801-0D06FADFA095}" type="slidenum">
               <a:rPr lang="en-US" dirty="0"/>
-              <a:t>‹N›</a:t>
+              <a:t>‹#›</a:t>
             </a:fld>
             <a:endParaRPr lang="en-US" dirty="0"/>
           </a:p>
@@ -9472,7 +9687,7 @@
           <a:p>
             <a:fld id="{429D95B6-7928-474A-BABD-3DBC5F85F7BD}" type="datetime1">
               <a:rPr lang="it-IT" smtClean="0"/>
-              <a:t>09/01/2018</a:t>
+              <a:t>10/01/18</a:t>
             </a:fld>
             <a:endParaRPr lang="en-US" dirty="0"/>
           </a:p>
@@ -9524,7 +9739,7 @@
           <a:p>
             <a:fld id="{6D22F896-40B5-4ADD-8801-0D06FADFA095}" type="slidenum">
               <a:rPr lang="en-US" dirty="0"/>
-              <a:t>‹N›</a:t>
+              <a:t>‹#›</a:t>
             </a:fld>
             <a:endParaRPr lang="en-US" dirty="0"/>
           </a:p>
@@ -10922,7 +11137,7 @@
           <a:p>
             <a:fld id="{2207C7D2-4DED-174D-9310-BDD2301FDAC5}" type="datetime1">
               <a:rPr lang="it-IT" smtClean="0"/>
-              <a:t>09/01/2018</a:t>
+              <a:t>10/01/18</a:t>
             </a:fld>
             <a:endParaRPr lang="en-US" dirty="0"/>
           </a:p>
@@ -10964,7 +11179,7 @@
           <a:p>
             <a:fld id="{6D22F896-40B5-4ADD-8801-0D06FADFA095}" type="slidenum">
               <a:rPr lang="en-US" dirty="0"/>
-              <a:t>‹N›</a:t>
+              <a:t>‹#›</a:t>
             </a:fld>
             <a:endParaRPr lang="en-US" dirty="0"/>
           </a:p>
@@ -12425,7 +12640,7 @@
           <a:p>
             <a:fld id="{A1104F8D-FD8A-E849-A431-D3B9642506D8}" type="datetime1">
               <a:rPr lang="it-IT" smtClean="0"/>
-              <a:t>09/01/2018</a:t>
+              <a:t>10/01/18</a:t>
             </a:fld>
             <a:endParaRPr lang="en-US" dirty="0"/>
           </a:p>
@@ -12481,7 +12696,7 @@
           <a:p>
             <a:fld id="{6D22F896-40B5-4ADD-8801-0D06FADFA095}" type="slidenum">
               <a:rPr lang="en-US" dirty="0"/>
-              <a:t>‹N›</a:t>
+              <a:t>‹#›</a:t>
             </a:fld>
             <a:endParaRPr lang="en-US" dirty="0"/>
           </a:p>
@@ -13941,7 +14156,7 @@
           <a:p>
             <a:fld id="{F5EB9A5F-66FB-6A4C-9E40-84592031B7EA}" type="datetime1">
               <a:rPr lang="it-IT" smtClean="0"/>
-              <a:t>09/01/2018</a:t>
+              <a:t>10/01/18</a:t>
             </a:fld>
             <a:endParaRPr lang="en-US" dirty="0"/>
           </a:p>
@@ -13993,7 +14208,7 @@
           <a:p>
             <a:fld id="{6D22F896-40B5-4ADD-8801-0D06FADFA095}" type="slidenum">
               <a:rPr lang="en-US" dirty="0"/>
-              <a:t>‹N›</a:t>
+              <a:t>‹#›</a:t>
             </a:fld>
             <a:endParaRPr lang="en-US" dirty="0"/>
           </a:p>
@@ -15601,7 +15816,7 @@
           <a:p>
             <a:fld id="{29D024BA-DF5C-1049-A52F-B8178A2FE085}" type="datetime1">
               <a:rPr lang="it-IT" smtClean="0"/>
-              <a:t>09/01/2018</a:t>
+              <a:t>10/01/18</a:t>
             </a:fld>
             <a:endParaRPr lang="en-US" dirty="0"/>
           </a:p>
@@ -15653,7 +15868,7 @@
           <a:p>
             <a:fld id="{6D22F896-40B5-4ADD-8801-0D06FADFA095}" type="slidenum">
               <a:rPr lang="en-US" dirty="0"/>
-              <a:t>‹N›</a:t>
+              <a:t>‹#›</a:t>
             </a:fld>
             <a:endParaRPr lang="en-US" dirty="0"/>
           </a:p>
@@ -16994,7 +17209,7 @@
           <a:p>
             <a:fld id="{40361C44-3C47-E94A-8DA3-119261B04D9E}" type="datetime1">
               <a:rPr lang="it-IT" smtClean="0"/>
-              <a:t>09/01/2018</a:t>
+              <a:t>10/01/18</a:t>
             </a:fld>
             <a:endParaRPr lang="en-US" dirty="0"/>
           </a:p>
@@ -17036,7 +17251,7 @@
           <a:p>
             <a:fld id="{6D22F896-40B5-4ADD-8801-0D06FADFA095}" type="slidenum">
               <a:rPr lang="en-US" dirty="0"/>
-              <a:t>‹N›</a:t>
+              <a:t>‹#›</a:t>
             </a:fld>
             <a:endParaRPr lang="en-US" dirty="0"/>
           </a:p>
@@ -17089,7 +17304,7 @@
           <a:p>
             <a:fld id="{1735315A-E8CC-4949-ABED-8487AE126D46}" type="datetime1">
               <a:rPr lang="it-IT" smtClean="0"/>
-              <a:t>09/01/2018</a:t>
+              <a:t>10/01/18</a:t>
             </a:fld>
             <a:endParaRPr lang="en-US" dirty="0"/>
           </a:p>
@@ -17141,7 +17356,7 @@
           <a:p>
             <a:fld id="{6D22F896-40B5-4ADD-8801-0D06FADFA095}" type="slidenum">
               <a:rPr lang="en-US" dirty="0"/>
-              <a:t>‹N›</a:t>
+              <a:t>‹#›</a:t>
             </a:fld>
             <a:endParaRPr lang="en-US" dirty="0"/>
           </a:p>
@@ -18610,7 +18825,7 @@
           <a:p>
             <a:fld id="{F52B5142-48B6-4F4A-940E-67B32832C9FE}" type="datetime1">
               <a:rPr lang="it-IT" smtClean="0"/>
-              <a:t>09/01/2018</a:t>
+              <a:t>10/01/18</a:t>
             </a:fld>
             <a:endParaRPr lang="en-US" dirty="0"/>
           </a:p>
@@ -18652,7 +18867,7 @@
           <a:p>
             <a:fld id="{6D22F896-40B5-4ADD-8801-0D06FADFA095}" type="slidenum">
               <a:rPr lang="en-US" dirty="0"/>
-              <a:t>‹N›</a:t>
+              <a:t>‹#›</a:t>
             </a:fld>
             <a:endParaRPr lang="en-US" dirty="0"/>
           </a:p>
@@ -20141,7 +20356,7 @@
           <a:p>
             <a:fld id="{A51D804C-9192-1442-8FC2-D1409F16AFE8}" type="datetime1">
               <a:rPr lang="it-IT" smtClean="0"/>
-              <a:t>09/01/2018</a:t>
+              <a:t>10/01/18</a:t>
             </a:fld>
             <a:endParaRPr lang="en-US" dirty="0"/>
           </a:p>
@@ -20193,7 +20408,7 @@
           <a:p>
             <a:fld id="{6D22F896-40B5-4ADD-8801-0D06FADFA095}" type="slidenum">
               <a:rPr lang="en-US" dirty="0"/>
-              <a:t>‹N›</a:t>
+              <a:t>‹#›</a:t>
             </a:fld>
             <a:endParaRPr lang="en-US" dirty="0"/>
           </a:p>
@@ -20386,7 +20601,7 @@
           <a:p>
             <a:fld id="{A7C402B9-E8CC-854C-A8E1-90183018B3BF}" type="datetime1">
               <a:rPr lang="it-IT" smtClean="0"/>
-              <a:t>09/01/2018</a:t>
+              <a:t>10/01/18</a:t>
             </a:fld>
             <a:endParaRPr lang="en-US" dirty="0"/>
           </a:p>
@@ -20465,7 +20680,7 @@
             <a:fld id="{6D22F896-40B5-4ADD-8801-0D06FADFA095}" type="slidenum">
               <a:rPr lang="en-US" dirty="0"/>
               <a:pPr/>
-              <a:t>‹N›</a:t>
+              <a:t>‹#›</a:t>
             </a:fld>
             <a:endParaRPr lang="en-US" dirty="0"/>
           </a:p>
@@ -20977,6 +21192,13 @@
   <p:clrMapOvr>
     <a:masterClrMapping/>
   </p:clrMapOvr>
+  <p:timing>
+    <p:tnLst>
+      <p:par>
+        <p:cTn id="1" dur="indefinite" restart="never" nodeType="tmRoot"/>
+      </p:par>
+    </p:tnLst>
+  </p:timing>
 </p:sld>
 </file>
 
@@ -21122,6 +21344,13 @@
   <p:clrMapOvr>
     <a:masterClrMapping/>
   </p:clrMapOvr>
+  <p:timing>
+    <p:tnLst>
+      <p:par>
+        <p:cTn id="1" dur="indefinite" restart="never" nodeType="tmRoot"/>
+      </p:par>
+    </p:tnLst>
+  </p:timing>
 </p:sld>
 </file>
 
@@ -21283,6 +21512,13 @@
   <p:clrMapOvr>
     <a:masterClrMapping/>
   </p:clrMapOvr>
+  <p:timing>
+    <p:tnLst>
+      <p:par>
+        <p:cTn id="1" dur="indefinite" restart="never" nodeType="tmRoot"/>
+      </p:par>
+    </p:tnLst>
+  </p:timing>
 </p:sld>
 </file>
 
@@ -21404,6 +21640,13 @@
   <p:clrMapOvr>
     <a:masterClrMapping/>
   </p:clrMapOvr>
+  <p:timing>
+    <p:tnLst>
+      <p:par>
+        <p:cTn id="1" dur="indefinite" restart="never" nodeType="tmRoot"/>
+      </p:par>
+    </p:tnLst>
+  </p:timing>
 </p:sld>
 </file>
 
@@ -21502,6 +21745,13 @@
   <p:clrMapOvr>
     <a:masterClrMapping/>
   </p:clrMapOvr>
+  <p:timing>
+    <p:tnLst>
+      <p:par>
+        <p:cTn id="1" dur="indefinite" restart="never" nodeType="tmRoot"/>
+      </p:par>
+    </p:tnLst>
+  </p:timing>
 </p:sld>
 </file>
 
@@ -21636,6 +21886,13 @@
   <p:clrMapOvr>
     <a:masterClrMapping/>
   </p:clrMapOvr>
+  <p:timing>
+    <p:tnLst>
+      <p:par>
+        <p:cTn id="1" dur="indefinite" restart="never" nodeType="tmRoot"/>
+      </p:par>
+    </p:tnLst>
+  </p:timing>
 </p:sld>
 </file>
 
@@ -21716,6 +21973,13 @@
   <p:clrMapOvr>
     <a:masterClrMapping/>
   </p:clrMapOvr>
+  <p:timing>
+    <p:tnLst>
+      <p:par>
+        <p:cTn id="1" dur="indefinite" restart="never" nodeType="tmRoot"/>
+      </p:par>
+    </p:tnLst>
+  </p:timing>
 </p:sld>
 </file>
 
@@ -21741,7 +22005,7 @@
           <p:cNvPr id="2" name="Titolo 1">
             <a:extLst>
               <a:ext uri="{FF2B5EF4-FFF2-40B4-BE49-F238E27FC236}">
-                <a16:creationId xmlns:a16="http://schemas.microsoft.com/office/drawing/2014/main" id="{82E4D137-6351-4496-B0DE-EE5D2D2FC685}"/>
+                <a16:creationId xmlns:a16="http://schemas.microsoft.com/office/drawing/2014/main" xmlns="" id="{82E4D137-6351-4496-B0DE-EE5D2D2FC685}"/>
               </a:ext>
             </a:extLst>
           </p:cNvPr>
@@ -21772,7 +22036,7 @@
           <p:cNvPr id="3" name="Segnaposto contenuto 2">
             <a:extLst>
               <a:ext uri="{FF2B5EF4-FFF2-40B4-BE49-F238E27FC236}">
-                <a16:creationId xmlns:a16="http://schemas.microsoft.com/office/drawing/2014/main" id="{D1AD23D3-52EB-43AE-B408-78EE484130B1}"/>
+                <a16:creationId xmlns:a16="http://schemas.microsoft.com/office/drawing/2014/main" xmlns="" id="{D1AD23D3-52EB-43AE-B408-78EE484130B1}"/>
               </a:ext>
             </a:extLst>
           </p:cNvPr>
@@ -21797,7 +22061,7 @@
           <p:cNvPr id="4" name="Segnaposto numero diapositiva 3">
             <a:extLst>
               <a:ext uri="{FF2B5EF4-FFF2-40B4-BE49-F238E27FC236}">
-                <a16:creationId xmlns:a16="http://schemas.microsoft.com/office/drawing/2014/main" id="{44344993-EB5E-481E-9648-C751E3522B27}"/>
+                <a16:creationId xmlns:a16="http://schemas.microsoft.com/office/drawing/2014/main" xmlns="" id="{44344993-EB5E-481E-9648-C751E3522B27}"/>
               </a:ext>
             </a:extLst>
           </p:cNvPr>
@@ -21826,7 +22090,7 @@
           <p:cNvPr id="5" name="Grafico 4">
             <a:extLst>
               <a:ext uri="{FF2B5EF4-FFF2-40B4-BE49-F238E27FC236}">
-                <a16:creationId xmlns:a16="http://schemas.microsoft.com/office/drawing/2014/main" id="{D2FAD8B6-79C6-44E9-93E3-A22CD9B2457B}"/>
+                <a16:creationId xmlns:a16="http://schemas.microsoft.com/office/drawing/2014/main" xmlns="" id="{D2FAD8B6-79C6-44E9-93E3-A22CD9B2457B}"/>
               </a:ext>
             </a:extLst>
           </p:cNvPr>
@@ -21861,6 +22125,13 @@
   <p:clrMapOvr>
     <a:masterClrMapping/>
   </p:clrMapOvr>
+  <p:timing>
+    <p:tnLst>
+      <p:par>
+        <p:cTn id="1" dur="indefinite" restart="never" nodeType="tmRoot"/>
+      </p:par>
+    </p:tnLst>
+  </p:timing>
 </p:sld>
 </file>
 
@@ -21886,7 +22157,7 @@
           <p:cNvPr id="2" name="Segnaposto numero diapositiva 1">
             <a:extLst>
               <a:ext uri="{FF2B5EF4-FFF2-40B4-BE49-F238E27FC236}">
-                <a16:creationId xmlns:a16="http://schemas.microsoft.com/office/drawing/2014/main" id="{D52846D3-11F6-459C-8F16-859F00A0620B}"/>
+                <a16:creationId xmlns:a16="http://schemas.microsoft.com/office/drawing/2014/main" xmlns="" id="{D52846D3-11F6-459C-8F16-859F00A0620B}"/>
               </a:ext>
             </a:extLst>
           </p:cNvPr>
@@ -21915,7 +22186,7 @@
           <p:cNvPr id="6" name="Grafico 5">
             <a:extLst>
               <a:ext uri="{FF2B5EF4-FFF2-40B4-BE49-F238E27FC236}">
-                <a16:creationId xmlns:a16="http://schemas.microsoft.com/office/drawing/2014/main" id="{A6D627D2-81FA-4782-A659-8360C94599CB}"/>
+                <a16:creationId xmlns:a16="http://schemas.microsoft.com/office/drawing/2014/main" xmlns="" id="{A6D627D2-81FA-4782-A659-8360C94599CB}"/>
               </a:ext>
             </a:extLst>
           </p:cNvPr>
@@ -21936,7 +22207,7 @@
         </p:xfrm>
         <a:graphic>
           <a:graphicData uri="http://schemas.openxmlformats.org/drawingml/2006/chart">
-            <c:chart xmlns:c="http://schemas.openxmlformats.org/drawingml/2006/chart" xmlns:r="http://schemas.openxmlformats.org/officeDocument/2006/relationships" r:id="rId2"/>
+            <c:chart xmlns:c="http://schemas.openxmlformats.org/drawingml/2006/chart" xmlns:r="http://schemas.openxmlformats.org/officeDocument/2006/relationships" r:id="rId3"/>
           </a:graphicData>
         </a:graphic>
       </p:graphicFrame>
@@ -21950,6 +22221,13 @@
   <p:clrMapOvr>
     <a:masterClrMapping/>
   </p:clrMapOvr>
+  <p:timing>
+    <p:tnLst>
+      <p:par>
+        <p:cTn id="1" dur="indefinite" restart="never" nodeType="tmRoot"/>
+      </p:par>
+    </p:tnLst>
+  </p:timing>
 </p:sld>
 </file>
 
@@ -22031,6 +22309,13 @@
   <p:clrMapOvr>
     <a:masterClrMapping/>
   </p:clrMapOvr>
+  <p:timing>
+    <p:tnLst>
+      <p:par>
+        <p:cTn id="1" dur="indefinite" restart="never" nodeType="tmRoot"/>
+      </p:par>
+    </p:tnLst>
+  </p:timing>
 </p:sld>
 </file>
 
@@ -22199,6 +22484,13 @@
   <p:clrMapOvr>
     <a:masterClrMapping/>
   </p:clrMapOvr>
+  <p:timing>
+    <p:tnLst>
+      <p:par>
+        <p:cTn id="1" dur="indefinite" restart="never" nodeType="tmRoot"/>
+      </p:par>
+    </p:tnLst>
+  </p:timing>
 </p:sld>
 </file>
 
@@ -22367,6 +22659,13 @@
   <p:clrMapOvr>
     <a:masterClrMapping/>
   </p:clrMapOvr>
+  <p:timing>
+    <p:tnLst>
+      <p:par>
+        <p:cTn id="1" dur="indefinite" restart="never" nodeType="tmRoot"/>
+      </p:par>
+    </p:tnLst>
+  </p:timing>
 </p:sld>
 </file>
 
@@ -22430,7 +22729,7 @@
         </p:xfrm>
         <a:graphic>
           <a:graphicData uri="http://schemas.openxmlformats.org/drawingml/2006/chart">
-            <c:chart xmlns:c="http://schemas.openxmlformats.org/drawingml/2006/chart" xmlns:r="http://schemas.openxmlformats.org/officeDocument/2006/relationships" r:id="rId2"/>
+            <c:chart xmlns:c="http://schemas.openxmlformats.org/drawingml/2006/chart" xmlns:r="http://schemas.openxmlformats.org/officeDocument/2006/relationships" r:id="rId3"/>
           </a:graphicData>
         </a:graphic>
       </p:graphicFrame>
@@ -22444,6 +22743,13 @@
   <p:clrMapOvr>
     <a:masterClrMapping/>
   </p:clrMapOvr>
+  <p:timing>
+    <p:tnLst>
+      <p:par>
+        <p:cTn id="1" dur="indefinite" restart="never" nodeType="tmRoot"/>
+      </p:par>
+    </p:tnLst>
+  </p:timing>
 </p:sld>
 </file>
 
@@ -22486,35 +22792,6 @@
           </a:p>
         </p:txBody>
       </p:sp>
-      <p:pic>
-        <p:nvPicPr>
-          <p:cNvPr id="2" name="Content Placeholder 1"/>
-          <p:cNvPicPr>
-            <a:picLocks noGrp="1" noChangeAspect="1"/>
-          </p:cNvPicPr>
-          <p:nvPr>
-            <p:ph idx="1"/>
-          </p:nvPr>
-        </p:nvPicPr>
-        <p:blipFill>
-          <a:blip r:embed="rId2">
-            <a:extLst>
-              <a:ext uri="{28A0092B-C50C-407E-A947-70E740481C1C}">
-                <a14:useLocalDpi xmlns:a14="http://schemas.microsoft.com/office/drawing/2010/main" val="0"/>
-              </a:ext>
-            </a:extLst>
-          </a:blip>
-          <a:stretch>
-            <a:fillRect/>
-          </a:stretch>
-        </p:blipFill>
-        <p:spPr>
-          <a:xfrm>
-            <a:off x="6965005" y="1596646"/>
-            <a:ext cx="2734469" cy="3962999"/>
-          </a:xfrm>
-        </p:spPr>
-      </p:pic>
       <p:sp>
         <p:nvSpPr>
           <p:cNvPr id="4" name="Slide Number Placeholder 3"/>
@@ -22538,36 +22815,35 @@
           </a:p>
         </p:txBody>
       </p:sp>
-      <p:sp>
-        <p:nvSpPr>
-          <p:cNvPr id="3" name="TextBox 2"/>
-          <p:cNvSpPr txBox="1"/>
-          <p:nvPr/>
-        </p:nvSpPr>
+      <p:pic>
+        <p:nvPicPr>
+          <p:cNvPr id="7" name="Content Placeholder 6"/>
+          <p:cNvPicPr>
+            <a:picLocks noGrp="1" noChangeAspect="1"/>
+          </p:cNvPicPr>
+          <p:nvPr>
+            <p:ph idx="1"/>
+          </p:nvPr>
+        </p:nvPicPr>
+        <p:blipFill>
+          <a:blip r:embed="rId2">
+            <a:extLst>
+              <a:ext uri="{28A0092B-C50C-407E-A947-70E740481C1C}">
+                <a14:useLocalDpi xmlns:a14="http://schemas.microsoft.com/office/drawing/2010/main" val="0"/>
+              </a:ext>
+            </a:extLst>
+          </a:blip>
+          <a:stretch>
+            <a:fillRect/>
+          </a:stretch>
+        </p:blipFill>
         <p:spPr>
           <a:xfrm>
-            <a:off x="1128409" y="5593979"/>
-            <a:ext cx="10255871" cy="830997"/>
+            <a:off x="6792119" y="1808162"/>
+            <a:ext cx="2933700" cy="3238500"/>
           </a:xfrm>
-          <a:prstGeom prst="rect">
-            <a:avLst/>
-          </a:prstGeom>
-          <a:noFill/>
         </p:spPr>
-        <p:txBody>
-          <a:bodyPr wrap="square" rtlCol="0">
-            <a:spAutoFit/>
-          </a:bodyPr>
-          <a:lstStyle/>
-          <a:p>
-            <a:pPr algn="ctr"/>
-            <a:r>
-              <a:rPr lang="en-US" sz="4800" dirty="0"/>
-              <a:t>FOTO TEMPORANEA</a:t>
-            </a:r>
-          </a:p>
-        </p:txBody>
-      </p:sp>
+      </p:pic>
     </p:spTree>
     <p:extLst>
       <p:ext uri="{BB962C8B-B14F-4D97-AF65-F5344CB8AC3E}">
@@ -22578,6 +22854,13 @@
   <p:clrMapOvr>
     <a:masterClrMapping/>
   </p:clrMapOvr>
+  <p:timing>
+    <p:tnLst>
+      <p:par>
+        <p:cTn id="1" dur="indefinite" restart="never" nodeType="tmRoot"/>
+      </p:par>
+    </p:tnLst>
+  </p:timing>
 </p:sld>
 </file>
 
@@ -22759,6 +23042,13 @@
   <p:clrMapOvr>
     <a:masterClrMapping/>
   </p:clrMapOvr>
+  <p:timing>
+    <p:tnLst>
+      <p:par>
+        <p:cTn id="1" dur="indefinite" restart="never" nodeType="tmRoot"/>
+      </p:par>
+    </p:tnLst>
+  </p:timing>
 </p:sld>
 </file>
 
@@ -22839,6 +23129,13 @@
   <p:clrMapOvr>
     <a:masterClrMapping/>
   </p:clrMapOvr>
+  <p:timing>
+    <p:tnLst>
+      <p:par>
+        <p:cTn id="1" dur="indefinite" restart="never" nodeType="tmRoot"/>
+      </p:par>
+    </p:tnLst>
+  </p:timing>
 </p:sld>
 </file>
 
@@ -22906,8 +23203,19 @@
             </a:r>
             <a:r>
               <a:rPr lang="en-US" dirty="0"/>
-              <a:t> due to its high performance.</a:t>
+              <a:t> due to its high performance</a:t>
             </a:r>
+            <a:r>
+              <a:rPr lang="en-US" dirty="0" smtClean="0"/>
+              <a:t>.</a:t>
+            </a:r>
+          </a:p>
+          <a:p>
+            <a:r>
+              <a:rPr lang="en-US" dirty="0" smtClean="0"/>
+              <a:t>We have not implemented multithreading to focusing on algorithms development.</a:t>
+            </a:r>
+            <a:endParaRPr lang="en-US" dirty="0"/>
           </a:p>
           <a:p>
             <a:r>
@@ -22972,6 +23280,13 @@
   <p:clrMapOvr>
     <a:masterClrMapping/>
   </p:clrMapOvr>
+  <p:timing>
+    <p:tnLst>
+      <p:par>
+        <p:cTn id="1" dur="indefinite" restart="never" nodeType="tmRoot"/>
+      </p:par>
+    </p:tnLst>
+  </p:timing>
 </p:sld>
 </file>
 
@@ -23054,6 +23369,13 @@
   <p:clrMapOvr>
     <a:masterClrMapping/>
   </p:clrMapOvr>
+  <p:timing>
+    <p:tnLst>
+      <p:par>
+        <p:cTn id="1" dur="indefinite" restart="never" nodeType="tmRoot"/>
+      </p:par>
+    </p:tnLst>
+  </p:timing>
 </p:sld>
 </file>
 
@@ -23199,6 +23521,13 @@
   <p:clrMapOvr>
     <a:masterClrMapping/>
   </p:clrMapOvr>
+  <p:timing>
+    <p:tnLst>
+      <p:par>
+        <p:cTn id="1" dur="indefinite" restart="never" nodeType="tmRoot"/>
+      </p:par>
+    </p:tnLst>
+  </p:timing>
 </p:sld>
 </file>
 
@@ -23352,6 +23681,13 @@
   <p:clrMapOvr>
     <a:masterClrMapping/>
   </p:clrMapOvr>
+  <p:timing>
+    <p:tnLst>
+      <p:par>
+        <p:cTn id="1" dur="indefinite" restart="never" nodeType="tmRoot"/>
+      </p:par>
+    </p:tnLst>
+  </p:timing>
 </p:sld>
 </file>
 
@@ -23541,6 +23877,13 @@
   <p:clrMapOvr>
     <a:masterClrMapping/>
   </p:clrMapOvr>
+  <p:timing>
+    <p:tnLst>
+      <p:par>
+        <p:cTn id="1" dur="indefinite" restart="never" nodeType="tmRoot"/>
+      </p:par>
+    </p:tnLst>
+  </p:timing>
 </p:sld>
 </file>
 
@@ -23639,6 +23982,13 @@
   <p:clrMapOvr>
     <a:masterClrMapping/>
   </p:clrMapOvr>
+  <p:timing>
+    <p:tnLst>
+      <p:par>
+        <p:cTn id="1" dur="indefinite" restart="never" nodeType="tmRoot"/>
+      </p:par>
+    </p:tnLst>
+  </p:timing>
 </p:sld>
 </file>
 
@@ -23783,6 +24133,13 @@
   <p:clrMapOvr>
     <a:masterClrMapping/>
   </p:clrMapOvr>
+  <p:timing>
+    <p:tnLst>
+      <p:par>
+        <p:cTn id="1" dur="indefinite" restart="never" nodeType="tmRoot"/>
+      </p:par>
+    </p:tnLst>
+  </p:timing>
 </p:sld>
 </file>
 

</xml_diff>

<commit_message>
Publishing last used presentation. Good work guys! ;)
</commit_message>
<xml_diff>
--- a/PowerPoint/OMA-MZ_03-Presentation.pptx
+++ b/PowerPoint/OMA-MZ_03-Presentation.pptx
@@ -23,9 +23,9 @@
     <p:sldId id="267" r:id="rId14"/>
     <p:sldId id="272" r:id="rId15"/>
     <p:sldId id="261" r:id="rId16"/>
-    <p:sldId id="277" r:id="rId17"/>
-    <p:sldId id="276" r:id="rId18"/>
-    <p:sldId id="279" r:id="rId19"/>
+    <p:sldId id="276" r:id="rId17"/>
+    <p:sldId id="279" r:id="rId18"/>
+    <p:sldId id="277" r:id="rId19"/>
     <p:sldId id="280" r:id="rId20"/>
     <p:sldId id="281" r:id="rId21"/>
     <p:sldId id="282" r:id="rId22"/>
@@ -142,623 +142,6 @@
 </file>
 
 <file path=ppt/charts/chart1.xml><?xml version="1.0" encoding="utf-8"?>
-<c:chartSpace xmlns:c="http://schemas.openxmlformats.org/drawingml/2006/chart" xmlns:a="http://schemas.openxmlformats.org/drawingml/2006/main" xmlns:r="http://schemas.openxmlformats.org/officeDocument/2006/relationships">
-  <c:date1904 val="0"/>
-  <c:lang val="en-US"/>
-  <c:roundedCorners val="0"/>
-  <mc:AlternateContent xmlns:mc="http://schemas.openxmlformats.org/markup-compatibility/2006">
-    <mc:Choice xmlns:c14="http://schemas.microsoft.com/office/drawing/2007/8/2/chart" Requires="c14">
-      <c14:style val="103"/>
-    </mc:Choice>
-    <mc:Fallback>
-      <c:style val="3"/>
-    </mc:Fallback>
-  </mc:AlternateContent>
-  <c:chart>
-    <c:autoTitleDeleted val="1"/>
-    <c:plotArea>
-      <c:layout>
-        <c:manualLayout>
-          <c:layoutTarget val="inner"/>
-          <c:xMode val="edge"/>
-          <c:yMode val="edge"/>
-          <c:x val="0.202585095724108"/>
-          <c:y val="0.108736987520437"/>
-          <c:w val="0.636599791344981"/>
-          <c:h val="0.796719273400289"/>
-        </c:manualLayout>
-      </c:layout>
-      <c:pieChart>
-        <c:varyColors val="1"/>
-        <c:ser>
-          <c:idx val="0"/>
-          <c:order val="0"/>
-          <c:tx>
-            <c:strRef>
-              <c:f>'[histogram(version 1).xlsx]Foglio2'!$O$1</c:f>
-              <c:strCache>
-                <c:ptCount val="1"/>
-                <c:pt idx="0">
-                  <c:v>Avg Time (%)</c:v>
-                </c:pt>
-              </c:strCache>
-            </c:strRef>
-          </c:tx>
-          <c:dPt>
-            <c:idx val="0"/>
-            <c:bubble3D val="0"/>
-            <c:spPr>
-              <a:solidFill>
-                <a:schemeClr val="accent1">
-                  <a:shade val="47000"/>
-                </a:schemeClr>
-              </a:solidFill>
-              <a:ln>
-                <a:noFill/>
-              </a:ln>
-              <a:effectLst>
-                <a:outerShdw blurRad="254000" sx="102000" sy="102000" algn="ctr" rotWithShape="0">
-                  <a:prstClr val="black">
-                    <a:alpha val="20000"/>
-                  </a:prstClr>
-                </a:outerShdw>
-              </a:effectLst>
-            </c:spPr>
-            <c:extLst xmlns:c16r2="http://schemas.microsoft.com/office/drawing/2015/06/chart">
-              <c:ext xmlns:c16="http://schemas.microsoft.com/office/drawing/2014/chart" uri="{C3380CC4-5D6E-409C-BE32-E72D297353CC}">
-                <c16:uniqueId val="{00000001-3EB7-4374-AE9A-D38B071EA406}"/>
-              </c:ext>
-            </c:extLst>
-          </c:dPt>
-          <c:dPt>
-            <c:idx val="1"/>
-            <c:bubble3D val="0"/>
-            <c:spPr>
-              <a:solidFill>
-                <a:schemeClr val="accent1">
-                  <a:shade val="65000"/>
-                </a:schemeClr>
-              </a:solidFill>
-              <a:ln>
-                <a:noFill/>
-              </a:ln>
-              <a:effectLst>
-                <a:outerShdw blurRad="254000" sx="102000" sy="102000" algn="ctr" rotWithShape="0">
-                  <a:prstClr val="black">
-                    <a:alpha val="20000"/>
-                  </a:prstClr>
-                </a:outerShdw>
-              </a:effectLst>
-            </c:spPr>
-            <c:extLst xmlns:c16r2="http://schemas.microsoft.com/office/drawing/2015/06/chart">
-              <c:ext xmlns:c16="http://schemas.microsoft.com/office/drawing/2014/chart" uri="{C3380CC4-5D6E-409C-BE32-E72D297353CC}">
-                <c16:uniqueId val="{00000003-3EB7-4374-AE9A-D38B071EA406}"/>
-              </c:ext>
-            </c:extLst>
-          </c:dPt>
-          <c:dPt>
-            <c:idx val="2"/>
-            <c:bubble3D val="0"/>
-            <c:spPr>
-              <a:solidFill>
-                <a:schemeClr val="accent1">
-                  <a:shade val="82000"/>
-                </a:schemeClr>
-              </a:solidFill>
-              <a:ln>
-                <a:noFill/>
-              </a:ln>
-              <a:effectLst>
-                <a:outerShdw blurRad="254000" sx="102000" sy="102000" algn="ctr" rotWithShape="0">
-                  <a:prstClr val="black">
-                    <a:alpha val="20000"/>
-                  </a:prstClr>
-                </a:outerShdw>
-              </a:effectLst>
-            </c:spPr>
-            <c:extLst xmlns:c16r2="http://schemas.microsoft.com/office/drawing/2015/06/chart">
-              <c:ext xmlns:c16="http://schemas.microsoft.com/office/drawing/2014/chart" uri="{C3380CC4-5D6E-409C-BE32-E72D297353CC}">
-                <c16:uniqueId val="{00000005-3EB7-4374-AE9A-D38B071EA406}"/>
-              </c:ext>
-            </c:extLst>
-          </c:dPt>
-          <c:dPt>
-            <c:idx val="3"/>
-            <c:bubble3D val="0"/>
-            <c:spPr>
-              <a:solidFill>
-                <a:schemeClr val="accent1"/>
-              </a:solidFill>
-              <a:ln>
-                <a:noFill/>
-              </a:ln>
-              <a:effectLst>
-                <a:outerShdw blurRad="254000" sx="102000" sy="102000" algn="ctr" rotWithShape="0">
-                  <a:prstClr val="black">
-                    <a:alpha val="20000"/>
-                  </a:prstClr>
-                </a:outerShdw>
-              </a:effectLst>
-            </c:spPr>
-            <c:extLst xmlns:c16r2="http://schemas.microsoft.com/office/drawing/2015/06/chart">
-              <c:ext xmlns:c16="http://schemas.microsoft.com/office/drawing/2014/chart" uri="{C3380CC4-5D6E-409C-BE32-E72D297353CC}">
-                <c16:uniqueId val="{00000007-3EB7-4374-AE9A-D38B071EA406}"/>
-              </c:ext>
-            </c:extLst>
-          </c:dPt>
-          <c:dPt>
-            <c:idx val="4"/>
-            <c:bubble3D val="0"/>
-            <c:spPr>
-              <a:solidFill>
-                <a:schemeClr val="accent1">
-                  <a:tint val="83000"/>
-                </a:schemeClr>
-              </a:solidFill>
-              <a:ln>
-                <a:noFill/>
-              </a:ln>
-              <a:effectLst>
-                <a:outerShdw blurRad="254000" sx="102000" sy="102000" algn="ctr" rotWithShape="0">
-                  <a:prstClr val="black">
-                    <a:alpha val="20000"/>
-                  </a:prstClr>
-                </a:outerShdw>
-              </a:effectLst>
-            </c:spPr>
-            <c:extLst xmlns:c16r2="http://schemas.microsoft.com/office/drawing/2015/06/chart">
-              <c:ext xmlns:c16="http://schemas.microsoft.com/office/drawing/2014/chart" uri="{C3380CC4-5D6E-409C-BE32-E72D297353CC}">
-                <c16:uniqueId val="{00000009-3EB7-4374-AE9A-D38B071EA406}"/>
-              </c:ext>
-            </c:extLst>
-          </c:dPt>
-          <c:dPt>
-            <c:idx val="5"/>
-            <c:bubble3D val="0"/>
-            <c:spPr>
-              <a:solidFill>
-                <a:schemeClr val="accent1">
-                  <a:tint val="65000"/>
-                </a:schemeClr>
-              </a:solidFill>
-              <a:ln>
-                <a:noFill/>
-              </a:ln>
-              <a:effectLst>
-                <a:outerShdw blurRad="254000" sx="102000" sy="102000" algn="ctr" rotWithShape="0">
-                  <a:prstClr val="black">
-                    <a:alpha val="20000"/>
-                  </a:prstClr>
-                </a:outerShdw>
-              </a:effectLst>
-            </c:spPr>
-            <c:extLst xmlns:c16r2="http://schemas.microsoft.com/office/drawing/2015/06/chart">
-              <c:ext xmlns:c16="http://schemas.microsoft.com/office/drawing/2014/chart" uri="{C3380CC4-5D6E-409C-BE32-E72D297353CC}">
-                <c16:uniqueId val="{0000000B-3EB7-4374-AE9A-D38B071EA406}"/>
-              </c:ext>
-            </c:extLst>
-          </c:dPt>
-          <c:dPt>
-            <c:idx val="6"/>
-            <c:bubble3D val="0"/>
-            <c:spPr>
-              <a:solidFill>
-                <a:schemeClr val="accent1">
-                  <a:tint val="48000"/>
-                </a:schemeClr>
-              </a:solidFill>
-              <a:ln>
-                <a:noFill/>
-              </a:ln>
-              <a:effectLst>
-                <a:outerShdw blurRad="254000" sx="102000" sy="102000" algn="ctr" rotWithShape="0">
-                  <a:prstClr val="black">
-                    <a:alpha val="20000"/>
-                  </a:prstClr>
-                </a:outerShdw>
-              </a:effectLst>
-            </c:spPr>
-            <c:extLst xmlns:c16r2="http://schemas.microsoft.com/office/drawing/2015/06/chart">
-              <c:ext xmlns:c16="http://schemas.microsoft.com/office/drawing/2014/chart" uri="{C3380CC4-5D6E-409C-BE32-E72D297353CC}">
-                <c16:uniqueId val="{0000000D-3EB7-4374-AE9A-D38B071EA406}"/>
-              </c:ext>
-            </c:extLst>
-          </c:dPt>
-          <c:dLbls>
-            <c:dLbl>
-              <c:idx val="0"/>
-              <c:layout>
-                <c:manualLayout>
-                  <c:x val="0.0264871690155859"/>
-                  <c:y val="0.0099920025544521"/>
-                </c:manualLayout>
-              </c:layout>
-              <c:dLblPos val="bestFit"/>
-              <c:showLegendKey val="1"/>
-              <c:showVal val="1"/>
-              <c:showCatName val="0"/>
-              <c:showSerName val="0"/>
-              <c:showPercent val="0"/>
-              <c:showBubbleSize val="0"/>
-              <c:extLst xmlns:c16r2="http://schemas.microsoft.com/office/drawing/2015/06/chart">
-                <c:ext xmlns:c16="http://schemas.microsoft.com/office/drawing/2014/chart" uri="{C3380CC4-5D6E-409C-BE32-E72D297353CC}">
-                  <c16:uniqueId val="{00000001-3EB7-4374-AE9A-D38B071EA406}"/>
-                </c:ext>
-                <c:ext xmlns:c15="http://schemas.microsoft.com/office/drawing/2012/chart" uri="{CE6537A1-D6FC-4f65-9D91-7224C49458BB}">
-                  <c15:layout/>
-                </c:ext>
-              </c:extLst>
-            </c:dLbl>
-            <c:dLbl>
-              <c:idx val="1"/>
-              <c:layout>
-                <c:manualLayout>
-                  <c:x val="-0.0439942878252189"/>
-                  <c:y val="0.00740299586379803"/>
-                </c:manualLayout>
-              </c:layout>
-              <c:dLblPos val="bestFit"/>
-              <c:showLegendKey val="1"/>
-              <c:showVal val="1"/>
-              <c:showCatName val="0"/>
-              <c:showSerName val="0"/>
-              <c:showPercent val="0"/>
-              <c:showBubbleSize val="0"/>
-              <c:extLst xmlns:c16r2="http://schemas.microsoft.com/office/drawing/2015/06/chart">
-                <c:ext xmlns:c16="http://schemas.microsoft.com/office/drawing/2014/chart" uri="{C3380CC4-5D6E-409C-BE32-E72D297353CC}">
-                  <c16:uniqueId val="{00000003-3EB7-4374-AE9A-D38B071EA406}"/>
-                </c:ext>
-                <c:ext xmlns:c15="http://schemas.microsoft.com/office/drawing/2012/chart" uri="{CE6537A1-D6FC-4f65-9D91-7224C49458BB}">
-                  <c15:layout/>
-                </c:ext>
-              </c:extLst>
-            </c:dLbl>
-            <c:dLbl>
-              <c:idx val="2"/>
-              <c:layout>
-                <c:manualLayout>
-                  <c:x val="-0.0150702018130486"/>
-                  <c:y val="-0.0418285989244101"/>
-                </c:manualLayout>
-              </c:layout>
-              <c:dLblPos val="bestFit"/>
-              <c:showLegendKey val="1"/>
-              <c:showVal val="1"/>
-              <c:showCatName val="0"/>
-              <c:showSerName val="0"/>
-              <c:showPercent val="0"/>
-              <c:showBubbleSize val="0"/>
-              <c:extLst xmlns:c16r2="http://schemas.microsoft.com/office/drawing/2015/06/chart">
-                <c:ext xmlns:c16="http://schemas.microsoft.com/office/drawing/2014/chart" uri="{C3380CC4-5D6E-409C-BE32-E72D297353CC}">
-                  <c16:uniqueId val="{00000005-3EB7-4374-AE9A-D38B071EA406}"/>
-                </c:ext>
-                <c:ext xmlns:c15="http://schemas.microsoft.com/office/drawing/2012/chart" uri="{CE6537A1-D6FC-4f65-9D91-7224C49458BB}">
-                  <c15:layout/>
-                </c:ext>
-              </c:extLst>
-            </c:dLbl>
-            <c:dLbl>
-              <c:idx val="3"/>
-              <c:layout>
-                <c:manualLayout>
-                  <c:x val="-1.17405422083367E-5"/>
-                  <c:y val="0.0741716898556859"/>
-                </c:manualLayout>
-              </c:layout>
-              <c:dLblPos val="bestFit"/>
-              <c:showLegendKey val="1"/>
-              <c:showVal val="1"/>
-              <c:showCatName val="0"/>
-              <c:showSerName val="0"/>
-              <c:showPercent val="0"/>
-              <c:showBubbleSize val="0"/>
-              <c:extLst xmlns:c16r2="http://schemas.microsoft.com/office/drawing/2015/06/chart">
-                <c:ext xmlns:c16="http://schemas.microsoft.com/office/drawing/2014/chart" uri="{C3380CC4-5D6E-409C-BE32-E72D297353CC}">
-                  <c16:uniqueId val="{00000007-3EB7-4374-AE9A-D38B071EA406}"/>
-                </c:ext>
-                <c:ext xmlns:c15="http://schemas.microsoft.com/office/drawing/2012/chart" uri="{CE6537A1-D6FC-4f65-9D91-7224C49458BB}">
-                  <c15:layout/>
-                </c:ext>
-              </c:extLst>
-            </c:dLbl>
-            <c:dLbl>
-              <c:idx val="4"/>
-              <c:layout>
-                <c:manualLayout>
-                  <c:x val="-0.0691511700363225"/>
-                  <c:y val="0.0969948253981373"/>
-                </c:manualLayout>
-              </c:layout>
-              <c:dLblPos val="bestFit"/>
-              <c:showLegendKey val="1"/>
-              <c:showVal val="1"/>
-              <c:showCatName val="0"/>
-              <c:showSerName val="0"/>
-              <c:showPercent val="0"/>
-              <c:showBubbleSize val="0"/>
-              <c:extLst xmlns:c16r2="http://schemas.microsoft.com/office/drawing/2015/06/chart">
-                <c:ext xmlns:c16="http://schemas.microsoft.com/office/drawing/2014/chart" uri="{C3380CC4-5D6E-409C-BE32-E72D297353CC}">
-                  <c16:uniqueId val="{00000009-3EB7-4374-AE9A-D38B071EA406}"/>
-                </c:ext>
-                <c:ext xmlns:c15="http://schemas.microsoft.com/office/drawing/2012/chart" uri="{CE6537A1-D6FC-4f65-9D91-7224C49458BB}">
-                  <c15:layout/>
-                </c:ext>
-              </c:extLst>
-            </c:dLbl>
-            <c:dLbl>
-              <c:idx val="5"/>
-              <c:layout>
-                <c:manualLayout>
-                  <c:x val="0.0255545785246797"/>
-                  <c:y val="-0.291231244946972"/>
-                </c:manualLayout>
-              </c:layout>
-              <c:dLblPos val="bestFit"/>
-              <c:showLegendKey val="1"/>
-              <c:showVal val="1"/>
-              <c:showCatName val="0"/>
-              <c:showSerName val="0"/>
-              <c:showPercent val="0"/>
-              <c:showBubbleSize val="0"/>
-              <c:extLst xmlns:c16r2="http://schemas.microsoft.com/office/drawing/2015/06/chart">
-                <c:ext xmlns:c16="http://schemas.microsoft.com/office/drawing/2014/chart" uri="{C3380CC4-5D6E-409C-BE32-E72D297353CC}">
-                  <c16:uniqueId val="{0000000B-3EB7-4374-AE9A-D38B071EA406}"/>
-                </c:ext>
-                <c:ext xmlns:c15="http://schemas.microsoft.com/office/drawing/2012/chart" uri="{CE6537A1-D6FC-4f65-9D91-7224C49458BB}">
-                  <c15:layout/>
-                </c:ext>
-              </c:extLst>
-            </c:dLbl>
-            <c:dLbl>
-              <c:idx val="6"/>
-              <c:layout>
-                <c:manualLayout>
-                  <c:x val="0.0650065234119219"/>
-                  <c:y val="0.123394137992095"/>
-                </c:manualLayout>
-              </c:layout>
-              <c:dLblPos val="bestFit"/>
-              <c:showLegendKey val="1"/>
-              <c:showVal val="1"/>
-              <c:showCatName val="0"/>
-              <c:showSerName val="0"/>
-              <c:showPercent val="0"/>
-              <c:showBubbleSize val="0"/>
-              <c:extLst xmlns:c16r2="http://schemas.microsoft.com/office/drawing/2015/06/chart">
-                <c:ext xmlns:c16="http://schemas.microsoft.com/office/drawing/2014/chart" uri="{C3380CC4-5D6E-409C-BE32-E72D297353CC}">
-                  <c16:uniqueId val="{0000000D-3EB7-4374-AE9A-D38B071EA406}"/>
-                </c:ext>
-                <c:ext xmlns:c15="http://schemas.microsoft.com/office/drawing/2012/chart" uri="{CE6537A1-D6FC-4f65-9D91-7224C49458BB}">
-                  <c15:layout/>
-                </c:ext>
-              </c:extLst>
-            </c:dLbl>
-            <c:spPr>
-              <a:pattFill prst="pct75">
-                <a:fgClr>
-                  <a:schemeClr val="dk1">
-                    <a:lumMod val="75000"/>
-                    <a:lumOff val="25000"/>
-                  </a:schemeClr>
-                </a:fgClr>
-                <a:bgClr>
-                  <a:schemeClr val="dk1">
-                    <a:lumMod val="65000"/>
-                    <a:lumOff val="35000"/>
-                  </a:schemeClr>
-                </a:bgClr>
-              </a:pattFill>
-              <a:ln>
-                <a:noFill/>
-              </a:ln>
-              <a:effectLst>
-                <a:outerShdw blurRad="50800" dist="38100" dir="2700000" algn="tl" rotWithShape="0">
-                  <a:prstClr val="black">
-                    <a:alpha val="40000"/>
-                  </a:prstClr>
-                </a:outerShdw>
-              </a:effectLst>
-            </c:spPr>
-            <c:txPr>
-              <a:bodyPr rot="0" spcFirstLastPara="1" vertOverflow="ellipsis" vert="horz" wrap="square" lIns="38100" tIns="19050" rIns="38100" bIns="19050" anchor="ctr" anchorCtr="1">
-                <a:spAutoFit/>
-              </a:bodyPr>
-              <a:lstStyle/>
-              <a:p>
-                <a:pPr>
-                  <a:defRPr sz="1000" b="1" i="0" u="none" strike="noStrike" kern="1200" baseline="0">
-                    <a:solidFill>
-                      <a:schemeClr val="lt1"/>
-                    </a:solidFill>
-                    <a:latin typeface="+mn-lt"/>
-                    <a:ea typeface="+mn-ea"/>
-                    <a:cs typeface="+mn-cs"/>
-                  </a:defRPr>
-                </a:pPr>
-                <a:endParaRPr lang="en-US"/>
-              </a:p>
-            </c:txPr>
-            <c:dLblPos val="ctr"/>
-            <c:showLegendKey val="1"/>
-            <c:showVal val="1"/>
-            <c:showCatName val="0"/>
-            <c:showSerName val="0"/>
-            <c:showPercent val="0"/>
-            <c:showBubbleSize val="0"/>
-            <c:showLeaderLines val="0"/>
-            <c:extLst xmlns:c16r2="http://schemas.microsoft.com/office/drawing/2015/06/chart">
-              <c:ext xmlns:c15="http://schemas.microsoft.com/office/drawing/2012/chart" uri="{CE6537A1-D6FC-4f65-9D91-7224C49458BB}"/>
-            </c:extLst>
-          </c:dLbls>
-          <c:cat>
-            <c:strRef>
-              <c:f>'[histogram(version 1).xlsx]Foglio2'!$M$2:$M$8</c:f>
-              <c:strCache>
-                <c:ptCount val="7"/>
-                <c:pt idx="0">
-                  <c:v>Reading</c:v>
-                </c:pt>
-                <c:pt idx="1">
-                  <c:v>Greedy</c:v>
-                </c:pt>
-                <c:pt idx="2">
-                  <c:v>Tabu</c:v>
-                </c:pt>
-                <c:pt idx="3">
-                  <c:v>LocalSearch</c:v>
-                </c:pt>
-                <c:pt idx="4">
-                  <c:v>Descent</c:v>
-                </c:pt>
-                <c:pt idx="5">
-                  <c:v>Annealing</c:v>
-                </c:pt>
-                <c:pt idx="6">
-                  <c:v>GreedyShuffle</c:v>
-                </c:pt>
-              </c:strCache>
-            </c:strRef>
-          </c:cat>
-          <c:val>
-            <c:numRef>
-              <c:f>'[histogram(version 1).xlsx]Foglio2'!$O$2:$O$8</c:f>
-              <c:numCache>
-                <c:formatCode>0.00</c:formatCode>
-                <c:ptCount val="7"/>
-                <c:pt idx="0">
-                  <c:v>0.14292520247737</c:v>
-                </c:pt>
-                <c:pt idx="1">
-                  <c:v>0.0</c:v>
-                </c:pt>
-                <c:pt idx="2">
-                  <c:v>0.238208670795617</c:v>
-                </c:pt>
-                <c:pt idx="3">
-                  <c:v>3.191996188661268</c:v>
-                </c:pt>
-                <c:pt idx="4">
-                  <c:v>13.24440209623631</c:v>
-                </c:pt>
-                <c:pt idx="5">
-                  <c:v>69.08051453072888</c:v>
-                </c:pt>
-                <c:pt idx="6">
-                  <c:v>14.10195331110052</c:v>
-                </c:pt>
-              </c:numCache>
-            </c:numRef>
-          </c:val>
-          <c:extLst xmlns:c16r2="http://schemas.microsoft.com/office/drawing/2015/06/chart">
-            <c:ext xmlns:c16="http://schemas.microsoft.com/office/drawing/2014/chart" uri="{C3380CC4-5D6E-409C-BE32-E72D297353CC}">
-              <c16:uniqueId val="{0000000E-3EB7-4374-AE9A-D38B071EA406}"/>
-            </c:ext>
-          </c:extLst>
-        </c:ser>
-        <c:dLbls>
-          <c:dLblPos val="ctr"/>
-          <c:showLegendKey val="0"/>
-          <c:showVal val="0"/>
-          <c:showCatName val="0"/>
-          <c:showSerName val="0"/>
-          <c:showPercent val="1"/>
-          <c:showBubbleSize val="0"/>
-          <c:showLeaderLines val="0"/>
-        </c:dLbls>
-        <c:firstSliceAng val="0"/>
-      </c:pieChart>
-      <c:spPr>
-        <a:noFill/>
-        <a:ln>
-          <a:noFill/>
-        </a:ln>
-        <a:effectLst/>
-      </c:spPr>
-    </c:plotArea>
-    <c:legend>
-      <c:legendPos val="r"/>
-      <c:layout>
-        <c:manualLayout>
-          <c:xMode val="edge"/>
-          <c:yMode val="edge"/>
-          <c:x val="0.847105125690583"/>
-          <c:y val="0.371163732554958"/>
-          <c:w val="0.141644157851391"/>
-          <c:h val="0.266939888716592"/>
-        </c:manualLayout>
-      </c:layout>
-      <c:overlay val="0"/>
-      <c:spPr>
-        <a:solidFill>
-          <a:schemeClr val="lt1">
-            <a:lumMod val="95000"/>
-            <a:alpha val="39000"/>
-          </a:schemeClr>
-        </a:solidFill>
-        <a:ln>
-          <a:noFill/>
-        </a:ln>
-        <a:effectLst/>
-      </c:spPr>
-      <c:txPr>
-        <a:bodyPr rot="0" spcFirstLastPara="1" vertOverflow="ellipsis" vert="horz" wrap="square" anchor="ctr" anchorCtr="1"/>
-        <a:lstStyle/>
-        <a:p>
-          <a:pPr>
-            <a:defRPr sz="900" b="0" i="0" u="none" strike="noStrike" kern="1200" baseline="0">
-              <a:solidFill>
-                <a:schemeClr val="dk1">
-                  <a:lumMod val="75000"/>
-                  <a:lumOff val="25000"/>
-                </a:schemeClr>
-              </a:solidFill>
-              <a:latin typeface="+mn-lt"/>
-              <a:ea typeface="+mn-ea"/>
-              <a:cs typeface="+mn-cs"/>
-            </a:defRPr>
-          </a:pPr>
-          <a:endParaRPr lang="en-US"/>
-        </a:p>
-      </c:txPr>
-    </c:legend>
-    <c:plotVisOnly val="1"/>
-    <c:dispBlanksAs val="gap"/>
-    <c:showDLblsOverMax val="0"/>
-    <c:extLst xmlns:c16r2="http://schemas.microsoft.com/office/drawing/2015/06/chart">
-      <c:ext xmlns:c16r3="http://schemas.microsoft.com/office/drawing/2017/03/chart" uri="{56B9EC1D-385E-4148-901F-78D8002777C0}">
-        <c16r3:dataDisplayOptions16>
-          <c16r3:dispNaAsBlank val="1"/>
-        </c16r3:dataDisplayOptions16>
-      </c:ext>
-    </c:extLst>
-  </c:chart>
-  <c:spPr>
-    <a:solidFill>
-      <a:schemeClr val="bg1"/>
-    </a:solidFill>
-    <a:ln w="9525" cap="flat" cmpd="sng" algn="ctr">
-      <a:noFill/>
-      <a:round/>
-    </a:ln>
-    <a:effectLst/>
-  </c:spPr>
-  <c:txPr>
-    <a:bodyPr/>
-    <a:lstStyle/>
-    <a:p>
-      <a:pPr>
-        <a:defRPr/>
-      </a:pPr>
-      <a:endParaRPr lang="en-US"/>
-    </a:p>
-  </c:txPr>
-  <c:externalData r:id="rId3">
-    <c:autoUpdate val="0"/>
-  </c:externalData>
-</c:chartSpace>
-</file>
-
-<file path=ppt/charts/chart2.xml><?xml version="1.0" encoding="utf-8"?>
 <c:chartSpace xmlns:c="http://schemas.openxmlformats.org/drawingml/2006/chart" xmlns:a="http://schemas.openxmlformats.org/drawingml/2006/main" xmlns:r="http://schemas.openxmlformats.org/officeDocument/2006/relationships">
   <c:date1904 val="0"/>
   <c:lang val="en-US"/>
@@ -1027,6 +410,7 @@
             <c:showLeaderLines val="0"/>
             <c:extLst xmlns:c16r2="http://schemas.microsoft.com/office/drawing/2015/06/chart">
               <c:ext xmlns:c15="http://schemas.microsoft.com/office/drawing/2012/chart" uri="{CE6537A1-D6FC-4f65-9D91-7224C49458BB}">
+                <c15:layout/>
                 <c15:showLeaderLines val="1"/>
                 <c15:leaderLines>
                   <c:spPr>
@@ -1321,6 +705,7 @@
             <c:showLeaderLines val="0"/>
             <c:extLst xmlns:c16r2="http://schemas.microsoft.com/office/drawing/2015/06/chart">
               <c:ext xmlns:c15="http://schemas.microsoft.com/office/drawing/2012/chart" uri="{CE6537A1-D6FC-4f65-9D91-7224C49458BB}">
+                <c15:layout/>
                 <c15:showLeaderLines val="1"/>
                 <c15:leaderLines>
                   <c:spPr>
@@ -1615,6 +1000,7 @@
             <c:showLeaderLines val="0"/>
             <c:extLst xmlns:c16r2="http://schemas.microsoft.com/office/drawing/2015/06/chart">
               <c:ext xmlns:c15="http://schemas.microsoft.com/office/drawing/2012/chart" uri="{CE6537A1-D6FC-4f65-9D91-7224C49458BB}">
+                <c15:layout/>
                 <c15:showLeaderLines val="1"/>
                 <c15:leaderLines>
                   <c:spPr>
@@ -1909,6 +1295,7 @@
             <c:showLeaderLines val="0"/>
             <c:extLst xmlns:c16r2="http://schemas.microsoft.com/office/drawing/2015/06/chart">
               <c:ext xmlns:c15="http://schemas.microsoft.com/office/drawing/2012/chart" uri="{CE6537A1-D6FC-4f65-9D91-7224C49458BB}">
+                <c15:layout/>
                 <c15:showLeaderLines val="1"/>
                 <c15:leaderLines>
                   <c:spPr>
@@ -2296,6 +1683,1601 @@
 </c:chartSpace>
 </file>
 
+<file path=ppt/charts/chart2.xml><?xml version="1.0" encoding="utf-8"?>
+<c:chartSpace xmlns:c="http://schemas.openxmlformats.org/drawingml/2006/chart" xmlns:a="http://schemas.openxmlformats.org/drawingml/2006/main" xmlns:r="http://schemas.openxmlformats.org/officeDocument/2006/relationships">
+  <c:date1904 val="0"/>
+  <c:lang val="en-US"/>
+  <c:roundedCorners val="0"/>
+  <mc:AlternateContent xmlns:mc="http://schemas.openxmlformats.org/markup-compatibility/2006">
+    <mc:Choice xmlns:c14="http://schemas.microsoft.com/office/drawing/2007/8/2/chart" Requires="c14">
+      <c14:style val="102"/>
+    </mc:Choice>
+    <mc:Fallback>
+      <c:style val="2"/>
+    </mc:Fallback>
+  </mc:AlternateContent>
+  <c:chart>
+    <c:title>
+      <c:tx>
+        <c:rich>
+          <a:bodyPr/>
+          <a:lstStyle/>
+          <a:p>
+            <a:pPr>
+              <a:defRPr sz="1600" b="1" i="0" u="none" strike="noStrike" baseline="0">
+                <a:solidFill>
+                  <a:srgbClr val="C0C0C0"/>
+                </a:solidFill>
+                <a:latin typeface="Calibri"/>
+                <a:ea typeface="Calibri"/>
+                <a:cs typeface="Calibri"/>
+              </a:defRPr>
+            </a:pPr>
+            <a:r>
+              <a:rPr lang="en-US"/>
+              <a:t>Gap % to Time</a:t>
+            </a:r>
+          </a:p>
+        </c:rich>
+      </c:tx>
+      <c:layout>
+        <c:manualLayout>
+          <c:xMode val="edge"/>
+          <c:yMode val="edge"/>
+          <c:x val="0.445974135844252"/>
+          <c:y val="0.0127045626448106"/>
+        </c:manualLayout>
+      </c:layout>
+      <c:overlay val="0"/>
+      <c:spPr>
+        <a:noFill/>
+        <a:ln w="25400">
+          <a:noFill/>
+        </a:ln>
+      </c:spPr>
+    </c:title>
+    <c:autoTitleDeleted val="0"/>
+    <c:plotArea>
+      <c:layout>
+        <c:manualLayout>
+          <c:layoutTarget val="inner"/>
+          <c:xMode val="edge"/>
+          <c:yMode val="edge"/>
+          <c:x val="0.0640104053799985"/>
+          <c:y val="0.0635228132240531"/>
+          <c:w val="0.923428798924569"/>
+          <c:h val="0.790476531903303"/>
+        </c:manualLayout>
+      </c:layout>
+      <c:lineChart>
+        <c:grouping val="standard"/>
+        <c:varyColors val="0"/>
+        <c:ser>
+          <c:idx val="0"/>
+          <c:order val="0"/>
+          <c:tx>
+            <c:v>instance01</c:v>
+          </c:tx>
+          <c:spPr>
+            <a:ln w="25400">
+              <a:solidFill>
+                <a:srgbClr val="666699"/>
+              </a:solidFill>
+              <a:prstDash val="solid"/>
+            </a:ln>
+          </c:spPr>
+          <c:marker>
+            <c:symbol val="none"/>
+          </c:marker>
+          <c:cat>
+            <c:numRef>
+              <c:f>Foglio2!$O$3:$O$29</c:f>
+              <c:numCache>
+                <c:formatCode>General</c:formatCode>
+                <c:ptCount val="27"/>
+                <c:pt idx="0">
+                  <c:v>0.0</c:v>
+                </c:pt>
+                <c:pt idx="1">
+                  <c:v>1.0</c:v>
+                </c:pt>
+                <c:pt idx="2">
+                  <c:v>2.0</c:v>
+                </c:pt>
+                <c:pt idx="3">
+                  <c:v>3.0</c:v>
+                </c:pt>
+                <c:pt idx="4">
+                  <c:v>4.0</c:v>
+                </c:pt>
+                <c:pt idx="5">
+                  <c:v>5.0</c:v>
+                </c:pt>
+                <c:pt idx="6">
+                  <c:v>10.0</c:v>
+                </c:pt>
+                <c:pt idx="7">
+                  <c:v>25.0</c:v>
+                </c:pt>
+                <c:pt idx="8">
+                  <c:v>50.0</c:v>
+                </c:pt>
+                <c:pt idx="9">
+                  <c:v>100.0</c:v>
+                </c:pt>
+                <c:pt idx="10">
+                  <c:v>200.0</c:v>
+                </c:pt>
+                <c:pt idx="11">
+                  <c:v>300.0</c:v>
+                </c:pt>
+                <c:pt idx="12">
+                  <c:v>400.0</c:v>
+                </c:pt>
+                <c:pt idx="13">
+                  <c:v>500.0</c:v>
+                </c:pt>
+                <c:pt idx="14">
+                  <c:v>600.0</c:v>
+                </c:pt>
+                <c:pt idx="15">
+                  <c:v>700.0</c:v>
+                </c:pt>
+                <c:pt idx="16">
+                  <c:v>800.0</c:v>
+                </c:pt>
+                <c:pt idx="17">
+                  <c:v>900.0</c:v>
+                </c:pt>
+                <c:pt idx="18">
+                  <c:v>1000.0</c:v>
+                </c:pt>
+                <c:pt idx="19">
+                  <c:v>1100.0</c:v>
+                </c:pt>
+                <c:pt idx="20">
+                  <c:v>1200.0</c:v>
+                </c:pt>
+                <c:pt idx="21">
+                  <c:v>1300.0</c:v>
+                </c:pt>
+                <c:pt idx="22">
+                  <c:v>1400.0</c:v>
+                </c:pt>
+                <c:pt idx="23">
+                  <c:v>1500.0</c:v>
+                </c:pt>
+                <c:pt idx="24">
+                  <c:v>1600.0</c:v>
+                </c:pt>
+                <c:pt idx="25">
+                  <c:v>1700.0</c:v>
+                </c:pt>
+                <c:pt idx="26">
+                  <c:v>1800.0</c:v>
+                </c:pt>
+              </c:numCache>
+            </c:numRef>
+          </c:cat>
+          <c:val>
+            <c:numRef>
+              <c:f>Foglio2!$P$3:$P$29</c:f>
+              <c:numCache>
+                <c:formatCode>0.00</c:formatCode>
+                <c:ptCount val="27"/>
+                <c:pt idx="0">
+                  <c:v>26.8148</c:v>
+                </c:pt>
+                <c:pt idx="1">
+                  <c:v>0.681626677159073</c:v>
+                </c:pt>
+                <c:pt idx="2">
+                  <c:v>0.681626677159073</c:v>
+                </c:pt>
+                <c:pt idx="3">
+                  <c:v>0.681626677159073</c:v>
+                </c:pt>
+                <c:pt idx="4">
+                  <c:v>0.274109729721127</c:v>
+                </c:pt>
+                <c:pt idx="5">
+                  <c:v>0.26056096215303</c:v>
+                </c:pt>
+                <c:pt idx="6">
+                  <c:v>0.26056096215303</c:v>
+                </c:pt>
+                <c:pt idx="7">
+                  <c:v>0.0844218892885135</c:v>
+                </c:pt>
+                <c:pt idx="8">
+                  <c:v>0.0312673664031444</c:v>
+                </c:pt>
+                <c:pt idx="9">
+                  <c:v>0.0312673664031444</c:v>
+                </c:pt>
+                <c:pt idx="10">
+                  <c:v>0.0312673664031444</c:v>
+                </c:pt>
+                <c:pt idx="11">
+                  <c:v>0.0312673664031444</c:v>
+                </c:pt>
+                <c:pt idx="12">
+                  <c:v>0.0312673664031444</c:v>
+                </c:pt>
+                <c:pt idx="13">
+                  <c:v>0.0312673664031444</c:v>
+                </c:pt>
+                <c:pt idx="14">
+                  <c:v>0.0312673664031444</c:v>
+                </c:pt>
+                <c:pt idx="15">
+                  <c:v>0.0312673664031444</c:v>
+                </c:pt>
+                <c:pt idx="16">
+                  <c:v>0.0312673664031444</c:v>
+                </c:pt>
+                <c:pt idx="17">
+                  <c:v>0.0312673664031444</c:v>
+                </c:pt>
+                <c:pt idx="18">
+                  <c:v>0.0312673664031444</c:v>
+                </c:pt>
+                <c:pt idx="19">
+                  <c:v>0.0312673664031444</c:v>
+                </c:pt>
+                <c:pt idx="20">
+                  <c:v>0.0312673664031444</c:v>
+                </c:pt>
+                <c:pt idx="21">
+                  <c:v>0.0312673664031444</c:v>
+                </c:pt>
+                <c:pt idx="22">
+                  <c:v>0.0312673664031444</c:v>
+                </c:pt>
+                <c:pt idx="23">
+                  <c:v>0.0312673664031444</c:v>
+                </c:pt>
+                <c:pt idx="24">
+                  <c:v>0.0312673664031444</c:v>
+                </c:pt>
+                <c:pt idx="25">
+                  <c:v>0.0312673664031444</c:v>
+                </c:pt>
+                <c:pt idx="26">
+                  <c:v>0.0312673664031444</c:v>
+                </c:pt>
+              </c:numCache>
+            </c:numRef>
+          </c:val>
+          <c:smooth val="0"/>
+        </c:ser>
+        <c:ser>
+          <c:idx val="1"/>
+          <c:order val="1"/>
+          <c:tx>
+            <c:v>instance02</c:v>
+          </c:tx>
+          <c:spPr>
+            <a:ln w="25400">
+              <a:solidFill>
+                <a:srgbClr val="FF6600"/>
+              </a:solidFill>
+              <a:prstDash val="solid"/>
+            </a:ln>
+          </c:spPr>
+          <c:marker>
+            <c:symbol val="none"/>
+          </c:marker>
+          <c:cat>
+            <c:numRef>
+              <c:f>Foglio2!$O$3:$O$29</c:f>
+              <c:numCache>
+                <c:formatCode>General</c:formatCode>
+                <c:ptCount val="27"/>
+                <c:pt idx="0">
+                  <c:v>0.0</c:v>
+                </c:pt>
+                <c:pt idx="1">
+                  <c:v>1.0</c:v>
+                </c:pt>
+                <c:pt idx="2">
+                  <c:v>2.0</c:v>
+                </c:pt>
+                <c:pt idx="3">
+                  <c:v>3.0</c:v>
+                </c:pt>
+                <c:pt idx="4">
+                  <c:v>4.0</c:v>
+                </c:pt>
+                <c:pt idx="5">
+                  <c:v>5.0</c:v>
+                </c:pt>
+                <c:pt idx="6">
+                  <c:v>10.0</c:v>
+                </c:pt>
+                <c:pt idx="7">
+                  <c:v>25.0</c:v>
+                </c:pt>
+                <c:pt idx="8">
+                  <c:v>50.0</c:v>
+                </c:pt>
+                <c:pt idx="9">
+                  <c:v>100.0</c:v>
+                </c:pt>
+                <c:pt idx="10">
+                  <c:v>200.0</c:v>
+                </c:pt>
+                <c:pt idx="11">
+                  <c:v>300.0</c:v>
+                </c:pt>
+                <c:pt idx="12">
+                  <c:v>400.0</c:v>
+                </c:pt>
+                <c:pt idx="13">
+                  <c:v>500.0</c:v>
+                </c:pt>
+                <c:pt idx="14">
+                  <c:v>600.0</c:v>
+                </c:pt>
+                <c:pt idx="15">
+                  <c:v>700.0</c:v>
+                </c:pt>
+                <c:pt idx="16">
+                  <c:v>800.0</c:v>
+                </c:pt>
+                <c:pt idx="17">
+                  <c:v>900.0</c:v>
+                </c:pt>
+                <c:pt idx="18">
+                  <c:v>1000.0</c:v>
+                </c:pt>
+                <c:pt idx="19">
+                  <c:v>1100.0</c:v>
+                </c:pt>
+                <c:pt idx="20">
+                  <c:v>1200.0</c:v>
+                </c:pt>
+                <c:pt idx="21">
+                  <c:v>1300.0</c:v>
+                </c:pt>
+                <c:pt idx="22">
+                  <c:v>1400.0</c:v>
+                </c:pt>
+                <c:pt idx="23">
+                  <c:v>1500.0</c:v>
+                </c:pt>
+                <c:pt idx="24">
+                  <c:v>1600.0</c:v>
+                </c:pt>
+                <c:pt idx="25">
+                  <c:v>1700.0</c:v>
+                </c:pt>
+                <c:pt idx="26">
+                  <c:v>1800.0</c:v>
+                </c:pt>
+              </c:numCache>
+            </c:numRef>
+          </c:cat>
+          <c:val>
+            <c:numRef>
+              <c:f>Foglio2!$Q$3:$Q$29</c:f>
+              <c:numCache>
+                <c:formatCode>0.00</c:formatCode>
+                <c:ptCount val="27"/>
+                <c:pt idx="0">
+                  <c:v>87.04572497710954</c:v>
+                </c:pt>
+                <c:pt idx="1">
+                  <c:v>87.04572497710954</c:v>
+                </c:pt>
+                <c:pt idx="2">
+                  <c:v>15.59046663067196</c:v>
+                </c:pt>
+                <c:pt idx="3">
+                  <c:v>15.59046663067196</c:v>
+                </c:pt>
+                <c:pt idx="4">
+                  <c:v>15.59046663067196</c:v>
+                </c:pt>
+                <c:pt idx="5">
+                  <c:v>14.93830674739157</c:v>
+                </c:pt>
+                <c:pt idx="6">
+                  <c:v>11.44791151067652</c:v>
+                </c:pt>
+                <c:pt idx="7">
+                  <c:v>10.86311490854484</c:v>
+                </c:pt>
+                <c:pt idx="8">
+                  <c:v>10.86311490854484</c:v>
+                </c:pt>
+                <c:pt idx="9">
+                  <c:v>10.86311490854484</c:v>
+                </c:pt>
+                <c:pt idx="10">
+                  <c:v>10.47120011570544</c:v>
+                </c:pt>
+                <c:pt idx="11">
+                  <c:v>9.111787724272961</c:v>
+                </c:pt>
+                <c:pt idx="12">
+                  <c:v>9.111787724272961</c:v>
+                </c:pt>
+                <c:pt idx="13">
+                  <c:v>9.111787724272961</c:v>
+                </c:pt>
+                <c:pt idx="14">
+                  <c:v>9.111787724272961</c:v>
+                </c:pt>
+                <c:pt idx="15">
+                  <c:v>9.111787724272961</c:v>
+                </c:pt>
+                <c:pt idx="16">
+                  <c:v>8.88827393152518</c:v>
+                </c:pt>
+                <c:pt idx="17">
+                  <c:v>8.88827393152518</c:v>
+                </c:pt>
+                <c:pt idx="18">
+                  <c:v>8.88827393152518</c:v>
+                </c:pt>
+                <c:pt idx="19">
+                  <c:v>8.88827393152518</c:v>
+                </c:pt>
+                <c:pt idx="20">
+                  <c:v>8.88827393152518</c:v>
+                </c:pt>
+                <c:pt idx="21">
+                  <c:v>8.612718611580574</c:v>
+                </c:pt>
+                <c:pt idx="22">
+                  <c:v>7.9330066536402</c:v>
+                </c:pt>
+                <c:pt idx="23">
+                  <c:v>7.9330066536402</c:v>
+                </c:pt>
+                <c:pt idx="24">
+                  <c:v>7.9330066536402</c:v>
+                </c:pt>
+                <c:pt idx="25">
+                  <c:v>7.9330066536402</c:v>
+                </c:pt>
+                <c:pt idx="26">
+                  <c:v>7.9330066536402</c:v>
+                </c:pt>
+              </c:numCache>
+            </c:numRef>
+          </c:val>
+          <c:smooth val="0"/>
+        </c:ser>
+        <c:ser>
+          <c:idx val="2"/>
+          <c:order val="2"/>
+          <c:tx>
+            <c:v>instance03</c:v>
+          </c:tx>
+          <c:spPr>
+            <a:ln w="25400">
+              <a:solidFill>
+                <a:srgbClr val="969696"/>
+              </a:solidFill>
+              <a:prstDash val="solid"/>
+            </a:ln>
+          </c:spPr>
+          <c:marker>
+            <c:symbol val="none"/>
+          </c:marker>
+          <c:cat>
+            <c:numRef>
+              <c:f>Foglio2!$O$3:$O$29</c:f>
+              <c:numCache>
+                <c:formatCode>General</c:formatCode>
+                <c:ptCount val="27"/>
+                <c:pt idx="0">
+                  <c:v>0.0</c:v>
+                </c:pt>
+                <c:pt idx="1">
+                  <c:v>1.0</c:v>
+                </c:pt>
+                <c:pt idx="2">
+                  <c:v>2.0</c:v>
+                </c:pt>
+                <c:pt idx="3">
+                  <c:v>3.0</c:v>
+                </c:pt>
+                <c:pt idx="4">
+                  <c:v>4.0</c:v>
+                </c:pt>
+                <c:pt idx="5">
+                  <c:v>5.0</c:v>
+                </c:pt>
+                <c:pt idx="6">
+                  <c:v>10.0</c:v>
+                </c:pt>
+                <c:pt idx="7">
+                  <c:v>25.0</c:v>
+                </c:pt>
+                <c:pt idx="8">
+                  <c:v>50.0</c:v>
+                </c:pt>
+                <c:pt idx="9">
+                  <c:v>100.0</c:v>
+                </c:pt>
+                <c:pt idx="10">
+                  <c:v>200.0</c:v>
+                </c:pt>
+                <c:pt idx="11">
+                  <c:v>300.0</c:v>
+                </c:pt>
+                <c:pt idx="12">
+                  <c:v>400.0</c:v>
+                </c:pt>
+                <c:pt idx="13">
+                  <c:v>500.0</c:v>
+                </c:pt>
+                <c:pt idx="14">
+                  <c:v>600.0</c:v>
+                </c:pt>
+                <c:pt idx="15">
+                  <c:v>700.0</c:v>
+                </c:pt>
+                <c:pt idx="16">
+                  <c:v>800.0</c:v>
+                </c:pt>
+                <c:pt idx="17">
+                  <c:v>900.0</c:v>
+                </c:pt>
+                <c:pt idx="18">
+                  <c:v>1000.0</c:v>
+                </c:pt>
+                <c:pt idx="19">
+                  <c:v>1100.0</c:v>
+                </c:pt>
+                <c:pt idx="20">
+                  <c:v>1200.0</c:v>
+                </c:pt>
+                <c:pt idx="21">
+                  <c:v>1300.0</c:v>
+                </c:pt>
+                <c:pt idx="22">
+                  <c:v>1400.0</c:v>
+                </c:pt>
+                <c:pt idx="23">
+                  <c:v>1500.0</c:v>
+                </c:pt>
+                <c:pt idx="24">
+                  <c:v>1600.0</c:v>
+                </c:pt>
+                <c:pt idx="25">
+                  <c:v>1700.0</c:v>
+                </c:pt>
+                <c:pt idx="26">
+                  <c:v>1800.0</c:v>
+                </c:pt>
+              </c:numCache>
+            </c:numRef>
+          </c:cat>
+          <c:val>
+            <c:numRef>
+              <c:f>Foglio2!$R$3:$R$29</c:f>
+              <c:numCache>
+                <c:formatCode>0.00</c:formatCode>
+                <c:ptCount val="27"/>
+                <c:pt idx="0">
+                  <c:v>125.288105585532</c:v>
+                </c:pt>
+                <c:pt idx="1">
+                  <c:v>125.2881055855323</c:v>
+                </c:pt>
+                <c:pt idx="2">
+                  <c:v>125.2881055855323</c:v>
+                </c:pt>
+                <c:pt idx="3">
+                  <c:v>125.2881055855323</c:v>
+                </c:pt>
+                <c:pt idx="4">
+                  <c:v>125.2881055855323</c:v>
+                </c:pt>
+                <c:pt idx="5">
+                  <c:v>18.49339069786074</c:v>
+                </c:pt>
+                <c:pt idx="6">
+                  <c:v>18.49339069786074</c:v>
+                </c:pt>
+                <c:pt idx="7">
+                  <c:v>14.08254787410557</c:v>
+                </c:pt>
+                <c:pt idx="8">
+                  <c:v>12.99277980187189</c:v>
+                </c:pt>
+                <c:pt idx="9">
+                  <c:v>12.99277980187189</c:v>
+                </c:pt>
+                <c:pt idx="10">
+                  <c:v>12.99277980187189</c:v>
+                </c:pt>
+                <c:pt idx="11">
+                  <c:v>12.62498250280975</c:v>
+                </c:pt>
+                <c:pt idx="12">
+                  <c:v>12.62498250280975</c:v>
+                </c:pt>
+                <c:pt idx="13">
+                  <c:v>10.40729964847467</c:v>
+                </c:pt>
+                <c:pt idx="14">
+                  <c:v>10.19207079901849</c:v>
+                </c:pt>
+                <c:pt idx="15">
+                  <c:v>10.19207079901849</c:v>
+                </c:pt>
+                <c:pt idx="16">
+                  <c:v>10.19207079901849</c:v>
+                </c:pt>
+                <c:pt idx="17">
+                  <c:v>10.19207079901849</c:v>
+                </c:pt>
+                <c:pt idx="18">
+                  <c:v>10.1157865742155</c:v>
+                </c:pt>
+                <c:pt idx="19">
+                  <c:v>10.1157865742155</c:v>
+                </c:pt>
+                <c:pt idx="20">
+                  <c:v>10.1157865742155</c:v>
+                </c:pt>
+                <c:pt idx="21">
+                  <c:v>10.1157865742155</c:v>
+                </c:pt>
+                <c:pt idx="22">
+                  <c:v>10.1157865742155</c:v>
+                </c:pt>
+                <c:pt idx="23">
+                  <c:v>10.1157865742155</c:v>
+                </c:pt>
+                <c:pt idx="24">
+                  <c:v>10.0994410492497</c:v>
+                </c:pt>
+                <c:pt idx="25">
+                  <c:v>10.0994410492497</c:v>
+                </c:pt>
+                <c:pt idx="26">
+                  <c:v>10.0994410492497</c:v>
+                </c:pt>
+              </c:numCache>
+            </c:numRef>
+          </c:val>
+          <c:smooth val="0"/>
+        </c:ser>
+        <c:ser>
+          <c:idx val="6"/>
+          <c:order val="3"/>
+          <c:tx>
+            <c:v>instance04</c:v>
+          </c:tx>
+          <c:spPr>
+            <a:ln w="25400">
+              <a:solidFill>
+                <a:srgbClr val="333399"/>
+              </a:solidFill>
+              <a:prstDash val="solid"/>
+            </a:ln>
+          </c:spPr>
+          <c:marker>
+            <c:symbol val="none"/>
+          </c:marker>
+          <c:val>
+            <c:numRef>
+              <c:f>Foglio2!$S$3:$S$29</c:f>
+              <c:numCache>
+                <c:formatCode>0.00</c:formatCode>
+                <c:ptCount val="27"/>
+                <c:pt idx="0">
+                  <c:v>104.0568200754626</c:v>
+                </c:pt>
+                <c:pt idx="1">
+                  <c:v>104.0568200754626</c:v>
+                </c:pt>
+                <c:pt idx="2">
+                  <c:v>104.0568200754626</c:v>
+                </c:pt>
+                <c:pt idx="3">
+                  <c:v>104.0568200754626</c:v>
+                </c:pt>
+                <c:pt idx="4">
+                  <c:v>104.0568200754626</c:v>
+                </c:pt>
+                <c:pt idx="5">
+                  <c:v>104.0568200754626</c:v>
+                </c:pt>
+                <c:pt idx="6">
+                  <c:v>19.13097519023086</c:v>
+                </c:pt>
+                <c:pt idx="7">
+                  <c:v>19.13097519023086</c:v>
+                </c:pt>
+                <c:pt idx="8">
+                  <c:v>18.77729778227911</c:v>
+                </c:pt>
+                <c:pt idx="9">
+                  <c:v>16.78604499402762</c:v>
+                </c:pt>
+                <c:pt idx="10">
+                  <c:v>14.54512918023916</c:v>
+                </c:pt>
+                <c:pt idx="11">
+                  <c:v>12.77403390503448</c:v>
+                </c:pt>
+                <c:pt idx="12">
+                  <c:v>11.24022670392715</c:v>
+                </c:pt>
+                <c:pt idx="13">
+                  <c:v>11.24022670392715</c:v>
+                </c:pt>
+                <c:pt idx="14">
+                  <c:v>11.24022670392715</c:v>
+                </c:pt>
+                <c:pt idx="15">
+                  <c:v>10.93113799535115</c:v>
+                </c:pt>
+                <c:pt idx="16">
+                  <c:v>9.005258641668303</c:v>
+                </c:pt>
+                <c:pt idx="17">
+                  <c:v>9.005258641668303</c:v>
+                </c:pt>
+                <c:pt idx="18">
+                  <c:v>9.005258641668303</c:v>
+                </c:pt>
+                <c:pt idx="19">
+                  <c:v>9.005258641668303</c:v>
+                </c:pt>
+                <c:pt idx="20">
+                  <c:v>9.005258641668303</c:v>
+                </c:pt>
+                <c:pt idx="21">
+                  <c:v>9.005258641668303</c:v>
+                </c:pt>
+                <c:pt idx="22">
+                  <c:v>9.005258641668303</c:v>
+                </c:pt>
+                <c:pt idx="23">
+                  <c:v>9.005258641668303</c:v>
+                </c:pt>
+                <c:pt idx="24">
+                  <c:v>9.005258641668303</c:v>
+                </c:pt>
+                <c:pt idx="25">
+                  <c:v>9.0052586416683</c:v>
+                </c:pt>
+                <c:pt idx="26">
+                  <c:v>9.0052586416683</c:v>
+                </c:pt>
+              </c:numCache>
+            </c:numRef>
+          </c:val>
+          <c:smooth val="0"/>
+        </c:ser>
+        <c:ser>
+          <c:idx val="3"/>
+          <c:order val="4"/>
+          <c:tx>
+            <c:v>instance05</c:v>
+          </c:tx>
+          <c:spPr>
+            <a:ln w="25400">
+              <a:solidFill>
+                <a:srgbClr val="FFCC00"/>
+              </a:solidFill>
+              <a:prstDash val="solid"/>
+            </a:ln>
+          </c:spPr>
+          <c:marker>
+            <c:symbol val="none"/>
+          </c:marker>
+          <c:cat>
+            <c:numRef>
+              <c:f>Foglio2!$O$3:$O$29</c:f>
+              <c:numCache>
+                <c:formatCode>General</c:formatCode>
+                <c:ptCount val="27"/>
+                <c:pt idx="0">
+                  <c:v>0.0</c:v>
+                </c:pt>
+                <c:pt idx="1">
+                  <c:v>1.0</c:v>
+                </c:pt>
+                <c:pt idx="2">
+                  <c:v>2.0</c:v>
+                </c:pt>
+                <c:pt idx="3">
+                  <c:v>3.0</c:v>
+                </c:pt>
+                <c:pt idx="4">
+                  <c:v>4.0</c:v>
+                </c:pt>
+                <c:pt idx="5">
+                  <c:v>5.0</c:v>
+                </c:pt>
+                <c:pt idx="6">
+                  <c:v>10.0</c:v>
+                </c:pt>
+                <c:pt idx="7">
+                  <c:v>25.0</c:v>
+                </c:pt>
+                <c:pt idx="8">
+                  <c:v>50.0</c:v>
+                </c:pt>
+                <c:pt idx="9">
+                  <c:v>100.0</c:v>
+                </c:pt>
+                <c:pt idx="10">
+                  <c:v>200.0</c:v>
+                </c:pt>
+                <c:pt idx="11">
+                  <c:v>300.0</c:v>
+                </c:pt>
+                <c:pt idx="12">
+                  <c:v>400.0</c:v>
+                </c:pt>
+                <c:pt idx="13">
+                  <c:v>500.0</c:v>
+                </c:pt>
+                <c:pt idx="14">
+                  <c:v>600.0</c:v>
+                </c:pt>
+                <c:pt idx="15">
+                  <c:v>700.0</c:v>
+                </c:pt>
+                <c:pt idx="16">
+                  <c:v>800.0</c:v>
+                </c:pt>
+                <c:pt idx="17">
+                  <c:v>900.0</c:v>
+                </c:pt>
+                <c:pt idx="18">
+                  <c:v>1000.0</c:v>
+                </c:pt>
+                <c:pt idx="19">
+                  <c:v>1100.0</c:v>
+                </c:pt>
+                <c:pt idx="20">
+                  <c:v>1200.0</c:v>
+                </c:pt>
+                <c:pt idx="21">
+                  <c:v>1300.0</c:v>
+                </c:pt>
+                <c:pt idx="22">
+                  <c:v>1400.0</c:v>
+                </c:pt>
+                <c:pt idx="23">
+                  <c:v>1500.0</c:v>
+                </c:pt>
+                <c:pt idx="24">
+                  <c:v>1600.0</c:v>
+                </c:pt>
+                <c:pt idx="25">
+                  <c:v>1700.0</c:v>
+                </c:pt>
+                <c:pt idx="26">
+                  <c:v>1800.0</c:v>
+                </c:pt>
+              </c:numCache>
+            </c:numRef>
+          </c:cat>
+          <c:val>
+            <c:numRef>
+              <c:f>Foglio2!$T$3:$T$29</c:f>
+              <c:numCache>
+                <c:formatCode>0.00</c:formatCode>
+                <c:ptCount val="27"/>
+                <c:pt idx="0">
+                  <c:v>258.3033869274588</c:v>
+                </c:pt>
+                <c:pt idx="1">
+                  <c:v>258.3033869274588</c:v>
+                </c:pt>
+                <c:pt idx="2">
+                  <c:v>258.3033869274588</c:v>
+                </c:pt>
+                <c:pt idx="3">
+                  <c:v>258.3033869274588</c:v>
+                </c:pt>
+                <c:pt idx="4">
+                  <c:v>258.3033869274588</c:v>
+                </c:pt>
+                <c:pt idx="5">
+                  <c:v>258.3033869274588</c:v>
+                </c:pt>
+                <c:pt idx="6">
+                  <c:v>258.3033869274588</c:v>
+                </c:pt>
+                <c:pt idx="7">
+                  <c:v>22.02063653007033</c:v>
+                </c:pt>
+                <c:pt idx="8">
+                  <c:v>22.02063653007033</c:v>
+                </c:pt>
+                <c:pt idx="9">
+                  <c:v>22.02063653007033</c:v>
+                </c:pt>
+                <c:pt idx="10">
+                  <c:v>22.02063653007033</c:v>
+                </c:pt>
+                <c:pt idx="11">
+                  <c:v>22.02063653007033</c:v>
+                </c:pt>
+                <c:pt idx="12">
+                  <c:v>20.57587634173605</c:v>
+                </c:pt>
+                <c:pt idx="13">
+                  <c:v>13.46075602993015</c:v>
+                </c:pt>
+                <c:pt idx="14">
+                  <c:v>13.46075602993015</c:v>
+                </c:pt>
+                <c:pt idx="15">
+                  <c:v>13.46075602993015</c:v>
+                </c:pt>
+                <c:pt idx="16">
+                  <c:v>12.66374665794078</c:v>
+                </c:pt>
+                <c:pt idx="17">
+                  <c:v>12.66374665794078</c:v>
+                </c:pt>
+                <c:pt idx="18">
+                  <c:v>12.66374665794078</c:v>
+                </c:pt>
+                <c:pt idx="19">
+                  <c:v>12.66374665794078</c:v>
+                </c:pt>
+                <c:pt idx="20">
+                  <c:v>12.6072321103087</c:v>
+                </c:pt>
+                <c:pt idx="21">
+                  <c:v>12.6072321103087</c:v>
+                </c:pt>
+                <c:pt idx="22">
+                  <c:v>12.6072321103087</c:v>
+                </c:pt>
+                <c:pt idx="23">
+                  <c:v>12.6072321103087</c:v>
+                </c:pt>
+                <c:pt idx="24">
+                  <c:v>12.6072321103087</c:v>
+                </c:pt>
+                <c:pt idx="25">
+                  <c:v>12.6072321103087</c:v>
+                </c:pt>
+                <c:pt idx="26">
+                  <c:v>12.6072321103087</c:v>
+                </c:pt>
+              </c:numCache>
+            </c:numRef>
+          </c:val>
+          <c:smooth val="0"/>
+        </c:ser>
+        <c:ser>
+          <c:idx val="4"/>
+          <c:order val="5"/>
+          <c:tx>
+            <c:v>instance06</c:v>
+          </c:tx>
+          <c:spPr>
+            <a:ln w="25400">
+              <a:solidFill>
+                <a:srgbClr val="33CCCC"/>
+              </a:solidFill>
+              <a:prstDash val="solid"/>
+            </a:ln>
+          </c:spPr>
+          <c:marker>
+            <c:symbol val="none"/>
+          </c:marker>
+          <c:cat>
+            <c:numRef>
+              <c:f>Foglio2!$O$3:$O$29</c:f>
+              <c:numCache>
+                <c:formatCode>General</c:formatCode>
+                <c:ptCount val="27"/>
+                <c:pt idx="0">
+                  <c:v>0.0</c:v>
+                </c:pt>
+                <c:pt idx="1">
+                  <c:v>1.0</c:v>
+                </c:pt>
+                <c:pt idx="2">
+                  <c:v>2.0</c:v>
+                </c:pt>
+                <c:pt idx="3">
+                  <c:v>3.0</c:v>
+                </c:pt>
+                <c:pt idx="4">
+                  <c:v>4.0</c:v>
+                </c:pt>
+                <c:pt idx="5">
+                  <c:v>5.0</c:v>
+                </c:pt>
+                <c:pt idx="6">
+                  <c:v>10.0</c:v>
+                </c:pt>
+                <c:pt idx="7">
+                  <c:v>25.0</c:v>
+                </c:pt>
+                <c:pt idx="8">
+                  <c:v>50.0</c:v>
+                </c:pt>
+                <c:pt idx="9">
+                  <c:v>100.0</c:v>
+                </c:pt>
+                <c:pt idx="10">
+                  <c:v>200.0</c:v>
+                </c:pt>
+                <c:pt idx="11">
+                  <c:v>300.0</c:v>
+                </c:pt>
+                <c:pt idx="12">
+                  <c:v>400.0</c:v>
+                </c:pt>
+                <c:pt idx="13">
+                  <c:v>500.0</c:v>
+                </c:pt>
+                <c:pt idx="14">
+                  <c:v>600.0</c:v>
+                </c:pt>
+                <c:pt idx="15">
+                  <c:v>700.0</c:v>
+                </c:pt>
+                <c:pt idx="16">
+                  <c:v>800.0</c:v>
+                </c:pt>
+                <c:pt idx="17">
+                  <c:v>900.0</c:v>
+                </c:pt>
+                <c:pt idx="18">
+                  <c:v>1000.0</c:v>
+                </c:pt>
+                <c:pt idx="19">
+                  <c:v>1100.0</c:v>
+                </c:pt>
+                <c:pt idx="20">
+                  <c:v>1200.0</c:v>
+                </c:pt>
+                <c:pt idx="21">
+                  <c:v>1300.0</c:v>
+                </c:pt>
+                <c:pt idx="22">
+                  <c:v>1400.0</c:v>
+                </c:pt>
+                <c:pt idx="23">
+                  <c:v>1500.0</c:v>
+                </c:pt>
+                <c:pt idx="24">
+                  <c:v>1600.0</c:v>
+                </c:pt>
+                <c:pt idx="25">
+                  <c:v>1700.0</c:v>
+                </c:pt>
+                <c:pt idx="26">
+                  <c:v>1800.0</c:v>
+                </c:pt>
+              </c:numCache>
+            </c:numRef>
+          </c:cat>
+          <c:val>
+            <c:numRef>
+              <c:f>Foglio2!$U$3:$U$29</c:f>
+              <c:numCache>
+                <c:formatCode>0.00</c:formatCode>
+                <c:ptCount val="27"/>
+                <c:pt idx="0">
+                  <c:v>142.9308429608307</c:v>
+                </c:pt>
+                <c:pt idx="1">
+                  <c:v>142.9308429608307</c:v>
+                </c:pt>
+                <c:pt idx="2">
+                  <c:v>142.9308429608307</c:v>
+                </c:pt>
+                <c:pt idx="3">
+                  <c:v>142.9308429608307</c:v>
+                </c:pt>
+                <c:pt idx="4">
+                  <c:v>142.9308429608307</c:v>
+                </c:pt>
+                <c:pt idx="5">
+                  <c:v>142.9308429608307</c:v>
+                </c:pt>
+                <c:pt idx="6">
+                  <c:v>142.9308429608307</c:v>
+                </c:pt>
+                <c:pt idx="7">
+                  <c:v>142.9308429608307</c:v>
+                </c:pt>
+                <c:pt idx="8">
+                  <c:v>142.9308429608307</c:v>
+                </c:pt>
+                <c:pt idx="9">
+                  <c:v>142.9308429608307</c:v>
+                </c:pt>
+                <c:pt idx="10">
+                  <c:v>19.97498503897748</c:v>
+                </c:pt>
+                <c:pt idx="11">
+                  <c:v>19.97498503897748</c:v>
+                </c:pt>
+                <c:pt idx="12">
+                  <c:v>19.97498503897748</c:v>
+                </c:pt>
+                <c:pt idx="13">
+                  <c:v>19.43287378415005</c:v>
+                </c:pt>
+                <c:pt idx="14">
+                  <c:v>19.41898023305692</c:v>
+                </c:pt>
+                <c:pt idx="15">
+                  <c:v>19.41898023305692</c:v>
+                </c:pt>
+                <c:pt idx="16">
+                  <c:v>19.41898023305692</c:v>
+                </c:pt>
+                <c:pt idx="17">
+                  <c:v>19.27222754680616</c:v>
+                </c:pt>
+                <c:pt idx="18">
+                  <c:v>19.27222754680616</c:v>
+                </c:pt>
+                <c:pt idx="19">
+                  <c:v>19.27222754680616</c:v>
+                </c:pt>
+                <c:pt idx="20">
+                  <c:v>19.27222754680616</c:v>
+                </c:pt>
+                <c:pt idx="21">
+                  <c:v>19.27222754680616</c:v>
+                </c:pt>
+                <c:pt idx="22">
+                  <c:v>19.27222754680616</c:v>
+                </c:pt>
+                <c:pt idx="23">
+                  <c:v>19.27222754680616</c:v>
+                </c:pt>
+                <c:pt idx="24">
+                  <c:v>19.27222754680616</c:v>
+                </c:pt>
+                <c:pt idx="25">
+                  <c:v>19.27222754680616</c:v>
+                </c:pt>
+                <c:pt idx="26">
+                  <c:v>19.27222754680616</c:v>
+                </c:pt>
+              </c:numCache>
+            </c:numRef>
+          </c:val>
+          <c:smooth val="0"/>
+        </c:ser>
+        <c:ser>
+          <c:idx val="5"/>
+          <c:order val="6"/>
+          <c:tx>
+            <c:v>instance07</c:v>
+          </c:tx>
+          <c:spPr>
+            <a:ln w="25400">
+              <a:solidFill>
+                <a:srgbClr val="339966"/>
+              </a:solidFill>
+              <a:prstDash val="solid"/>
+            </a:ln>
+          </c:spPr>
+          <c:marker>
+            <c:symbol val="none"/>
+          </c:marker>
+          <c:cat>
+            <c:numRef>
+              <c:f>Foglio2!$O$3:$O$29</c:f>
+              <c:numCache>
+                <c:formatCode>General</c:formatCode>
+                <c:ptCount val="27"/>
+                <c:pt idx="0">
+                  <c:v>0.0</c:v>
+                </c:pt>
+                <c:pt idx="1">
+                  <c:v>1.0</c:v>
+                </c:pt>
+                <c:pt idx="2">
+                  <c:v>2.0</c:v>
+                </c:pt>
+                <c:pt idx="3">
+                  <c:v>3.0</c:v>
+                </c:pt>
+                <c:pt idx="4">
+                  <c:v>4.0</c:v>
+                </c:pt>
+                <c:pt idx="5">
+                  <c:v>5.0</c:v>
+                </c:pt>
+                <c:pt idx="6">
+                  <c:v>10.0</c:v>
+                </c:pt>
+                <c:pt idx="7">
+                  <c:v>25.0</c:v>
+                </c:pt>
+                <c:pt idx="8">
+                  <c:v>50.0</c:v>
+                </c:pt>
+                <c:pt idx="9">
+                  <c:v>100.0</c:v>
+                </c:pt>
+                <c:pt idx="10">
+                  <c:v>200.0</c:v>
+                </c:pt>
+                <c:pt idx="11">
+                  <c:v>300.0</c:v>
+                </c:pt>
+                <c:pt idx="12">
+                  <c:v>400.0</c:v>
+                </c:pt>
+                <c:pt idx="13">
+                  <c:v>500.0</c:v>
+                </c:pt>
+                <c:pt idx="14">
+                  <c:v>600.0</c:v>
+                </c:pt>
+                <c:pt idx="15">
+                  <c:v>700.0</c:v>
+                </c:pt>
+                <c:pt idx="16">
+                  <c:v>800.0</c:v>
+                </c:pt>
+                <c:pt idx="17">
+                  <c:v>900.0</c:v>
+                </c:pt>
+                <c:pt idx="18">
+                  <c:v>1000.0</c:v>
+                </c:pt>
+                <c:pt idx="19">
+                  <c:v>1100.0</c:v>
+                </c:pt>
+                <c:pt idx="20">
+                  <c:v>1200.0</c:v>
+                </c:pt>
+                <c:pt idx="21">
+                  <c:v>1300.0</c:v>
+                </c:pt>
+                <c:pt idx="22">
+                  <c:v>1400.0</c:v>
+                </c:pt>
+                <c:pt idx="23">
+                  <c:v>1500.0</c:v>
+                </c:pt>
+                <c:pt idx="24">
+                  <c:v>1600.0</c:v>
+                </c:pt>
+                <c:pt idx="25">
+                  <c:v>1700.0</c:v>
+                </c:pt>
+                <c:pt idx="26">
+                  <c:v>1800.0</c:v>
+                </c:pt>
+              </c:numCache>
+            </c:numRef>
+          </c:cat>
+          <c:val>
+            <c:numRef>
+              <c:f>Foglio2!$V$3:$V$29</c:f>
+              <c:numCache>
+                <c:formatCode>0.00</c:formatCode>
+                <c:ptCount val="27"/>
+                <c:pt idx="0">
+                  <c:v>166.8757980482376</c:v>
+                </c:pt>
+                <c:pt idx="1">
+                  <c:v>14.46496975563219</c:v>
+                </c:pt>
+                <c:pt idx="2">
+                  <c:v>14.46496975563219</c:v>
+                </c:pt>
+                <c:pt idx="3">
+                  <c:v>14.46496975563219</c:v>
+                </c:pt>
+                <c:pt idx="4">
+                  <c:v>14.46496975563219</c:v>
+                </c:pt>
+                <c:pt idx="5">
+                  <c:v>14.46496975563219</c:v>
+                </c:pt>
+                <c:pt idx="6">
+                  <c:v>14.46496975563219</c:v>
+                </c:pt>
+                <c:pt idx="7">
+                  <c:v>11.28577144107425</c:v>
+                </c:pt>
+                <c:pt idx="8">
+                  <c:v>11.28577144107425</c:v>
+                </c:pt>
+                <c:pt idx="9">
+                  <c:v>5.586489399670726</c:v>
+                </c:pt>
+                <c:pt idx="10">
+                  <c:v>5.00845696064228</c:v>
+                </c:pt>
+                <c:pt idx="11">
+                  <c:v>5.00845696064228</c:v>
+                </c:pt>
+                <c:pt idx="12">
+                  <c:v>4.52558585061284</c:v>
+                </c:pt>
+                <c:pt idx="13">
+                  <c:v>4.52558585061284</c:v>
+                </c:pt>
+                <c:pt idx="14">
+                  <c:v>4.321164112398233</c:v>
+                </c:pt>
+                <c:pt idx="15">
+                  <c:v>4.321164112398233</c:v>
+                </c:pt>
+                <c:pt idx="16">
+                  <c:v>4.229525065965698</c:v>
+                </c:pt>
+                <c:pt idx="17">
+                  <c:v>4.229525065965698</c:v>
+                </c:pt>
+                <c:pt idx="18">
+                  <c:v>4.229525065965698</c:v>
+                </c:pt>
+                <c:pt idx="19">
+                  <c:v>4.229525065965698</c:v>
+                </c:pt>
+                <c:pt idx="20">
+                  <c:v>4.229525065965698</c:v>
+                </c:pt>
+                <c:pt idx="21">
+                  <c:v>4.229525065965698</c:v>
+                </c:pt>
+                <c:pt idx="22">
+                  <c:v>4.229525065965698</c:v>
+                </c:pt>
+                <c:pt idx="23">
+                  <c:v>4.229525065965698</c:v>
+                </c:pt>
+                <c:pt idx="24">
+                  <c:v>4.229525065965698</c:v>
+                </c:pt>
+                <c:pt idx="25">
+                  <c:v>4.229525065965698</c:v>
+                </c:pt>
+                <c:pt idx="26">
+                  <c:v>4.229525065965698</c:v>
+                </c:pt>
+              </c:numCache>
+            </c:numRef>
+          </c:val>
+          <c:smooth val="0"/>
+        </c:ser>
+        <c:dLbls>
+          <c:showLegendKey val="0"/>
+          <c:showVal val="0"/>
+          <c:showCatName val="0"/>
+          <c:showSerName val="0"/>
+          <c:showPercent val="0"/>
+          <c:showBubbleSize val="0"/>
+        </c:dLbls>
+        <c:smooth val="0"/>
+        <c:axId val="250885232"/>
+        <c:axId val="251019600"/>
+      </c:lineChart>
+      <c:catAx>
+        <c:axId val="250885232"/>
+        <c:scaling>
+          <c:orientation val="minMax"/>
+        </c:scaling>
+        <c:delete val="0"/>
+        <c:axPos val="b"/>
+        <c:title>
+          <c:tx>
+            <c:rich>
+              <a:bodyPr/>
+              <a:lstStyle/>
+              <a:p>
+                <a:pPr>
+                  <a:defRPr sz="900" b="1" i="0" u="none" strike="noStrike" baseline="0">
+                    <a:solidFill>
+                      <a:srgbClr val="C0C0C0"/>
+                    </a:solidFill>
+                    <a:latin typeface="Calibri"/>
+                    <a:ea typeface="Calibri"/>
+                    <a:cs typeface="Calibri"/>
+                  </a:defRPr>
+                </a:pPr>
+                <a:r>
+                  <a:rPr lang="en-US"/>
+                  <a:t>Time(s)</a:t>
+                </a:r>
+              </a:p>
+            </c:rich>
+          </c:tx>
+          <c:layout>
+            <c:manualLayout>
+              <c:xMode val="edge"/>
+              <c:yMode val="edge"/>
+              <c:x val="0.509984541224251"/>
+              <c:y val="0.927433073071175"/>
+            </c:manualLayout>
+          </c:layout>
+          <c:overlay val="0"/>
+          <c:spPr>
+            <a:noFill/>
+            <a:ln w="25400">
+              <a:noFill/>
+            </a:ln>
+          </c:spPr>
+        </c:title>
+        <c:numFmt formatCode="General" sourceLinked="1"/>
+        <c:majorTickMark val="none"/>
+        <c:minorTickMark val="none"/>
+        <c:tickLblPos val="nextTo"/>
+        <c:spPr>
+          <a:ln w="3175">
+            <a:solidFill>
+              <a:srgbClr val="FFFFFF"/>
+            </a:solidFill>
+            <a:prstDash val="solid"/>
+          </a:ln>
+        </c:spPr>
+        <c:txPr>
+          <a:bodyPr rot="0" vert="horz"/>
+          <a:lstStyle/>
+          <a:p>
+            <a:pPr>
+              <a:defRPr sz="900" b="0" i="0" u="none" strike="noStrike" baseline="0">
+                <a:solidFill>
+                  <a:srgbClr val="C0C0C0"/>
+                </a:solidFill>
+                <a:latin typeface="Calibri"/>
+                <a:ea typeface="Calibri"/>
+                <a:cs typeface="Calibri"/>
+              </a:defRPr>
+            </a:pPr>
+            <a:endParaRPr lang="en-US"/>
+          </a:p>
+        </c:txPr>
+        <c:crossAx val="251019600"/>
+        <c:crosses val="autoZero"/>
+        <c:auto val="0"/>
+        <c:lblAlgn val="ctr"/>
+        <c:lblOffset val="100"/>
+        <c:tickLblSkip val="1"/>
+        <c:tickMarkSkip val="1"/>
+        <c:noMultiLvlLbl val="0"/>
+      </c:catAx>
+      <c:valAx>
+        <c:axId val="251019600"/>
+        <c:scaling>
+          <c:orientation val="minMax"/>
+        </c:scaling>
+        <c:delete val="0"/>
+        <c:axPos val="l"/>
+        <c:majorGridlines>
+          <c:spPr>
+            <a:ln w="3175">
+              <a:solidFill>
+                <a:srgbClr val="FFFFFF"/>
+              </a:solidFill>
+              <a:prstDash val="solid"/>
+            </a:ln>
+          </c:spPr>
+        </c:majorGridlines>
+        <c:numFmt formatCode="0.00" sourceLinked="1"/>
+        <c:majorTickMark val="none"/>
+        <c:minorTickMark val="none"/>
+        <c:tickLblPos val="nextTo"/>
+        <c:spPr>
+          <a:ln w="6350">
+            <a:noFill/>
+          </a:ln>
+        </c:spPr>
+        <c:txPr>
+          <a:bodyPr rot="0" vert="horz"/>
+          <a:lstStyle/>
+          <a:p>
+            <a:pPr>
+              <a:defRPr sz="900" b="0" i="0" u="none" strike="noStrike" baseline="0">
+                <a:solidFill>
+                  <a:srgbClr val="C0C0C0"/>
+                </a:solidFill>
+                <a:latin typeface="Calibri"/>
+                <a:ea typeface="Calibri"/>
+                <a:cs typeface="Calibri"/>
+              </a:defRPr>
+            </a:pPr>
+            <a:endParaRPr lang="en-US"/>
+          </a:p>
+        </c:txPr>
+        <c:crossAx val="250885232"/>
+        <c:crosses val="autoZero"/>
+        <c:crossBetween val="between"/>
+      </c:valAx>
+      <c:spPr>
+        <a:noFill/>
+        <a:ln w="25400">
+          <a:noFill/>
+        </a:ln>
+      </c:spPr>
+    </c:plotArea>
+    <c:legend>
+      <c:legendPos val="r"/>
+      <c:layout>
+        <c:manualLayout>
+          <c:xMode val="edge"/>
+          <c:yMode val="edge"/>
+          <c:x val="0.0173503711573457"/>
+          <c:y val="0.958287010922858"/>
+          <c:w val="0.958613662080659"/>
+          <c:h val="0.0308539378516829"/>
+        </c:manualLayout>
+      </c:layout>
+      <c:overlay val="0"/>
+      <c:spPr>
+        <a:noFill/>
+        <a:ln w="25400">
+          <a:noFill/>
+        </a:ln>
+      </c:spPr>
+      <c:txPr>
+        <a:bodyPr/>
+        <a:lstStyle/>
+        <a:p>
+          <a:pPr>
+            <a:defRPr sz="825" b="0" i="0" u="none" strike="noStrike" baseline="0">
+              <a:solidFill>
+                <a:srgbClr val="C0C0C0"/>
+              </a:solidFill>
+              <a:latin typeface="Calibri"/>
+              <a:ea typeface="Calibri"/>
+              <a:cs typeface="Calibri"/>
+            </a:defRPr>
+          </a:pPr>
+          <a:endParaRPr lang="en-US"/>
+        </a:p>
+      </c:txPr>
+    </c:legend>
+    <c:plotVisOnly val="1"/>
+    <c:dispBlanksAs val="gap"/>
+    <c:showDLblsOverMax val="0"/>
+  </c:chart>
+  <c:spPr>
+    <a:solidFill>
+      <a:srgbClr val="FFFFFF"/>
+    </a:solidFill>
+    <a:ln w="12700">
+      <a:noFill/>
+      <a:prstDash val="solid"/>
+    </a:ln>
+  </c:spPr>
+  <c:txPr>
+    <a:bodyPr/>
+    <a:lstStyle/>
+    <a:p>
+      <a:pPr>
+        <a:defRPr sz="1000" b="0" i="0" u="none" strike="noStrike" baseline="0">
+          <a:solidFill>
+            <a:srgbClr val="000000"/>
+          </a:solidFill>
+          <a:latin typeface="Calibri"/>
+          <a:ea typeface="Calibri"/>
+          <a:cs typeface="Calibri"/>
+        </a:defRPr>
+      </a:pPr>
+      <a:endParaRPr lang="en-US"/>
+    </a:p>
+  </c:txPr>
+  <c:externalData r:id="rId1">
+    <c:autoUpdate val="0"/>
+  </c:externalData>
+</c:chartSpace>
+</file>
+
 <file path=ppt/charts/chart3.xml><?xml version="1.0" encoding="utf-8"?>
 <c:chartSpace xmlns:c="http://schemas.openxmlformats.org/drawingml/2006/chart" xmlns:a="http://schemas.openxmlformats.org/drawingml/2006/main" xmlns:r="http://schemas.openxmlformats.org/officeDocument/2006/relationships">
   <c:date1904 val="0"/>
@@ -2350,6 +3332,7 @@
           </a:p>
         </c:rich>
       </c:tx>
+      <c:layout/>
       <c:overlay val="0"/>
       <c:spPr>
         <a:noFill/>
@@ -2997,6 +3980,7 @@
     </c:plotArea>
     <c:legend>
       <c:legendPos val="b"/>
+      <c:layout/>
       <c:overlay val="0"/>
       <c:spPr>
         <a:noFill/>
@@ -3078,12 +4062,6 @@
 </file>
 
 <file path=ppt/charts/colors2.xml><?xml version="1.0" encoding="utf-8"?>
-<cs:colorStyle xmlns:cs="http://schemas.microsoft.com/office/drawing/2012/chartStyle" xmlns:a="http://schemas.openxmlformats.org/drawingml/2006/main" meth="withinLinear" id="14">
-  <a:schemeClr val="accent1"/>
-</cs:colorStyle>
-</file>
-
-<file path=ppt/charts/colors3.xml><?xml version="1.0" encoding="utf-8"?>
 <cs:colorStyle xmlns:cs="http://schemas.microsoft.com/office/drawing/2012/chartStyle" xmlns:a="http://schemas.openxmlformats.org/drawingml/2006/main" meth="cycle" id="10">
   <a:schemeClr val="accent1"/>
   <a:schemeClr val="accent2"/>
@@ -3124,607 +4102,6 @@
 </file>
 
 <file path=ppt/charts/style1.xml><?xml version="1.0" encoding="utf-8"?>
-<cs:chartStyle xmlns:cs="http://schemas.microsoft.com/office/drawing/2012/chartStyle" xmlns:a="http://schemas.openxmlformats.org/drawingml/2006/main" id="253">
-  <cs:axisTitle>
-    <cs:lnRef idx="0"/>
-    <cs:fillRef idx="0"/>
-    <cs:effectRef idx="0"/>
-    <cs:fontRef idx="minor">
-      <a:schemeClr val="dk1">
-        <a:lumMod val="75000"/>
-        <a:lumOff val="25000"/>
-      </a:schemeClr>
-    </cs:fontRef>
-    <cs:defRPr sz="900" b="1" kern="1200"/>
-  </cs:axisTitle>
-  <cs:categoryAxis>
-    <cs:lnRef idx="0"/>
-    <cs:fillRef idx="0"/>
-    <cs:effectRef idx="0"/>
-    <cs:fontRef idx="minor">
-      <a:schemeClr val="dk1">
-        <a:lumMod val="75000"/>
-        <a:lumOff val="25000"/>
-      </a:schemeClr>
-    </cs:fontRef>
-    <cs:spPr>
-      <a:ln w="19050" cap="flat" cmpd="sng" algn="ctr">
-        <a:solidFill>
-          <a:schemeClr val="dk1">
-            <a:lumMod val="75000"/>
-            <a:lumOff val="25000"/>
-          </a:schemeClr>
-        </a:solidFill>
-        <a:round/>
-      </a:ln>
-    </cs:spPr>
-    <cs:defRPr sz="900" kern="1200" cap="all" baseline="0"/>
-  </cs:categoryAxis>
-  <cs:chartArea>
-    <cs:lnRef idx="0"/>
-    <cs:fillRef idx="0"/>
-    <cs:effectRef idx="0"/>
-    <cs:fontRef idx="minor">
-      <a:schemeClr val="dk1"/>
-    </cs:fontRef>
-    <cs:spPr>
-      <a:gradFill flip="none" rotWithShape="1">
-        <a:gsLst>
-          <a:gs pos="0">
-            <a:schemeClr val="lt1"/>
-          </a:gs>
-          <a:gs pos="39000">
-            <a:schemeClr val="lt1"/>
-          </a:gs>
-          <a:gs pos="100000">
-            <a:schemeClr val="lt1">
-              <a:lumMod val="75000"/>
-            </a:schemeClr>
-          </a:gs>
-        </a:gsLst>
-        <a:path path="circle">
-          <a:fillToRect l="50000" t="-80000" r="50000" b="180000"/>
-        </a:path>
-        <a:tileRect/>
-      </a:gradFill>
-      <a:ln w="9525" cap="flat" cmpd="sng" algn="ctr">
-        <a:solidFill>
-          <a:schemeClr val="dk1">
-            <a:lumMod val="25000"/>
-            <a:lumOff val="75000"/>
-          </a:schemeClr>
-        </a:solidFill>
-        <a:round/>
-      </a:ln>
-    </cs:spPr>
-    <cs:defRPr sz="900" kern="1200"/>
-  </cs:chartArea>
-  <cs:dataLabel>
-    <cs:lnRef idx="0"/>
-    <cs:fillRef idx="0"/>
-    <cs:effectRef idx="0"/>
-    <cs:fontRef idx="minor">
-      <a:schemeClr val="lt1"/>
-    </cs:fontRef>
-    <cs:spPr>
-      <a:pattFill prst="pct75">
-        <a:fgClr>
-          <a:schemeClr val="dk1">
-            <a:lumMod val="75000"/>
-            <a:lumOff val="25000"/>
-          </a:schemeClr>
-        </a:fgClr>
-        <a:bgClr>
-          <a:schemeClr val="dk1">
-            <a:lumMod val="65000"/>
-            <a:lumOff val="35000"/>
-          </a:schemeClr>
-        </a:bgClr>
-      </a:pattFill>
-      <a:effectLst>
-        <a:outerShdw blurRad="50800" dist="38100" dir="2700000" algn="tl" rotWithShape="0">
-          <a:prstClr val="black">
-            <a:alpha val="40000"/>
-          </a:prstClr>
-        </a:outerShdw>
-      </a:effectLst>
-    </cs:spPr>
-    <cs:defRPr sz="1000" b="1" i="0" u="none" strike="noStrike" kern="1200" baseline="0"/>
-  </cs:dataLabel>
-  <cs:dataLabelCallout>
-    <cs:lnRef idx="0"/>
-    <cs:fillRef idx="0"/>
-    <cs:effectRef idx="0"/>
-    <cs:fontRef idx="minor">
-      <a:schemeClr val="lt1"/>
-    </cs:fontRef>
-    <cs:spPr>
-      <a:pattFill prst="pct75">
-        <a:fgClr>
-          <a:schemeClr val="dk1">
-            <a:lumMod val="75000"/>
-            <a:lumOff val="25000"/>
-          </a:schemeClr>
-        </a:fgClr>
-        <a:bgClr>
-          <a:schemeClr val="dk1">
-            <a:lumMod val="65000"/>
-            <a:lumOff val="35000"/>
-          </a:schemeClr>
-        </a:bgClr>
-      </a:pattFill>
-      <a:effectLst>
-        <a:outerShdw blurRad="50800" dist="38100" dir="2700000" algn="tl" rotWithShape="0">
-          <a:prstClr val="black">
-            <a:alpha val="40000"/>
-          </a:prstClr>
-        </a:outerShdw>
-      </a:effectLst>
-    </cs:spPr>
-    <cs:defRPr sz="1000" b="1" i="0" u="none" strike="noStrike" kern="1200" baseline="0"/>
-    <cs:bodyPr rot="0" spcFirstLastPara="1" vertOverflow="clip" horzOverflow="clip" vert="horz" wrap="square" lIns="36576" tIns="18288" rIns="36576" bIns="18288" anchor="ctr" anchorCtr="1">
-      <a:spAutoFit/>
-    </cs:bodyPr>
-  </cs:dataLabelCallout>
-  <cs:dataPoint>
-    <cs:lnRef idx="0"/>
-    <cs:fillRef idx="0">
-      <cs:styleClr val="auto"/>
-    </cs:fillRef>
-    <cs:effectRef idx="0"/>
-    <cs:fontRef idx="minor">
-      <a:schemeClr val="dk1"/>
-    </cs:fontRef>
-    <cs:spPr>
-      <a:solidFill>
-        <a:schemeClr val="phClr"/>
-      </a:solidFill>
-      <a:effectLst>
-        <a:outerShdw blurRad="254000" sx="102000" sy="102000" algn="ctr" rotWithShape="0">
-          <a:prstClr val="black">
-            <a:alpha val="20000"/>
-          </a:prstClr>
-        </a:outerShdw>
-      </a:effectLst>
-    </cs:spPr>
-  </cs:dataPoint>
-  <cs:dataPoint3D>
-    <cs:lnRef idx="0"/>
-    <cs:fillRef idx="0">
-      <cs:styleClr val="auto"/>
-    </cs:fillRef>
-    <cs:effectRef idx="0"/>
-    <cs:fontRef idx="minor">
-      <a:schemeClr val="dk1"/>
-    </cs:fontRef>
-    <cs:spPr>
-      <a:solidFill>
-        <a:schemeClr val="phClr"/>
-      </a:solidFill>
-      <a:effectLst>
-        <a:outerShdw blurRad="254000" sx="102000" sy="102000" algn="ctr" rotWithShape="0">
-          <a:prstClr val="black">
-            <a:alpha val="20000"/>
-          </a:prstClr>
-        </a:outerShdw>
-      </a:effectLst>
-    </cs:spPr>
-  </cs:dataPoint3D>
-  <cs:dataPointLine>
-    <cs:lnRef idx="0">
-      <cs:styleClr val="auto"/>
-    </cs:lnRef>
-    <cs:fillRef idx="0"/>
-    <cs:effectRef idx="0"/>
-    <cs:fontRef idx="minor">
-      <a:schemeClr val="dk1"/>
-    </cs:fontRef>
-    <cs:spPr>
-      <a:ln w="31750" cap="rnd">
-        <a:solidFill>
-          <a:schemeClr val="phClr">
-            <a:alpha val="85000"/>
-          </a:schemeClr>
-        </a:solidFill>
-        <a:round/>
-      </a:ln>
-    </cs:spPr>
-  </cs:dataPointLine>
-  <cs:dataPointMarker>
-    <cs:lnRef idx="0"/>
-    <cs:fillRef idx="0">
-      <cs:styleClr val="auto"/>
-    </cs:fillRef>
-    <cs:effectRef idx="0"/>
-    <cs:fontRef idx="minor">
-      <a:schemeClr val="dk1"/>
-    </cs:fontRef>
-    <cs:spPr>
-      <a:solidFill>
-        <a:schemeClr val="phClr">
-          <a:alpha val="85000"/>
-        </a:schemeClr>
-      </a:solidFill>
-    </cs:spPr>
-  </cs:dataPointMarker>
-  <cs:dataPointMarkerLayout symbol="circle" size="6"/>
-  <cs:dataPointWireframe>
-    <cs:lnRef idx="0">
-      <cs:styleClr val="auto"/>
-    </cs:lnRef>
-    <cs:fillRef idx="0"/>
-    <cs:effectRef idx="0"/>
-    <cs:fontRef idx="minor">
-      <a:schemeClr val="dk1"/>
-    </cs:fontRef>
-    <cs:spPr>
-      <a:ln w="9525" cap="rnd">
-        <a:solidFill>
-          <a:schemeClr val="phClr"/>
-        </a:solidFill>
-        <a:round/>
-      </a:ln>
-    </cs:spPr>
-  </cs:dataPointWireframe>
-  <cs:dataTable>
-    <cs:lnRef idx="0"/>
-    <cs:fillRef idx="0"/>
-    <cs:effectRef idx="0"/>
-    <cs:fontRef idx="minor">
-      <a:schemeClr val="dk1">
-        <a:lumMod val="75000"/>
-        <a:lumOff val="25000"/>
-      </a:schemeClr>
-    </cs:fontRef>
-    <cs:spPr>
-      <a:ln w="9525">
-        <a:solidFill>
-          <a:schemeClr val="dk1">
-            <a:lumMod val="35000"/>
-            <a:lumOff val="65000"/>
-          </a:schemeClr>
-        </a:solidFill>
-      </a:ln>
-    </cs:spPr>
-    <cs:defRPr sz="900" kern="1200"/>
-  </cs:dataTable>
-  <cs:downBar>
-    <cs:lnRef idx="0"/>
-    <cs:fillRef idx="0"/>
-    <cs:effectRef idx="0"/>
-    <cs:fontRef idx="minor">
-      <a:schemeClr val="dk1"/>
-    </cs:fontRef>
-    <cs:spPr>
-      <a:solidFill>
-        <a:schemeClr val="dk1">
-          <a:lumMod val="50000"/>
-          <a:lumOff val="50000"/>
-        </a:schemeClr>
-      </a:solidFill>
-      <a:ln w="9525">
-        <a:solidFill>
-          <a:schemeClr val="dk1">
-            <a:lumMod val="65000"/>
-            <a:lumOff val="35000"/>
-          </a:schemeClr>
-        </a:solidFill>
-      </a:ln>
-    </cs:spPr>
-  </cs:downBar>
-  <cs:dropLine>
-    <cs:lnRef idx="0"/>
-    <cs:fillRef idx="0"/>
-    <cs:effectRef idx="0"/>
-    <cs:fontRef idx="minor">
-      <a:schemeClr val="dk1"/>
-    </cs:fontRef>
-    <cs:spPr>
-      <a:ln w="9525">
-        <a:solidFill>
-          <a:schemeClr val="dk1">
-            <a:lumMod val="35000"/>
-            <a:lumOff val="65000"/>
-          </a:schemeClr>
-        </a:solidFill>
-        <a:prstDash val="dash"/>
-      </a:ln>
-    </cs:spPr>
-  </cs:dropLine>
-  <cs:errorBar>
-    <cs:lnRef idx="0"/>
-    <cs:fillRef idx="0"/>
-    <cs:effectRef idx="0"/>
-    <cs:fontRef idx="minor">
-      <a:schemeClr val="dk1"/>
-    </cs:fontRef>
-    <cs:spPr>
-      <a:ln w="9525">
-        <a:solidFill>
-          <a:schemeClr val="dk1">
-            <a:lumMod val="65000"/>
-            <a:lumOff val="35000"/>
-          </a:schemeClr>
-        </a:solidFill>
-        <a:round/>
-      </a:ln>
-    </cs:spPr>
-  </cs:errorBar>
-  <cs:floor>
-    <cs:lnRef idx="0"/>
-    <cs:fillRef idx="0"/>
-    <cs:effectRef idx="0"/>
-    <cs:fontRef idx="minor">
-      <a:schemeClr val="dk1"/>
-    </cs:fontRef>
-  </cs:floor>
-  <cs:gridlineMajor>
-    <cs:lnRef idx="0"/>
-    <cs:fillRef idx="0"/>
-    <cs:effectRef idx="0"/>
-    <cs:fontRef idx="minor">
-      <a:schemeClr val="dk1"/>
-    </cs:fontRef>
-    <cs:spPr>
-      <a:ln w="9525" cap="flat" cmpd="sng" algn="ctr">
-        <a:gradFill>
-          <a:gsLst>
-            <a:gs pos="100000">
-              <a:schemeClr val="dk1">
-                <a:lumMod val="95000"/>
-                <a:lumOff val="5000"/>
-                <a:alpha val="42000"/>
-              </a:schemeClr>
-            </a:gs>
-            <a:gs pos="0">
-              <a:schemeClr val="lt1">
-                <a:lumMod val="75000"/>
-                <a:alpha val="36000"/>
-              </a:schemeClr>
-            </a:gs>
-          </a:gsLst>
-          <a:lin ang="5400000" scaled="0"/>
-        </a:gradFill>
-        <a:round/>
-      </a:ln>
-    </cs:spPr>
-  </cs:gridlineMajor>
-  <cs:gridlineMinor>
-    <cs:lnRef idx="0"/>
-    <cs:fillRef idx="0"/>
-    <cs:effectRef idx="0"/>
-    <cs:fontRef idx="minor">
-      <a:schemeClr val="dk1"/>
-    </cs:fontRef>
-    <cs:spPr>
-      <a:ln>
-        <a:gradFill>
-          <a:gsLst>
-            <a:gs pos="100000">
-              <a:schemeClr val="dk1">
-                <a:lumMod val="95000"/>
-                <a:lumOff val="5000"/>
-                <a:alpha val="42000"/>
-              </a:schemeClr>
-            </a:gs>
-            <a:gs pos="0">
-              <a:schemeClr val="lt1">
-                <a:lumMod val="75000"/>
-                <a:alpha val="36000"/>
-              </a:schemeClr>
-            </a:gs>
-          </a:gsLst>
-          <a:lin ang="5400000" scaled="0"/>
-        </a:gradFill>
-      </a:ln>
-    </cs:spPr>
-  </cs:gridlineMinor>
-  <cs:hiLoLine>
-    <cs:lnRef idx="0"/>
-    <cs:fillRef idx="0"/>
-    <cs:effectRef idx="0"/>
-    <cs:fontRef idx="minor">
-      <a:schemeClr val="dk1"/>
-    </cs:fontRef>
-    <cs:spPr>
-      <a:ln w="9525">
-        <a:solidFill>
-          <a:schemeClr val="dk1">
-            <a:lumMod val="35000"/>
-            <a:lumOff val="65000"/>
-          </a:schemeClr>
-        </a:solidFill>
-        <a:prstDash val="dash"/>
-      </a:ln>
-    </cs:spPr>
-  </cs:hiLoLine>
-  <cs:leaderLine>
-    <cs:lnRef idx="0"/>
-    <cs:fillRef idx="0"/>
-    <cs:effectRef idx="0"/>
-    <cs:fontRef idx="minor">
-      <a:schemeClr val="dk1"/>
-    </cs:fontRef>
-    <cs:spPr>
-      <a:ln w="9525">
-        <a:solidFill>
-          <a:schemeClr val="dk1">
-            <a:lumMod val="50000"/>
-            <a:lumOff val="50000"/>
-          </a:schemeClr>
-        </a:solidFill>
-      </a:ln>
-    </cs:spPr>
-  </cs:leaderLine>
-  <cs:legend>
-    <cs:lnRef idx="0"/>
-    <cs:fillRef idx="0"/>
-    <cs:effectRef idx="0"/>
-    <cs:fontRef idx="minor">
-      <a:schemeClr val="dk1">
-        <a:lumMod val="75000"/>
-        <a:lumOff val="25000"/>
-      </a:schemeClr>
-    </cs:fontRef>
-    <cs:spPr>
-      <a:solidFill>
-        <a:schemeClr val="lt1">
-          <a:lumMod val="95000"/>
-          <a:alpha val="39000"/>
-        </a:schemeClr>
-      </a:solidFill>
-    </cs:spPr>
-    <cs:defRPr sz="900" kern="1200"/>
-  </cs:legend>
-  <cs:plotArea>
-    <cs:lnRef idx="0"/>
-    <cs:fillRef idx="0"/>
-    <cs:effectRef idx="0"/>
-    <cs:fontRef idx="minor">
-      <a:schemeClr val="dk1"/>
-    </cs:fontRef>
-  </cs:plotArea>
-  <cs:plotArea3D>
-    <cs:lnRef idx="0"/>
-    <cs:fillRef idx="0"/>
-    <cs:effectRef idx="0"/>
-    <cs:fontRef idx="minor">
-      <a:schemeClr val="dk1"/>
-    </cs:fontRef>
-  </cs:plotArea3D>
-  <cs:seriesAxis>
-    <cs:lnRef idx="0"/>
-    <cs:fillRef idx="0"/>
-    <cs:effectRef idx="0"/>
-    <cs:fontRef idx="minor">
-      <a:schemeClr val="dk1">
-        <a:lumMod val="75000"/>
-        <a:lumOff val="25000"/>
-      </a:schemeClr>
-    </cs:fontRef>
-    <cs:spPr>
-      <a:ln w="31750" cap="flat" cmpd="sng" algn="ctr">
-        <a:solidFill>
-          <a:schemeClr val="dk1">
-            <a:lumMod val="75000"/>
-            <a:lumOff val="25000"/>
-          </a:schemeClr>
-        </a:solidFill>
-        <a:round/>
-      </a:ln>
-    </cs:spPr>
-    <cs:defRPr sz="900" kern="1200"/>
-  </cs:seriesAxis>
-  <cs:seriesLine>
-    <cs:lnRef idx="0"/>
-    <cs:fillRef idx="0"/>
-    <cs:effectRef idx="0"/>
-    <cs:fontRef idx="minor">
-      <a:schemeClr val="dk1"/>
-    </cs:fontRef>
-    <cs:spPr>
-      <a:ln w="9525">
-        <a:solidFill>
-          <a:schemeClr val="dk1">
-            <a:lumMod val="50000"/>
-            <a:lumOff val="50000"/>
-          </a:schemeClr>
-        </a:solidFill>
-        <a:round/>
-      </a:ln>
-    </cs:spPr>
-  </cs:seriesLine>
-  <cs:title>
-    <cs:lnRef idx="0"/>
-    <cs:fillRef idx="0"/>
-    <cs:effectRef idx="0"/>
-    <cs:fontRef idx="minor">
-      <a:schemeClr val="dk1">
-        <a:lumMod val="75000"/>
-        <a:lumOff val="25000"/>
-      </a:schemeClr>
-    </cs:fontRef>
-    <cs:defRPr sz="1800" b="1" kern="1200" baseline="0"/>
-  </cs:title>
-  <cs:trendline>
-    <cs:lnRef idx="0">
-      <cs:styleClr val="auto"/>
-    </cs:lnRef>
-    <cs:fillRef idx="0"/>
-    <cs:effectRef idx="0"/>
-    <cs:fontRef idx="minor">
-      <a:schemeClr val="dk1"/>
-    </cs:fontRef>
-    <cs:spPr>
-      <a:ln w="19050" cap="rnd">
-        <a:solidFill>
-          <a:schemeClr val="phClr"/>
-        </a:solidFill>
-      </a:ln>
-    </cs:spPr>
-  </cs:trendline>
-  <cs:trendlineLabel>
-    <cs:lnRef idx="0"/>
-    <cs:fillRef idx="0"/>
-    <cs:effectRef idx="0"/>
-    <cs:fontRef idx="minor">
-      <a:schemeClr val="dk1">
-        <a:lumMod val="75000"/>
-        <a:lumOff val="25000"/>
-      </a:schemeClr>
-    </cs:fontRef>
-    <cs:defRPr sz="900" kern="1200"/>
-  </cs:trendlineLabel>
-  <cs:upBar>
-    <cs:lnRef idx="0"/>
-    <cs:fillRef idx="0"/>
-    <cs:effectRef idx="0"/>
-    <cs:fontRef idx="minor">
-      <a:schemeClr val="dk1"/>
-    </cs:fontRef>
-    <cs:spPr>
-      <a:solidFill>
-        <a:schemeClr val="lt1"/>
-      </a:solidFill>
-      <a:ln w="9525">
-        <a:solidFill>
-          <a:schemeClr val="dk1">
-            <a:lumMod val="65000"/>
-            <a:lumOff val="35000"/>
-          </a:schemeClr>
-        </a:solidFill>
-      </a:ln>
-    </cs:spPr>
-  </cs:upBar>
-  <cs:valueAxis>
-    <cs:lnRef idx="0"/>
-    <cs:fillRef idx="0"/>
-    <cs:effectRef idx="0"/>
-    <cs:fontRef idx="minor">
-      <a:schemeClr val="dk1">
-        <a:lumMod val="75000"/>
-        <a:lumOff val="25000"/>
-      </a:schemeClr>
-    </cs:fontRef>
-    <cs:spPr>
-      <a:ln>
-        <a:noFill/>
-      </a:ln>
-    </cs:spPr>
-    <cs:defRPr sz="900" kern="1200"/>
-  </cs:valueAxis>
-  <cs:wall>
-    <cs:lnRef idx="0"/>
-    <cs:fillRef idx="0"/>
-    <cs:effectRef idx="0"/>
-    <cs:fontRef idx="minor">
-      <a:schemeClr val="dk1"/>
-    </cs:fontRef>
-  </cs:wall>
-</cs:chartStyle>
-</file>
-
-<file path=ppt/charts/style2.xml><?xml version="1.0" encoding="utf-8"?>
 <cs:chartStyle xmlns:cs="http://schemas.microsoft.com/office/drawing/2012/chartStyle" xmlns:a="http://schemas.openxmlformats.org/drawingml/2006/main" id="294">
   <cs:axisTitle>
     <cs:lnRef idx="0"/>
@@ -4200,7 +4577,7 @@
 </cs:chartStyle>
 </file>
 
-<file path=ppt/charts/style3.xml><?xml version="1.0" encoding="utf-8"?>
+<file path=ppt/charts/style2.xml><?xml version="1.0" encoding="utf-8"?>
 <cs:chartStyle xmlns:cs="http://schemas.microsoft.com/office/drawing/2012/chartStyle" xmlns:a="http://schemas.openxmlformats.org/drawingml/2006/main" id="209">
   <cs:axisTitle>
     <cs:lnRef idx="0"/>
@@ -5259,7 +5636,7 @@
           <a:p>
             <a:fld id="{F81F356D-41A4-0342-8E44-94109B993633}" type="slidenum">
               <a:rPr lang="en-US" smtClean="0"/>
-              <a:t>17</a:t>
+              <a:t>16</a:t>
             </a:fld>
             <a:endParaRPr lang="en-US"/>
           </a:p>
@@ -21996,158 +22373,6 @@
       </p:grpSpPr>
       <p:sp>
         <p:nvSpPr>
-          <p:cNvPr id="2" name="Titolo 1">
-            <a:extLst>
-              <a:ext uri="{FF2B5EF4-FFF2-40B4-BE49-F238E27FC236}">
-                <a16:creationId xmlns="" xmlns:a16="http://schemas.microsoft.com/office/drawing/2014/main" id="{82E4D137-6351-4496-B0DE-EE5D2D2FC685}"/>
-              </a:ext>
-            </a:extLst>
-          </p:cNvPr>
-          <p:cNvSpPr>
-            <a:spLocks noGrp="1"/>
-          </p:cNvSpPr>
-          <p:nvPr>
-            <p:ph type="title"/>
-          </p:nvPr>
-        </p:nvSpPr>
-        <p:spPr/>
-        <p:txBody>
-          <a:bodyPr>
-            <a:normAutofit/>
-          </a:bodyPr>
-          <a:lstStyle/>
-          <a:p>
-            <a:r>
-              <a:rPr lang="en-US" dirty="0"/>
-              <a:t>Average % Algorithm Execution Time</a:t>
-            </a:r>
-            <a:endParaRPr lang="it-IT" dirty="0"/>
-          </a:p>
-        </p:txBody>
-      </p:sp>
-      <p:sp>
-        <p:nvSpPr>
-          <p:cNvPr id="3" name="Segnaposto contenuto 2">
-            <a:extLst>
-              <a:ext uri="{FF2B5EF4-FFF2-40B4-BE49-F238E27FC236}">
-                <a16:creationId xmlns="" xmlns:a16="http://schemas.microsoft.com/office/drawing/2014/main" id="{D1AD23D3-52EB-43AE-B408-78EE484130B1}"/>
-              </a:ext>
-            </a:extLst>
-          </p:cNvPr>
-          <p:cNvSpPr>
-            <a:spLocks noGrp="1"/>
-          </p:cNvSpPr>
-          <p:nvPr>
-            <p:ph idx="1"/>
-          </p:nvPr>
-        </p:nvSpPr>
-        <p:spPr/>
-        <p:txBody>
-          <a:bodyPr/>
-          <a:lstStyle/>
-          <a:p>
-            <a:endParaRPr lang="it-IT"/>
-          </a:p>
-        </p:txBody>
-      </p:sp>
-      <p:sp>
-        <p:nvSpPr>
-          <p:cNvPr id="4" name="Segnaposto numero diapositiva 3">
-            <a:extLst>
-              <a:ext uri="{FF2B5EF4-FFF2-40B4-BE49-F238E27FC236}">
-                <a16:creationId xmlns="" xmlns:a16="http://schemas.microsoft.com/office/drawing/2014/main" id="{44344993-EB5E-481E-9648-C751E3522B27}"/>
-              </a:ext>
-            </a:extLst>
-          </p:cNvPr>
-          <p:cNvSpPr>
-            <a:spLocks noGrp="1"/>
-          </p:cNvSpPr>
-          <p:nvPr>
-            <p:ph type="sldNum" sz="quarter" idx="12"/>
-          </p:nvPr>
-        </p:nvSpPr>
-        <p:spPr/>
-        <p:txBody>
-          <a:bodyPr/>
-          <a:lstStyle/>
-          <a:p>
-            <a:fld id="{6D22F896-40B5-4ADD-8801-0D06FADFA095}" type="slidenum">
-              <a:rPr lang="en-US" smtClean="0"/>
-              <a:t>16</a:t>
-            </a:fld>
-            <a:endParaRPr lang="en-US" dirty="0"/>
-          </a:p>
-        </p:txBody>
-      </p:sp>
-      <p:graphicFrame>
-        <p:nvGraphicFramePr>
-          <p:cNvPr id="5" name="Grafico 4">
-            <a:extLst>
-              <a:ext uri="{FF2B5EF4-FFF2-40B4-BE49-F238E27FC236}">
-                <a16:creationId xmlns="" xmlns:a16="http://schemas.microsoft.com/office/drawing/2014/main" id="{D2FAD8B6-79C6-44E9-93E3-A22CD9B2457B}"/>
-              </a:ext>
-            </a:extLst>
-          </p:cNvPr>
-          <p:cNvGraphicFramePr>
-            <a:graphicFrameLocks/>
-          </p:cNvGraphicFramePr>
-          <p:nvPr>
-            <p:extLst>
-              <p:ext uri="{D42A27DB-BD31-4B8C-83A1-F6EECF244321}">
-                <p14:modId xmlns:p14="http://schemas.microsoft.com/office/powerpoint/2010/main" val="2234945180"/>
-              </p:ext>
-            </p:extLst>
-          </p:nvPr>
-        </p:nvGraphicFramePr>
-        <p:xfrm>
-          <a:off x="4670960" y="803186"/>
-          <a:ext cx="6772902" cy="5481500"/>
-        </p:xfrm>
-        <a:graphic>
-          <a:graphicData uri="http://schemas.openxmlformats.org/drawingml/2006/chart">
-            <c:chart xmlns:c="http://schemas.openxmlformats.org/drawingml/2006/chart" xmlns:r="http://schemas.openxmlformats.org/officeDocument/2006/relationships" r:id="rId2"/>
-          </a:graphicData>
-        </a:graphic>
-      </p:graphicFrame>
-    </p:spTree>
-    <p:extLst>
-      <p:ext uri="{BB962C8B-B14F-4D97-AF65-F5344CB8AC3E}">
-        <p14:creationId xmlns:p14="http://schemas.microsoft.com/office/powerpoint/2010/main" val="2952836064"/>
-      </p:ext>
-    </p:extLst>
-  </p:cSld>
-  <p:clrMapOvr>
-    <a:masterClrMapping/>
-  </p:clrMapOvr>
-  <p:timing>
-    <p:tnLst>
-      <p:par>
-        <p:cTn id="1" dur="indefinite" restart="never" nodeType="tmRoot"/>
-      </p:par>
-    </p:tnLst>
-  </p:timing>
-</p:sld>
-</file>
-
-<file path=ppt/slides/slide17.xml><?xml version="1.0" encoding="utf-8"?>
-<p:sld xmlns:a="http://schemas.openxmlformats.org/drawingml/2006/main" xmlns:r="http://schemas.openxmlformats.org/officeDocument/2006/relationships" xmlns:p="http://schemas.openxmlformats.org/presentationml/2006/main">
-  <p:cSld>
-    <p:spTree>
-      <p:nvGrpSpPr>
-        <p:cNvPr id="1" name=""/>
-        <p:cNvGrpSpPr/>
-        <p:nvPr/>
-      </p:nvGrpSpPr>
-      <p:grpSpPr>
-        <a:xfrm>
-          <a:off x="0" y="0"/>
-          <a:ext cx="0" cy="0"/>
-          <a:chOff x="0" y="0"/>
-          <a:chExt cx="0" cy="0"/>
-        </a:xfrm>
-      </p:grpSpPr>
-      <p:sp>
-        <p:nvSpPr>
           <p:cNvPr id="2" name="Segnaposto numero diapositiva 1">
             <a:extLst>
               <a:ext uri="{FF2B5EF4-FFF2-40B4-BE49-F238E27FC236}">
@@ -22169,7 +22394,7 @@
           <a:p>
             <a:fld id="{6D22F896-40B5-4ADD-8801-0D06FADFA095}" type="slidenum">
               <a:rPr lang="en-US" smtClean="0"/>
-              <a:t>17</a:t>
+              <a:t>16</a:t>
             </a:fld>
             <a:endParaRPr lang="en-US" dirty="0"/>
           </a:p>
@@ -22225,7 +22450,7 @@
 </p:sld>
 </file>
 
-<file path=ppt/slides/slide18.xml><?xml version="1.0" encoding="utf-8"?>
+<file path=ppt/slides/slide17.xml><?xml version="1.0" encoding="utf-8"?>
 <p:sld xmlns:a="http://schemas.openxmlformats.org/drawingml/2006/main" xmlns:r="http://schemas.openxmlformats.org/officeDocument/2006/relationships" xmlns:p="http://schemas.openxmlformats.org/presentationml/2006/main">
   <p:cSld>
     <p:spTree>
@@ -22287,7 +22512,7 @@
           <a:p>
             <a:fld id="{6D22F896-40B5-4ADD-8801-0D06FADFA095}" type="slidenum">
               <a:rPr lang="en-US" smtClean="0"/>
-              <a:t>18</a:t>
+              <a:t>17</a:t>
             </a:fld>
             <a:endParaRPr lang="en-US" dirty="0"/>
           </a:p>
@@ -22297,6 +22522,128 @@
     <p:extLst>
       <p:ext uri="{BB962C8B-B14F-4D97-AF65-F5344CB8AC3E}">
         <p14:creationId xmlns:p14="http://schemas.microsoft.com/office/powerpoint/2010/main" val="1235434602"/>
+      </p:ext>
+    </p:extLst>
+  </p:cSld>
+  <p:clrMapOvr>
+    <a:masterClrMapping/>
+  </p:clrMapOvr>
+  <p:timing>
+    <p:tnLst>
+      <p:par>
+        <p:cTn id="1" dur="indefinite" restart="never" nodeType="tmRoot"/>
+      </p:par>
+    </p:tnLst>
+  </p:timing>
+</p:sld>
+</file>
+
+<file path=ppt/slides/slide18.xml><?xml version="1.0" encoding="utf-8"?>
+<p:sld xmlns:a="http://schemas.openxmlformats.org/drawingml/2006/main" xmlns:r="http://schemas.openxmlformats.org/officeDocument/2006/relationships" xmlns:p="http://schemas.openxmlformats.org/presentationml/2006/main">
+  <p:cSld>
+    <p:spTree>
+      <p:nvGrpSpPr>
+        <p:cNvPr id="1" name=""/>
+        <p:cNvGrpSpPr/>
+        <p:nvPr/>
+      </p:nvGrpSpPr>
+      <p:grpSpPr>
+        <a:xfrm>
+          <a:off x="0" y="0"/>
+          <a:ext cx="0" cy="0"/>
+          <a:chOff x="0" y="0"/>
+          <a:chExt cx="0" cy="0"/>
+        </a:xfrm>
+      </p:grpSpPr>
+      <p:sp>
+        <p:nvSpPr>
+          <p:cNvPr id="2" name="Titolo 1">
+            <a:extLst>
+              <a:ext uri="{FF2B5EF4-FFF2-40B4-BE49-F238E27FC236}">
+                <a16:creationId xmlns="" xmlns:a16="http://schemas.microsoft.com/office/drawing/2014/main" id="{82E4D137-6351-4496-B0DE-EE5D2D2FC685}"/>
+              </a:ext>
+            </a:extLst>
+          </p:cNvPr>
+          <p:cNvSpPr>
+            <a:spLocks noGrp="1"/>
+          </p:cNvSpPr>
+          <p:nvPr>
+            <p:ph type="title"/>
+          </p:nvPr>
+        </p:nvSpPr>
+        <p:spPr/>
+        <p:txBody>
+          <a:bodyPr>
+            <a:normAutofit/>
+          </a:bodyPr>
+          <a:lstStyle/>
+          <a:p>
+            <a:r>
+              <a:rPr lang="en-US" dirty="0" smtClean="0"/>
+              <a:t>Improving over time</a:t>
+            </a:r>
+            <a:endParaRPr lang="it-IT" dirty="0"/>
+          </a:p>
+        </p:txBody>
+      </p:sp>
+      <p:sp>
+        <p:nvSpPr>
+          <p:cNvPr id="4" name="Segnaposto numero diapositiva 3">
+            <a:extLst>
+              <a:ext uri="{FF2B5EF4-FFF2-40B4-BE49-F238E27FC236}">
+                <a16:creationId xmlns="" xmlns:a16="http://schemas.microsoft.com/office/drawing/2014/main" id="{44344993-EB5E-481E-9648-C751E3522B27}"/>
+              </a:ext>
+            </a:extLst>
+          </p:cNvPr>
+          <p:cNvSpPr>
+            <a:spLocks noGrp="1"/>
+          </p:cNvSpPr>
+          <p:nvPr>
+            <p:ph type="sldNum" sz="quarter" idx="12"/>
+          </p:nvPr>
+        </p:nvSpPr>
+        <p:spPr/>
+        <p:txBody>
+          <a:bodyPr/>
+          <a:lstStyle/>
+          <a:p>
+            <a:fld id="{6D22F896-40B5-4ADD-8801-0D06FADFA095}" type="slidenum">
+              <a:rPr lang="en-US" smtClean="0"/>
+              <a:t>18</a:t>
+            </a:fld>
+            <a:endParaRPr lang="en-US" dirty="0"/>
+          </a:p>
+        </p:txBody>
+      </p:sp>
+      <p:graphicFrame>
+        <p:nvGraphicFramePr>
+          <p:cNvPr id="7" name="Grafico 3"/>
+          <p:cNvGraphicFramePr>
+            <a:graphicFrameLocks noGrp="1"/>
+          </p:cNvGraphicFramePr>
+          <p:nvPr>
+            <p:ph idx="1"/>
+            <p:extLst>
+              <p:ext uri="{D42A27DB-BD31-4B8C-83A1-F6EECF244321}">
+                <p14:modId xmlns:p14="http://schemas.microsoft.com/office/powerpoint/2010/main" val="742686789"/>
+              </p:ext>
+            </p:extLst>
+          </p:nvPr>
+        </p:nvGraphicFramePr>
+        <p:xfrm>
+          <a:off x="4684143" y="803274"/>
+          <a:ext cx="7116793" cy="5528515"/>
+        </p:xfrm>
+        <a:graphic>
+          <a:graphicData uri="http://schemas.openxmlformats.org/drawingml/2006/chart">
+            <c:chart xmlns:c="http://schemas.openxmlformats.org/drawingml/2006/chart" xmlns:r="http://schemas.openxmlformats.org/officeDocument/2006/relationships" r:id="rId2"/>
+          </a:graphicData>
+        </a:graphic>
+      </p:graphicFrame>
+    </p:spTree>
+    <p:extLst>
+      <p:ext uri="{BB962C8B-B14F-4D97-AF65-F5344CB8AC3E}">
+        <p14:creationId xmlns:p14="http://schemas.microsoft.com/office/powerpoint/2010/main" val="2952836064"/>
       </p:ext>
     </p:extLst>
   </p:cSld>
@@ -22780,8 +23127,12 @@
           <a:lstStyle/>
           <a:p>
             <a:r>
+              <a:rPr lang="en-US" dirty="0" smtClean="0"/>
+              <a:t>Latest </a:t>
+            </a:r>
+            <a:r>
               <a:rPr lang="en-US" dirty="0"/>
-              <a:t>Latest Result</a:t>
+              <a:t>Result</a:t>
             </a:r>
           </a:p>
         </p:txBody>
@@ -22833,11 +23184,42 @@
         </p:blipFill>
         <p:spPr>
           <a:xfrm>
-            <a:off x="6052456" y="1578713"/>
+            <a:off x="6052456" y="1233665"/>
             <a:ext cx="4275909" cy="3582518"/>
           </a:xfrm>
         </p:spPr>
       </p:pic>
+      <p:sp>
+        <p:nvSpPr>
+          <p:cNvPr id="6" name="TextBox 5"/>
+          <p:cNvSpPr txBox="1"/>
+          <p:nvPr/>
+        </p:nvSpPr>
+        <p:spPr>
+          <a:xfrm>
+            <a:off x="6052456" y="5313872"/>
+            <a:ext cx="4212977" cy="369332"/>
+          </a:xfrm>
+          <a:prstGeom prst="rect">
+            <a:avLst/>
+          </a:prstGeom>
+          <a:noFill/>
+        </p:spPr>
+        <p:txBody>
+          <a:bodyPr wrap="square" rtlCol="0">
+            <a:spAutoFit/>
+          </a:bodyPr>
+          <a:lstStyle/>
+          <a:p>
+            <a:pPr algn="ctr"/>
+            <a:r>
+              <a:rPr lang="en-US" dirty="0" smtClean="0"/>
+              <a:t>Execution Time: 30 minutes</a:t>
+            </a:r>
+            <a:endParaRPr lang="en-US" dirty="0"/>
+          </a:p>
+        </p:txBody>
+      </p:sp>
     </p:spTree>
     <p:extLst>
       <p:ext uri="{BB962C8B-B14F-4D97-AF65-F5344CB8AC3E}">

</xml_diff>